<commit_message>
New runs, and adding Instructions (partial)
</commit_message>
<xml_diff>
--- a/Experiments/draw_instructions.pptx
+++ b/Experiments/draw_instructions.pptx
@@ -5,15 +5,19 @@
     <p:sldMasterId id="2147483720" r:id="rId1"/>
   </p:sldMasterIdLst>
   <p:notesMasterIdLst>
-    <p:notesMasterId r:id="rId8"/>
+    <p:notesMasterId r:id="rId12"/>
   </p:notesMasterIdLst>
   <p:sldIdLst>
     <p:sldId id="256" r:id="rId2"/>
-    <p:sldId id="257" r:id="rId3"/>
-    <p:sldId id="258" r:id="rId4"/>
-    <p:sldId id="261" r:id="rId5"/>
-    <p:sldId id="259" r:id="rId6"/>
-    <p:sldId id="260" r:id="rId7"/>
+    <p:sldId id="265" r:id="rId3"/>
+    <p:sldId id="266" r:id="rId4"/>
+    <p:sldId id="267" r:id="rId5"/>
+    <p:sldId id="275" r:id="rId6"/>
+    <p:sldId id="263" r:id="rId7"/>
+    <p:sldId id="273" r:id="rId8"/>
+    <p:sldId id="274" r:id="rId9"/>
+    <p:sldId id="269" r:id="rId10"/>
+    <p:sldId id="271" r:id="rId11"/>
   </p:sldIdLst>
   <p:sldSz cx="4572000" cy="4572000"/>
   <p:notesSz cx="6858000" cy="9144000"/>
@@ -202,7 +206,7 @@
           <a:p>
             <a:fld id="{B3D1F5A6-33BB-9F4E-9C59-2A3D50235D3A}" type="datetimeFigureOut">
               <a:rPr lang="en-US" smtClean="0"/>
-              <a:t>8/26/19</a:t>
+              <a:t>8/27/19</a:t>
             </a:fld>
             <a:endParaRPr lang="en-US"/>
           </a:p>
@@ -549,7 +553,96 @@
     </p:spTree>
     <p:extLst>
       <p:ext uri="{BB962C8B-B14F-4D97-AF65-F5344CB8AC3E}">
-        <p14:creationId xmlns:p14="http://schemas.microsoft.com/office/powerpoint/2010/main" val="1979235772"/>
+        <p14:creationId xmlns:p14="http://schemas.microsoft.com/office/powerpoint/2010/main" val="917612362"/>
+      </p:ext>
+    </p:extLst>
+  </p:cSld>
+  <p:clrMapOvr>
+    <a:masterClrMapping/>
+  </p:clrMapOvr>
+</p:notes>
+</file>
+
+<file path=ppt/notesSlides/notesSlide10.xml><?xml version="1.0" encoding="utf-8"?>
+<p:notes xmlns:a="http://schemas.openxmlformats.org/drawingml/2006/main" xmlns:r="http://schemas.openxmlformats.org/officeDocument/2006/relationships" xmlns:p="http://schemas.openxmlformats.org/presentationml/2006/main">
+  <p:cSld>
+    <p:spTree>
+      <p:nvGrpSpPr>
+        <p:cNvPr id="1" name=""/>
+        <p:cNvGrpSpPr/>
+        <p:nvPr/>
+      </p:nvGrpSpPr>
+      <p:grpSpPr>
+        <a:xfrm>
+          <a:off x="0" y="0"/>
+          <a:ext cx="0" cy="0"/>
+          <a:chOff x="0" y="0"/>
+          <a:chExt cx="0" cy="0"/>
+        </a:xfrm>
+      </p:grpSpPr>
+      <p:sp>
+        <p:nvSpPr>
+          <p:cNvPr id="2" name="Slide Image Placeholder 1"/>
+          <p:cNvSpPr>
+            <a:spLocks noGrp="1" noRot="1" noChangeAspect="1"/>
+          </p:cNvSpPr>
+          <p:nvPr>
+            <p:ph type="sldImg"/>
+          </p:nvPr>
+        </p:nvSpPr>
+        <p:spPr>
+          <a:xfrm>
+            <a:off x="1885950" y="1143000"/>
+            <a:ext cx="3086100" cy="3086100"/>
+          </a:xfrm>
+        </p:spPr>
+      </p:sp>
+      <p:sp>
+        <p:nvSpPr>
+          <p:cNvPr id="3" name="Notes Placeholder 2"/>
+          <p:cNvSpPr>
+            <a:spLocks noGrp="1"/>
+          </p:cNvSpPr>
+          <p:nvPr>
+            <p:ph type="body" idx="1"/>
+          </p:nvPr>
+        </p:nvSpPr>
+        <p:spPr/>
+        <p:txBody>
+          <a:bodyPr/>
+          <a:lstStyle/>
+          <a:p>
+            <a:endParaRPr lang="en-US" dirty="0"/>
+          </a:p>
+        </p:txBody>
+      </p:sp>
+      <p:sp>
+        <p:nvSpPr>
+          <p:cNvPr id="4" name="Slide Number Placeholder 3"/>
+          <p:cNvSpPr>
+            <a:spLocks noGrp="1"/>
+          </p:cNvSpPr>
+          <p:nvPr>
+            <p:ph type="sldNum" sz="quarter" idx="10"/>
+          </p:nvPr>
+        </p:nvSpPr>
+        <p:spPr/>
+        <p:txBody>
+          <a:bodyPr/>
+          <a:lstStyle/>
+          <a:p>
+            <a:fld id="{82BE4D2C-656A-5940-932A-77C5EFCCD84E}" type="slidenum">
+              <a:rPr lang="en-US" smtClean="0"/>
+              <a:t>10</a:t>
+            </a:fld>
+            <a:endParaRPr lang="en-US"/>
+          </a:p>
+        </p:txBody>
+      </p:sp>
+    </p:spTree>
+    <p:extLst>
+      <p:ext uri="{BB962C8B-B14F-4D97-AF65-F5344CB8AC3E}">
+        <p14:creationId xmlns:p14="http://schemas.microsoft.com/office/powerpoint/2010/main" val="477567522"/>
       </p:ext>
     </p:extLst>
   </p:cSld>
@@ -638,7 +731,7 @@
     </p:spTree>
     <p:extLst>
       <p:ext uri="{BB962C8B-B14F-4D97-AF65-F5344CB8AC3E}">
-        <p14:creationId xmlns:p14="http://schemas.microsoft.com/office/powerpoint/2010/main" val="2084166938"/>
+        <p14:creationId xmlns:p14="http://schemas.microsoft.com/office/powerpoint/2010/main" val="1227472808"/>
       </p:ext>
     </p:extLst>
   </p:cSld>
@@ -727,7 +820,7 @@
     </p:spTree>
     <p:extLst>
       <p:ext uri="{BB962C8B-B14F-4D97-AF65-F5344CB8AC3E}">
-        <p14:creationId xmlns:p14="http://schemas.microsoft.com/office/powerpoint/2010/main" val="137849877"/>
+        <p14:creationId xmlns:p14="http://schemas.microsoft.com/office/powerpoint/2010/main" val="2104343380"/>
       </p:ext>
     </p:extLst>
   </p:cSld>
@@ -816,7 +909,7 @@
     </p:spTree>
     <p:extLst>
       <p:ext uri="{BB962C8B-B14F-4D97-AF65-F5344CB8AC3E}">
-        <p14:creationId xmlns:p14="http://schemas.microsoft.com/office/powerpoint/2010/main" val="1609735738"/>
+        <p14:creationId xmlns:p14="http://schemas.microsoft.com/office/powerpoint/2010/main" val="53294312"/>
       </p:ext>
     </p:extLst>
   </p:cSld>
@@ -905,7 +998,7 @@
     </p:spTree>
     <p:extLst>
       <p:ext uri="{BB962C8B-B14F-4D97-AF65-F5344CB8AC3E}">
-        <p14:creationId xmlns:p14="http://schemas.microsoft.com/office/powerpoint/2010/main" val="1970872907"/>
+        <p14:creationId xmlns:p14="http://schemas.microsoft.com/office/powerpoint/2010/main" val="1509995261"/>
       </p:ext>
     </p:extLst>
   </p:cSld>
@@ -994,7 +1087,274 @@
     </p:spTree>
     <p:extLst>
       <p:ext uri="{BB962C8B-B14F-4D97-AF65-F5344CB8AC3E}">
-        <p14:creationId xmlns:p14="http://schemas.microsoft.com/office/powerpoint/2010/main" val="156332688"/>
+        <p14:creationId xmlns:p14="http://schemas.microsoft.com/office/powerpoint/2010/main" val="921192"/>
+      </p:ext>
+    </p:extLst>
+  </p:cSld>
+  <p:clrMapOvr>
+    <a:masterClrMapping/>
+  </p:clrMapOvr>
+</p:notes>
+</file>
+
+<file path=ppt/notesSlides/notesSlide7.xml><?xml version="1.0" encoding="utf-8"?>
+<p:notes xmlns:a="http://schemas.openxmlformats.org/drawingml/2006/main" xmlns:r="http://schemas.openxmlformats.org/officeDocument/2006/relationships" xmlns:p="http://schemas.openxmlformats.org/presentationml/2006/main">
+  <p:cSld>
+    <p:spTree>
+      <p:nvGrpSpPr>
+        <p:cNvPr id="1" name=""/>
+        <p:cNvGrpSpPr/>
+        <p:nvPr/>
+      </p:nvGrpSpPr>
+      <p:grpSpPr>
+        <a:xfrm>
+          <a:off x="0" y="0"/>
+          <a:ext cx="0" cy="0"/>
+          <a:chOff x="0" y="0"/>
+          <a:chExt cx="0" cy="0"/>
+        </a:xfrm>
+      </p:grpSpPr>
+      <p:sp>
+        <p:nvSpPr>
+          <p:cNvPr id="2" name="Slide Image Placeholder 1"/>
+          <p:cNvSpPr>
+            <a:spLocks noGrp="1" noRot="1" noChangeAspect="1"/>
+          </p:cNvSpPr>
+          <p:nvPr>
+            <p:ph type="sldImg"/>
+          </p:nvPr>
+        </p:nvSpPr>
+        <p:spPr>
+          <a:xfrm>
+            <a:off x="1885950" y="1143000"/>
+            <a:ext cx="3086100" cy="3086100"/>
+          </a:xfrm>
+        </p:spPr>
+      </p:sp>
+      <p:sp>
+        <p:nvSpPr>
+          <p:cNvPr id="3" name="Notes Placeholder 2"/>
+          <p:cNvSpPr>
+            <a:spLocks noGrp="1"/>
+          </p:cNvSpPr>
+          <p:nvPr>
+            <p:ph type="body" idx="1"/>
+          </p:nvPr>
+        </p:nvSpPr>
+        <p:spPr/>
+        <p:txBody>
+          <a:bodyPr/>
+          <a:lstStyle/>
+          <a:p>
+            <a:endParaRPr lang="en-US" dirty="0"/>
+          </a:p>
+        </p:txBody>
+      </p:sp>
+      <p:sp>
+        <p:nvSpPr>
+          <p:cNvPr id="4" name="Slide Number Placeholder 3"/>
+          <p:cNvSpPr>
+            <a:spLocks noGrp="1"/>
+          </p:cNvSpPr>
+          <p:nvPr>
+            <p:ph type="sldNum" sz="quarter" idx="10"/>
+          </p:nvPr>
+        </p:nvSpPr>
+        <p:spPr/>
+        <p:txBody>
+          <a:bodyPr/>
+          <a:lstStyle/>
+          <a:p>
+            <a:fld id="{82BE4D2C-656A-5940-932A-77C5EFCCD84E}" type="slidenum">
+              <a:rPr lang="en-US" smtClean="0"/>
+              <a:t>7</a:t>
+            </a:fld>
+            <a:endParaRPr lang="en-US"/>
+          </a:p>
+        </p:txBody>
+      </p:sp>
+    </p:spTree>
+    <p:extLst>
+      <p:ext uri="{BB962C8B-B14F-4D97-AF65-F5344CB8AC3E}">
+        <p14:creationId xmlns:p14="http://schemas.microsoft.com/office/powerpoint/2010/main" val="1439944423"/>
+      </p:ext>
+    </p:extLst>
+  </p:cSld>
+  <p:clrMapOvr>
+    <a:masterClrMapping/>
+  </p:clrMapOvr>
+</p:notes>
+</file>
+
+<file path=ppt/notesSlides/notesSlide8.xml><?xml version="1.0" encoding="utf-8"?>
+<p:notes xmlns:a="http://schemas.openxmlformats.org/drawingml/2006/main" xmlns:r="http://schemas.openxmlformats.org/officeDocument/2006/relationships" xmlns:p="http://schemas.openxmlformats.org/presentationml/2006/main">
+  <p:cSld>
+    <p:spTree>
+      <p:nvGrpSpPr>
+        <p:cNvPr id="1" name=""/>
+        <p:cNvGrpSpPr/>
+        <p:nvPr/>
+      </p:nvGrpSpPr>
+      <p:grpSpPr>
+        <a:xfrm>
+          <a:off x="0" y="0"/>
+          <a:ext cx="0" cy="0"/>
+          <a:chOff x="0" y="0"/>
+          <a:chExt cx="0" cy="0"/>
+        </a:xfrm>
+      </p:grpSpPr>
+      <p:sp>
+        <p:nvSpPr>
+          <p:cNvPr id="2" name="Slide Image Placeholder 1"/>
+          <p:cNvSpPr>
+            <a:spLocks noGrp="1" noRot="1" noChangeAspect="1"/>
+          </p:cNvSpPr>
+          <p:nvPr>
+            <p:ph type="sldImg"/>
+          </p:nvPr>
+        </p:nvSpPr>
+        <p:spPr>
+          <a:xfrm>
+            <a:off x="1885950" y="1143000"/>
+            <a:ext cx="3086100" cy="3086100"/>
+          </a:xfrm>
+        </p:spPr>
+      </p:sp>
+      <p:sp>
+        <p:nvSpPr>
+          <p:cNvPr id="3" name="Notes Placeholder 2"/>
+          <p:cNvSpPr>
+            <a:spLocks noGrp="1"/>
+          </p:cNvSpPr>
+          <p:nvPr>
+            <p:ph type="body" idx="1"/>
+          </p:nvPr>
+        </p:nvSpPr>
+        <p:spPr/>
+        <p:txBody>
+          <a:bodyPr/>
+          <a:lstStyle/>
+          <a:p>
+            <a:endParaRPr lang="en-US" dirty="0"/>
+          </a:p>
+        </p:txBody>
+      </p:sp>
+      <p:sp>
+        <p:nvSpPr>
+          <p:cNvPr id="4" name="Slide Number Placeholder 3"/>
+          <p:cNvSpPr>
+            <a:spLocks noGrp="1"/>
+          </p:cNvSpPr>
+          <p:nvPr>
+            <p:ph type="sldNum" sz="quarter" idx="10"/>
+          </p:nvPr>
+        </p:nvSpPr>
+        <p:spPr/>
+        <p:txBody>
+          <a:bodyPr/>
+          <a:lstStyle/>
+          <a:p>
+            <a:fld id="{82BE4D2C-656A-5940-932A-77C5EFCCD84E}" type="slidenum">
+              <a:rPr lang="en-US" smtClean="0"/>
+              <a:t>8</a:t>
+            </a:fld>
+            <a:endParaRPr lang="en-US"/>
+          </a:p>
+        </p:txBody>
+      </p:sp>
+    </p:spTree>
+    <p:extLst>
+      <p:ext uri="{BB962C8B-B14F-4D97-AF65-F5344CB8AC3E}">
+        <p14:creationId xmlns:p14="http://schemas.microsoft.com/office/powerpoint/2010/main" val="577179226"/>
+      </p:ext>
+    </p:extLst>
+  </p:cSld>
+  <p:clrMapOvr>
+    <a:masterClrMapping/>
+  </p:clrMapOvr>
+</p:notes>
+</file>
+
+<file path=ppt/notesSlides/notesSlide9.xml><?xml version="1.0" encoding="utf-8"?>
+<p:notes xmlns:a="http://schemas.openxmlformats.org/drawingml/2006/main" xmlns:r="http://schemas.openxmlformats.org/officeDocument/2006/relationships" xmlns:p="http://schemas.openxmlformats.org/presentationml/2006/main">
+  <p:cSld>
+    <p:spTree>
+      <p:nvGrpSpPr>
+        <p:cNvPr id="1" name=""/>
+        <p:cNvGrpSpPr/>
+        <p:nvPr/>
+      </p:nvGrpSpPr>
+      <p:grpSpPr>
+        <a:xfrm>
+          <a:off x="0" y="0"/>
+          <a:ext cx="0" cy="0"/>
+          <a:chOff x="0" y="0"/>
+          <a:chExt cx="0" cy="0"/>
+        </a:xfrm>
+      </p:grpSpPr>
+      <p:sp>
+        <p:nvSpPr>
+          <p:cNvPr id="2" name="Slide Image Placeholder 1"/>
+          <p:cNvSpPr>
+            <a:spLocks noGrp="1" noRot="1" noChangeAspect="1"/>
+          </p:cNvSpPr>
+          <p:nvPr>
+            <p:ph type="sldImg"/>
+          </p:nvPr>
+        </p:nvSpPr>
+        <p:spPr>
+          <a:xfrm>
+            <a:off x="1885950" y="1143000"/>
+            <a:ext cx="3086100" cy="3086100"/>
+          </a:xfrm>
+        </p:spPr>
+      </p:sp>
+      <p:sp>
+        <p:nvSpPr>
+          <p:cNvPr id="3" name="Notes Placeholder 2"/>
+          <p:cNvSpPr>
+            <a:spLocks noGrp="1"/>
+          </p:cNvSpPr>
+          <p:nvPr>
+            <p:ph type="body" idx="1"/>
+          </p:nvPr>
+        </p:nvSpPr>
+        <p:spPr/>
+        <p:txBody>
+          <a:bodyPr/>
+          <a:lstStyle/>
+          <a:p>
+            <a:endParaRPr lang="en-US" dirty="0"/>
+          </a:p>
+        </p:txBody>
+      </p:sp>
+      <p:sp>
+        <p:nvSpPr>
+          <p:cNvPr id="4" name="Slide Number Placeholder 3"/>
+          <p:cNvSpPr>
+            <a:spLocks noGrp="1"/>
+          </p:cNvSpPr>
+          <p:nvPr>
+            <p:ph type="sldNum" sz="quarter" idx="10"/>
+          </p:nvPr>
+        </p:nvSpPr>
+        <p:spPr/>
+        <p:txBody>
+          <a:bodyPr/>
+          <a:lstStyle/>
+          <a:p>
+            <a:fld id="{82BE4D2C-656A-5940-932A-77C5EFCCD84E}" type="slidenum">
+              <a:rPr lang="en-US" smtClean="0"/>
+              <a:t>9</a:t>
+            </a:fld>
+            <a:endParaRPr lang="en-US"/>
+          </a:p>
+        </p:txBody>
+      </p:sp>
+    </p:spTree>
+    <p:extLst>
+      <p:ext uri="{BB962C8B-B14F-4D97-AF65-F5344CB8AC3E}">
+        <p14:creationId xmlns:p14="http://schemas.microsoft.com/office/powerpoint/2010/main" val="472944509"/>
       </p:ext>
     </p:extLst>
   </p:cSld>
@@ -1135,7 +1495,7 @@
           <a:p>
             <a:fld id="{E02736CB-4232-A146-B165-19378F549313}" type="datetimeFigureOut">
               <a:rPr lang="en-US" smtClean="0"/>
-              <a:t>8/26/19</a:t>
+              <a:t>8/27/19</a:t>
             </a:fld>
             <a:endParaRPr lang="en-US"/>
           </a:p>
@@ -1300,7 +1660,7 @@
           <a:p>
             <a:fld id="{E02736CB-4232-A146-B165-19378F549313}" type="datetimeFigureOut">
               <a:rPr lang="en-US" smtClean="0"/>
-              <a:t>8/26/19</a:t>
+              <a:t>8/27/19</a:t>
             </a:fld>
             <a:endParaRPr lang="en-US"/>
           </a:p>
@@ -1475,7 +1835,7 @@
           <a:p>
             <a:fld id="{E02736CB-4232-A146-B165-19378F549313}" type="datetimeFigureOut">
               <a:rPr lang="en-US" smtClean="0"/>
-              <a:t>8/26/19</a:t>
+              <a:t>8/27/19</a:t>
             </a:fld>
             <a:endParaRPr lang="en-US"/>
           </a:p>
@@ -1640,7 +2000,7 @@
           <a:p>
             <a:fld id="{E02736CB-4232-A146-B165-19378F549313}" type="datetimeFigureOut">
               <a:rPr lang="en-US" smtClean="0"/>
-              <a:t>8/26/19</a:t>
+              <a:t>8/27/19</a:t>
             </a:fld>
             <a:endParaRPr lang="en-US"/>
           </a:p>
@@ -1879,7 +2239,7 @@
           <a:p>
             <a:fld id="{E02736CB-4232-A146-B165-19378F549313}" type="datetimeFigureOut">
               <a:rPr lang="en-US" smtClean="0"/>
-              <a:t>8/26/19</a:t>
+              <a:t>8/27/19</a:t>
             </a:fld>
             <a:endParaRPr lang="en-US"/>
           </a:p>
@@ -2106,7 +2466,7 @@
           <a:p>
             <a:fld id="{E02736CB-4232-A146-B165-19378F549313}" type="datetimeFigureOut">
               <a:rPr lang="en-US" smtClean="0"/>
-              <a:t>8/26/19</a:t>
+              <a:t>8/27/19</a:t>
             </a:fld>
             <a:endParaRPr lang="en-US"/>
           </a:p>
@@ -2468,7 +2828,7 @@
           <a:p>
             <a:fld id="{E02736CB-4232-A146-B165-19378F549313}" type="datetimeFigureOut">
               <a:rPr lang="en-US" smtClean="0"/>
-              <a:t>8/26/19</a:t>
+              <a:t>8/27/19</a:t>
             </a:fld>
             <a:endParaRPr lang="en-US"/>
           </a:p>
@@ -2581,7 +2941,7 @@
           <a:p>
             <a:fld id="{E02736CB-4232-A146-B165-19378F549313}" type="datetimeFigureOut">
               <a:rPr lang="en-US" smtClean="0"/>
-              <a:t>8/26/19</a:t>
+              <a:t>8/27/19</a:t>
             </a:fld>
             <a:endParaRPr lang="en-US"/>
           </a:p>
@@ -2671,7 +3031,7 @@
           <a:p>
             <a:fld id="{E02736CB-4232-A146-B165-19378F549313}" type="datetimeFigureOut">
               <a:rPr lang="en-US" smtClean="0"/>
-              <a:t>8/26/19</a:t>
+              <a:t>8/27/19</a:t>
             </a:fld>
             <a:endParaRPr lang="en-US"/>
           </a:p>
@@ -2943,7 +3303,7 @@
           <a:p>
             <a:fld id="{E02736CB-4232-A146-B165-19378F549313}" type="datetimeFigureOut">
               <a:rPr lang="en-US" smtClean="0"/>
-              <a:t>8/26/19</a:t>
+              <a:t>8/27/19</a:t>
             </a:fld>
             <a:endParaRPr lang="en-US"/>
           </a:p>
@@ -3195,7 +3555,7 @@
           <a:p>
             <a:fld id="{E02736CB-4232-A146-B165-19378F549313}" type="datetimeFigureOut">
               <a:rPr lang="en-US" smtClean="0"/>
-              <a:t>8/26/19</a:t>
+              <a:t>8/27/19</a:t>
             </a:fld>
             <a:endParaRPr lang="en-US"/>
           </a:p>
@@ -3403,7 +3763,7 @@
           <a:p>
             <a:fld id="{E02736CB-4232-A146-B165-19378F549313}" type="datetimeFigureOut">
               <a:rPr lang="en-US" smtClean="0"/>
-              <a:t>8/26/19</a:t>
+              <a:t>8/27/19</a:t>
             </a:fld>
             <a:endParaRPr lang="en-US"/>
           </a:p>
@@ -3810,19 +4170,23 @@
       </p:grpSpPr>
       <p:sp>
         <p:nvSpPr>
-          <p:cNvPr id="4" name="Oval 3"/>
+          <p:cNvPr id="29" name="Oval 28"/>
           <p:cNvSpPr/>
           <p:nvPr/>
         </p:nvSpPr>
         <p:spPr>
           <a:xfrm>
-            <a:off x="804913" y="363072"/>
-            <a:ext cx="1557196" cy="1557196"/>
+            <a:off x="767958" y="478808"/>
+            <a:ext cx="1297663" cy="1297663"/>
           </a:xfrm>
           <a:prstGeom prst="ellipse">
             <a:avLst/>
           </a:prstGeom>
-          <a:noFill/>
+          <a:solidFill>
+            <a:schemeClr val="bg1">
+              <a:lumMod val="75000"/>
+            </a:schemeClr>
+          </a:solidFill>
           <a:ln w="38100">
             <a:solidFill>
               <a:schemeClr val="tx1"/>
@@ -3846,7 +4210,7 @@
           </a:fontRef>
         </p:style>
         <p:txBody>
-          <a:bodyPr rot="0" spcFirstLastPara="0" vertOverflow="overflow" horzOverflow="overflow" vert="horz" wrap="square" lIns="91440" tIns="45720" rIns="91440" bIns="45720" numCol="1" spcCol="0" rtlCol="0" fromWordArt="0" anchor="ctr" anchorCtr="0" forceAA="0" compatLnSpc="1">
+          <a:bodyPr rot="0" spcFirstLastPara="0" vertOverflow="overflow" horzOverflow="overflow" vert="horz" wrap="square" lIns="76200" tIns="38100" rIns="76200" bIns="38100" numCol="1" spcCol="0" rtlCol="0" fromWordArt="0" anchor="ctr" anchorCtr="0" forceAA="0" compatLnSpc="1">
             <a:prstTxWarp prst="textNoShape">
               <a:avLst/>
             </a:prstTxWarp>
@@ -3856,7 +4220,7 @@
           <a:p>
             <a:pPr algn="ctr"/>
             <a:r>
-              <a:rPr lang="en-US" sz="8000" dirty="0">
+              <a:rPr lang="en-US" sz="6666" dirty="0">
                 <a:solidFill>
                   <a:srgbClr val="C00000"/>
                 </a:solidFill>
@@ -3868,19 +4232,23 @@
       </p:sp>
       <p:sp>
         <p:nvSpPr>
-          <p:cNvPr id="5" name="Oval 4"/>
+          <p:cNvPr id="30" name="Oval 29"/>
           <p:cNvSpPr/>
           <p:nvPr/>
         </p:nvSpPr>
         <p:spPr>
           <a:xfrm>
-            <a:off x="804913" y="2649072"/>
-            <a:ext cx="1557196" cy="1557196"/>
+            <a:off x="767958" y="2843810"/>
+            <a:ext cx="1297663" cy="1297663"/>
           </a:xfrm>
           <a:prstGeom prst="ellipse">
             <a:avLst/>
           </a:prstGeom>
-          <a:noFill/>
+          <a:solidFill>
+            <a:schemeClr val="bg1">
+              <a:lumMod val="75000"/>
+            </a:schemeClr>
+          </a:solidFill>
           <a:ln w="38100">
             <a:solidFill>
               <a:schemeClr val="tx1"/>
@@ -3904,7 +4272,7 @@
           </a:fontRef>
         </p:style>
         <p:txBody>
-          <a:bodyPr rot="0" spcFirstLastPara="0" vertOverflow="overflow" horzOverflow="overflow" vert="horz" wrap="square" lIns="91440" tIns="45720" rIns="91440" bIns="45720" numCol="1" spcCol="0" rtlCol="0" fromWordArt="0" anchor="ctr" anchorCtr="0" forceAA="0" compatLnSpc="1">
+          <a:bodyPr rot="0" spcFirstLastPara="0" vertOverflow="overflow" horzOverflow="overflow" vert="horz" wrap="square" lIns="76200" tIns="38100" rIns="76200" bIns="38100" numCol="1" spcCol="0" rtlCol="0" fromWordArt="0" anchor="ctr" anchorCtr="0" forceAA="0" compatLnSpc="1">
             <a:prstTxWarp prst="textNoShape">
               <a:avLst/>
             </a:prstTxWarp>
@@ -3914,7 +4282,7 @@
           <a:p>
             <a:pPr algn="ctr"/>
             <a:r>
-              <a:rPr lang="en-US" sz="8000" dirty="0">
+              <a:rPr lang="en-US" sz="6666" dirty="0">
                 <a:solidFill>
                   <a:srgbClr val="C00000"/>
                 </a:solidFill>
@@ -3926,19 +4294,23 @@
       </p:sp>
       <p:sp>
         <p:nvSpPr>
-          <p:cNvPr id="6" name="Oval 5"/>
+          <p:cNvPr id="31" name="Oval 30"/>
           <p:cNvSpPr/>
           <p:nvPr/>
         </p:nvSpPr>
         <p:spPr>
           <a:xfrm>
-            <a:off x="2885696" y="1506072"/>
-            <a:ext cx="1557196" cy="1557196"/>
+            <a:off x="2501941" y="1662710"/>
+            <a:ext cx="1297663" cy="1297663"/>
           </a:xfrm>
           <a:prstGeom prst="ellipse">
             <a:avLst/>
           </a:prstGeom>
-          <a:noFill/>
+          <a:solidFill>
+            <a:schemeClr val="bg1">
+              <a:lumMod val="75000"/>
+            </a:schemeClr>
+          </a:solidFill>
           <a:ln w="38100">
             <a:solidFill>
               <a:schemeClr val="tx1"/>
@@ -3962,7 +4334,7 @@
           </a:fontRef>
         </p:style>
         <p:txBody>
-          <a:bodyPr rot="0" spcFirstLastPara="0" vertOverflow="overflow" horzOverflow="overflow" vert="horz" wrap="square" lIns="91440" tIns="45720" rIns="91440" bIns="45720" numCol="1" spcCol="0" rtlCol="0" fromWordArt="0" anchor="ctr" anchorCtr="0" forceAA="0" compatLnSpc="1">
+          <a:bodyPr rot="0" spcFirstLastPara="0" vertOverflow="overflow" horzOverflow="overflow" vert="horz" wrap="square" lIns="76200" tIns="38100" rIns="76200" bIns="38100" numCol="1" spcCol="0" rtlCol="0" fromWordArt="0" anchor="ctr" anchorCtr="0" forceAA="0" compatLnSpc="1">
             <a:prstTxWarp prst="textNoShape">
               <a:avLst/>
             </a:prstTxWarp>
@@ -3972,7 +4344,7 @@
           <a:p>
             <a:pPr algn="ctr"/>
             <a:r>
-              <a:rPr lang="en-US" sz="8000" dirty="0">
+              <a:rPr lang="en-US" sz="6666" dirty="0">
                 <a:solidFill>
                   <a:srgbClr val="C00000"/>
                 </a:solidFill>
@@ -3984,17 +4356,17 @@
       </p:sp>
       <p:cxnSp>
         <p:nvCxnSpPr>
-          <p:cNvPr id="8" name="Straight Arrow Connector 7"/>
+          <p:cNvPr id="32" name="Straight Arrow Connector 31"/>
           <p:cNvCxnSpPr>
-            <a:stCxn id="4" idx="6"/>
-            <a:endCxn id="6" idx="1"/>
+            <a:stCxn id="29" idx="6"/>
+            <a:endCxn id="31" idx="1"/>
           </p:cNvCxnSpPr>
           <p:nvPr/>
         </p:nvCxnSpPr>
         <p:spPr>
           <a:xfrm>
-            <a:off x="2362111" y="1141668"/>
-            <a:ext cx="751633" cy="592449"/>
+            <a:off x="2065621" y="1127640"/>
+            <a:ext cx="626358" cy="725109"/>
           </a:xfrm>
           <a:prstGeom prst="straightConnector1">
             <a:avLst/>
@@ -4024,17 +4396,17 @@
       </p:cxnSp>
       <p:cxnSp>
         <p:nvCxnSpPr>
-          <p:cNvPr id="9" name="Straight Arrow Connector 8"/>
+          <p:cNvPr id="33" name="Straight Arrow Connector 32"/>
           <p:cNvCxnSpPr>
-            <a:stCxn id="5" idx="6"/>
-            <a:endCxn id="6" idx="3"/>
+            <a:stCxn id="30" idx="6"/>
+            <a:endCxn id="31" idx="3"/>
           </p:cNvCxnSpPr>
           <p:nvPr/>
         </p:nvCxnSpPr>
         <p:spPr>
           <a:xfrm flipV="1">
-            <a:off x="2362111" y="2835221"/>
-            <a:ext cx="751633" cy="592449"/>
+            <a:off x="2065621" y="2770335"/>
+            <a:ext cx="626358" cy="722307"/>
           </a:xfrm>
           <a:prstGeom prst="straightConnector1">
             <a:avLst/>
@@ -4065,7 +4437,410 @@
     </p:spTree>
     <p:extLst>
       <p:ext uri="{BB962C8B-B14F-4D97-AF65-F5344CB8AC3E}">
-        <p14:creationId xmlns:p14="http://schemas.microsoft.com/office/powerpoint/2010/main" val="47839620"/>
+        <p14:creationId xmlns:p14="http://schemas.microsoft.com/office/powerpoint/2010/main" val="336992443"/>
+      </p:ext>
+    </p:extLst>
+  </p:cSld>
+  <p:clrMapOvr>
+    <a:masterClrMapping/>
+  </p:clrMapOvr>
+</p:sld>
+</file>
+
+<file path=ppt/slides/slide10.xml><?xml version="1.0" encoding="utf-8"?>
+<p:sld xmlns:a="http://schemas.openxmlformats.org/drawingml/2006/main" xmlns:r="http://schemas.openxmlformats.org/officeDocument/2006/relationships" xmlns:p="http://schemas.openxmlformats.org/presentationml/2006/main">
+  <p:cSld>
+    <p:spTree>
+      <p:nvGrpSpPr>
+        <p:cNvPr id="1" name=""/>
+        <p:cNvGrpSpPr/>
+        <p:nvPr/>
+      </p:nvGrpSpPr>
+      <p:grpSpPr>
+        <a:xfrm>
+          <a:off x="0" y="0"/>
+          <a:ext cx="0" cy="0"/>
+          <a:chOff x="0" y="0"/>
+          <a:chExt cx="0" cy="0"/>
+        </a:xfrm>
+      </p:grpSpPr>
+      <p:sp>
+        <p:nvSpPr>
+          <p:cNvPr id="29" name="Oval 28"/>
+          <p:cNvSpPr/>
+          <p:nvPr/>
+        </p:nvSpPr>
+        <p:spPr>
+          <a:xfrm>
+            <a:off x="767958" y="478808"/>
+            <a:ext cx="1297663" cy="1297663"/>
+          </a:xfrm>
+          <a:prstGeom prst="ellipse">
+            <a:avLst/>
+          </a:prstGeom>
+          <a:solidFill>
+            <a:schemeClr val="bg1">
+              <a:lumMod val="75000"/>
+            </a:schemeClr>
+          </a:solidFill>
+          <a:ln w="38100">
+            <a:solidFill>
+              <a:schemeClr val="tx1"/>
+            </a:solidFill>
+          </a:ln>
+        </p:spPr>
+        <p:style>
+          <a:lnRef idx="2">
+            <a:schemeClr val="accent1">
+              <a:shade val="50000"/>
+            </a:schemeClr>
+          </a:lnRef>
+          <a:fillRef idx="1">
+            <a:schemeClr val="accent1"/>
+          </a:fillRef>
+          <a:effectRef idx="0">
+            <a:schemeClr val="accent1"/>
+          </a:effectRef>
+          <a:fontRef idx="minor">
+            <a:schemeClr val="lt1"/>
+          </a:fontRef>
+        </p:style>
+        <p:txBody>
+          <a:bodyPr rot="0" spcFirstLastPara="0" vertOverflow="overflow" horzOverflow="overflow" vert="horz" wrap="square" lIns="76200" tIns="38100" rIns="76200" bIns="38100" numCol="1" spcCol="0" rtlCol="0" fromWordArt="0" anchor="ctr" anchorCtr="0" forceAA="0" compatLnSpc="1">
+            <a:prstTxWarp prst="textNoShape">
+              <a:avLst/>
+            </a:prstTxWarp>
+            <a:noAutofit/>
+          </a:bodyPr>
+          <a:lstStyle/>
+          <a:p>
+            <a:pPr algn="ctr"/>
+            <a:r>
+              <a:rPr lang="en-US" sz="6666" dirty="0">
+                <a:solidFill>
+                  <a:srgbClr val="C00000"/>
+                </a:solidFill>
+              </a:rPr>
+              <a:t>A</a:t>
+            </a:r>
+          </a:p>
+        </p:txBody>
+      </p:sp>
+      <p:sp>
+        <p:nvSpPr>
+          <p:cNvPr id="30" name="Oval 29"/>
+          <p:cNvSpPr/>
+          <p:nvPr/>
+        </p:nvSpPr>
+        <p:spPr>
+          <a:xfrm>
+            <a:off x="767958" y="2843810"/>
+            <a:ext cx="1297663" cy="1297663"/>
+          </a:xfrm>
+          <a:prstGeom prst="ellipse">
+            <a:avLst/>
+          </a:prstGeom>
+          <a:solidFill>
+            <a:schemeClr val="bg1">
+              <a:lumMod val="75000"/>
+            </a:schemeClr>
+          </a:solidFill>
+          <a:ln w="38100">
+            <a:solidFill>
+              <a:schemeClr val="tx1"/>
+            </a:solidFill>
+          </a:ln>
+        </p:spPr>
+        <p:style>
+          <a:lnRef idx="2">
+            <a:schemeClr val="accent1">
+              <a:shade val="50000"/>
+            </a:schemeClr>
+          </a:lnRef>
+          <a:fillRef idx="1">
+            <a:schemeClr val="accent1"/>
+          </a:fillRef>
+          <a:effectRef idx="0">
+            <a:schemeClr val="accent1"/>
+          </a:effectRef>
+          <a:fontRef idx="minor">
+            <a:schemeClr val="lt1"/>
+          </a:fontRef>
+        </p:style>
+        <p:txBody>
+          <a:bodyPr rot="0" spcFirstLastPara="0" vertOverflow="overflow" horzOverflow="overflow" vert="horz" wrap="square" lIns="76200" tIns="38100" rIns="76200" bIns="38100" numCol="1" spcCol="0" rtlCol="0" fromWordArt="0" anchor="ctr" anchorCtr="0" forceAA="0" compatLnSpc="1">
+            <a:prstTxWarp prst="textNoShape">
+              <a:avLst/>
+            </a:prstTxWarp>
+            <a:noAutofit/>
+          </a:bodyPr>
+          <a:lstStyle/>
+          <a:p>
+            <a:pPr algn="ctr"/>
+            <a:r>
+              <a:rPr lang="en-US" sz="6666" dirty="0">
+                <a:solidFill>
+                  <a:srgbClr val="C00000"/>
+                </a:solidFill>
+              </a:rPr>
+              <a:t>B</a:t>
+            </a:r>
+          </a:p>
+        </p:txBody>
+      </p:sp>
+      <p:sp>
+        <p:nvSpPr>
+          <p:cNvPr id="31" name="Oval 30"/>
+          <p:cNvSpPr/>
+          <p:nvPr/>
+        </p:nvSpPr>
+        <p:spPr>
+          <a:xfrm>
+            <a:off x="2501941" y="1662710"/>
+            <a:ext cx="1297663" cy="1297663"/>
+          </a:xfrm>
+          <a:prstGeom prst="ellipse">
+            <a:avLst/>
+          </a:prstGeom>
+          <a:solidFill>
+            <a:schemeClr val="bg1">
+              <a:lumMod val="75000"/>
+            </a:schemeClr>
+          </a:solidFill>
+          <a:ln w="38100">
+            <a:solidFill>
+              <a:schemeClr val="tx1"/>
+            </a:solidFill>
+          </a:ln>
+        </p:spPr>
+        <p:style>
+          <a:lnRef idx="2">
+            <a:schemeClr val="accent1">
+              <a:shade val="50000"/>
+            </a:schemeClr>
+          </a:lnRef>
+          <a:fillRef idx="1">
+            <a:schemeClr val="accent1"/>
+          </a:fillRef>
+          <a:effectRef idx="0">
+            <a:schemeClr val="accent1"/>
+          </a:effectRef>
+          <a:fontRef idx="minor">
+            <a:schemeClr val="lt1"/>
+          </a:fontRef>
+        </p:style>
+        <p:txBody>
+          <a:bodyPr rot="0" spcFirstLastPara="0" vertOverflow="overflow" horzOverflow="overflow" vert="horz" wrap="square" lIns="76200" tIns="38100" rIns="76200" bIns="38100" numCol="1" spcCol="0" rtlCol="0" fromWordArt="0" anchor="ctr" anchorCtr="0" forceAA="0" compatLnSpc="1">
+            <a:prstTxWarp prst="textNoShape">
+              <a:avLst/>
+            </a:prstTxWarp>
+            <a:noAutofit/>
+          </a:bodyPr>
+          <a:lstStyle/>
+          <a:p>
+            <a:pPr algn="ctr"/>
+            <a:r>
+              <a:rPr lang="en-US" sz="6666" dirty="0">
+                <a:solidFill>
+                  <a:srgbClr val="C00000"/>
+                </a:solidFill>
+              </a:rPr>
+              <a:t>C</a:t>
+            </a:r>
+          </a:p>
+        </p:txBody>
+      </p:sp>
+      <p:cxnSp>
+        <p:nvCxnSpPr>
+          <p:cNvPr id="45" name="Straight Arrow Connector 44"/>
+          <p:cNvCxnSpPr>
+            <a:endCxn id="29" idx="2"/>
+          </p:cNvCxnSpPr>
+          <p:nvPr/>
+        </p:nvCxnSpPr>
+        <p:spPr>
+          <a:xfrm>
+            <a:off x="88121" y="1127639"/>
+            <a:ext cx="679837" cy="0"/>
+          </a:xfrm>
+          <a:prstGeom prst="straightConnector1">
+            <a:avLst/>
+          </a:prstGeom>
+          <a:ln w="45720">
+            <a:solidFill>
+              <a:schemeClr val="tx1"/>
+            </a:solidFill>
+            <a:prstDash val="solid"/>
+            <a:tailEnd type="triangle" w="lg" len="lg"/>
+          </a:ln>
+        </p:spPr>
+        <p:style>
+          <a:lnRef idx="1">
+            <a:schemeClr val="accent1"/>
+          </a:lnRef>
+          <a:fillRef idx="0">
+            <a:schemeClr val="accent1"/>
+          </a:fillRef>
+          <a:effectRef idx="0">
+            <a:schemeClr val="accent1"/>
+          </a:effectRef>
+          <a:fontRef idx="minor">
+            <a:schemeClr val="tx1"/>
+          </a:fontRef>
+        </p:style>
+      </p:cxnSp>
+      <p:cxnSp>
+        <p:nvCxnSpPr>
+          <p:cNvPr id="10" name="Straight Arrow Connector 9"/>
+          <p:cNvCxnSpPr/>
+          <p:nvPr/>
+        </p:nvCxnSpPr>
+        <p:spPr>
+          <a:xfrm>
+            <a:off x="88121" y="3492642"/>
+            <a:ext cx="679837" cy="0"/>
+          </a:xfrm>
+          <a:prstGeom prst="straightConnector1">
+            <a:avLst/>
+          </a:prstGeom>
+          <a:ln w="83820">
+            <a:solidFill>
+              <a:schemeClr val="tx1"/>
+            </a:solidFill>
+            <a:prstDash val="solid"/>
+            <a:tailEnd type="triangle" w="lg" len="lg"/>
+          </a:ln>
+        </p:spPr>
+        <p:style>
+          <a:lnRef idx="1">
+            <a:schemeClr val="accent1"/>
+          </a:lnRef>
+          <a:fillRef idx="0">
+            <a:schemeClr val="accent1"/>
+          </a:fillRef>
+          <a:effectRef idx="0">
+            <a:schemeClr val="accent1"/>
+          </a:effectRef>
+          <a:fontRef idx="minor">
+            <a:schemeClr val="tx1"/>
+          </a:fontRef>
+        </p:style>
+      </p:cxnSp>
+      <p:cxnSp>
+        <p:nvCxnSpPr>
+          <p:cNvPr id="8" name="Straight Arrow Connector 7"/>
+          <p:cNvCxnSpPr/>
+          <p:nvPr/>
+        </p:nvCxnSpPr>
+        <p:spPr>
+          <a:xfrm>
+            <a:off x="2065621" y="1127640"/>
+            <a:ext cx="626358" cy="725109"/>
+          </a:xfrm>
+          <a:prstGeom prst="straightConnector1">
+            <a:avLst/>
+          </a:prstGeom>
+          <a:ln w="83820">
+            <a:solidFill>
+              <a:schemeClr val="tx1"/>
+            </a:solidFill>
+            <a:prstDash val="solid"/>
+            <a:tailEnd type="triangle" w="lg" len="lg"/>
+          </a:ln>
+        </p:spPr>
+        <p:style>
+          <a:lnRef idx="1">
+            <a:schemeClr val="accent1"/>
+          </a:lnRef>
+          <a:fillRef idx="0">
+            <a:schemeClr val="accent1"/>
+          </a:fillRef>
+          <a:effectRef idx="0">
+            <a:schemeClr val="accent1"/>
+          </a:effectRef>
+          <a:fontRef idx="minor">
+            <a:schemeClr val="tx1"/>
+          </a:fontRef>
+        </p:style>
+      </p:cxnSp>
+      <p:cxnSp>
+        <p:nvCxnSpPr>
+          <p:cNvPr id="9" name="Straight Arrow Connector 8"/>
+          <p:cNvCxnSpPr/>
+          <p:nvPr/>
+        </p:nvCxnSpPr>
+        <p:spPr>
+          <a:xfrm flipV="1">
+            <a:off x="2065621" y="2770335"/>
+            <a:ext cx="626358" cy="722307"/>
+          </a:xfrm>
+          <a:prstGeom prst="straightConnector1">
+            <a:avLst/>
+          </a:prstGeom>
+          <a:ln w="28575">
+            <a:solidFill>
+              <a:schemeClr val="tx1"/>
+            </a:solidFill>
+            <a:prstDash val="sysDot"/>
+            <a:tailEnd type="triangle" w="lg" len="lg"/>
+          </a:ln>
+        </p:spPr>
+        <p:style>
+          <a:lnRef idx="1">
+            <a:schemeClr val="accent1"/>
+          </a:lnRef>
+          <a:fillRef idx="0">
+            <a:schemeClr val="accent1"/>
+          </a:fillRef>
+          <a:effectRef idx="0">
+            <a:schemeClr val="accent1"/>
+          </a:effectRef>
+          <a:fontRef idx="minor">
+            <a:schemeClr val="tx1"/>
+          </a:fontRef>
+        </p:style>
+      </p:cxnSp>
+      <p:cxnSp>
+        <p:nvCxnSpPr>
+          <p:cNvPr id="11" name="Straight Arrow Connector 10"/>
+          <p:cNvCxnSpPr/>
+          <p:nvPr/>
+        </p:nvCxnSpPr>
+        <p:spPr>
+          <a:xfrm flipH="1">
+            <a:off x="3799603" y="2311542"/>
+            <a:ext cx="678180" cy="0"/>
+          </a:xfrm>
+          <a:prstGeom prst="straightConnector1">
+            <a:avLst/>
+          </a:prstGeom>
+          <a:ln w="28575">
+            <a:solidFill>
+              <a:schemeClr val="tx1"/>
+            </a:solidFill>
+            <a:prstDash val="sysDot"/>
+            <a:tailEnd type="triangle" w="lg" len="lg"/>
+          </a:ln>
+        </p:spPr>
+        <p:style>
+          <a:lnRef idx="1">
+            <a:schemeClr val="accent1"/>
+          </a:lnRef>
+          <a:fillRef idx="0">
+            <a:schemeClr val="accent1"/>
+          </a:fillRef>
+          <a:effectRef idx="0">
+            <a:schemeClr val="accent1"/>
+          </a:effectRef>
+          <a:fontRef idx="minor">
+            <a:schemeClr val="tx1"/>
+          </a:fontRef>
+        </p:style>
+      </p:cxnSp>
+    </p:spTree>
+    <p:extLst>
+      <p:ext uri="{BB962C8B-B14F-4D97-AF65-F5344CB8AC3E}">
+        <p14:creationId xmlns:p14="http://schemas.microsoft.com/office/powerpoint/2010/main" val="947466461"/>
       </p:ext>
     </p:extLst>
   </p:cSld>
@@ -4094,19 +4869,23 @@
       </p:grpSpPr>
       <p:sp>
         <p:nvSpPr>
-          <p:cNvPr id="4" name="Oval 3"/>
+          <p:cNvPr id="29" name="Oval 28"/>
           <p:cNvSpPr/>
           <p:nvPr/>
         </p:nvSpPr>
         <p:spPr>
           <a:xfrm>
-            <a:off x="804913" y="363072"/>
-            <a:ext cx="1557196" cy="1557196"/>
+            <a:off x="767958" y="478808"/>
+            <a:ext cx="1297663" cy="1297663"/>
           </a:xfrm>
           <a:prstGeom prst="ellipse">
             <a:avLst/>
           </a:prstGeom>
-          <a:noFill/>
+          <a:solidFill>
+            <a:schemeClr val="bg1">
+              <a:lumMod val="75000"/>
+            </a:schemeClr>
+          </a:solidFill>
           <a:ln w="38100">
             <a:solidFill>
               <a:schemeClr val="tx1"/>
@@ -4130,7 +4909,7 @@
           </a:fontRef>
         </p:style>
         <p:txBody>
-          <a:bodyPr rot="0" spcFirstLastPara="0" vertOverflow="overflow" horzOverflow="overflow" vert="horz" wrap="square" lIns="91440" tIns="45720" rIns="91440" bIns="45720" numCol="1" spcCol="0" rtlCol="0" fromWordArt="0" anchor="ctr" anchorCtr="0" forceAA="0" compatLnSpc="1">
+          <a:bodyPr rot="0" spcFirstLastPara="0" vertOverflow="overflow" horzOverflow="overflow" vert="horz" wrap="square" lIns="76200" tIns="38100" rIns="76200" bIns="38100" numCol="1" spcCol="0" rtlCol="0" fromWordArt="0" anchor="ctr" anchorCtr="0" forceAA="0" compatLnSpc="1">
             <a:prstTxWarp prst="textNoShape">
               <a:avLst/>
             </a:prstTxWarp>
@@ -4140,7 +4919,7 @@
           <a:p>
             <a:pPr algn="ctr"/>
             <a:r>
-              <a:rPr lang="en-US" sz="8000" dirty="0">
+              <a:rPr lang="en-US" sz="6666" dirty="0">
                 <a:solidFill>
                   <a:srgbClr val="C00000"/>
                 </a:solidFill>
@@ -4152,19 +4931,23 @@
       </p:sp>
       <p:sp>
         <p:nvSpPr>
-          <p:cNvPr id="5" name="Oval 4"/>
+          <p:cNvPr id="30" name="Oval 29"/>
           <p:cNvSpPr/>
           <p:nvPr/>
         </p:nvSpPr>
         <p:spPr>
           <a:xfrm>
-            <a:off x="804913" y="2649072"/>
-            <a:ext cx="1557196" cy="1557196"/>
+            <a:off x="767958" y="2843810"/>
+            <a:ext cx="1297663" cy="1297663"/>
           </a:xfrm>
           <a:prstGeom prst="ellipse">
             <a:avLst/>
           </a:prstGeom>
-          <a:noFill/>
+          <a:solidFill>
+            <a:schemeClr val="bg1">
+              <a:lumMod val="75000"/>
+            </a:schemeClr>
+          </a:solidFill>
           <a:ln w="38100">
             <a:solidFill>
               <a:schemeClr val="tx1"/>
@@ -4188,7 +4971,7 @@
           </a:fontRef>
         </p:style>
         <p:txBody>
-          <a:bodyPr rot="0" spcFirstLastPara="0" vertOverflow="overflow" horzOverflow="overflow" vert="horz" wrap="square" lIns="91440" tIns="45720" rIns="91440" bIns="45720" numCol="1" spcCol="0" rtlCol="0" fromWordArt="0" anchor="ctr" anchorCtr="0" forceAA="0" compatLnSpc="1">
+          <a:bodyPr rot="0" spcFirstLastPara="0" vertOverflow="overflow" horzOverflow="overflow" vert="horz" wrap="square" lIns="76200" tIns="38100" rIns="76200" bIns="38100" numCol="1" spcCol="0" rtlCol="0" fromWordArt="0" anchor="ctr" anchorCtr="0" forceAA="0" compatLnSpc="1">
             <a:prstTxWarp prst="textNoShape">
               <a:avLst/>
             </a:prstTxWarp>
@@ -4198,7 +4981,7 @@
           <a:p>
             <a:pPr algn="ctr"/>
             <a:r>
-              <a:rPr lang="en-US" sz="8000" dirty="0">
+              <a:rPr lang="en-US" sz="6666" dirty="0">
                 <a:solidFill>
                   <a:srgbClr val="C00000"/>
                 </a:solidFill>
@@ -4210,19 +4993,23 @@
       </p:sp>
       <p:sp>
         <p:nvSpPr>
-          <p:cNvPr id="6" name="Oval 5"/>
+          <p:cNvPr id="31" name="Oval 30"/>
           <p:cNvSpPr/>
           <p:nvPr/>
         </p:nvSpPr>
         <p:spPr>
           <a:xfrm>
-            <a:off x="2885696" y="1506072"/>
-            <a:ext cx="1557196" cy="1557196"/>
+            <a:off x="2501941" y="1662710"/>
+            <a:ext cx="1297663" cy="1297663"/>
           </a:xfrm>
           <a:prstGeom prst="ellipse">
             <a:avLst/>
           </a:prstGeom>
-          <a:noFill/>
+          <a:solidFill>
+            <a:schemeClr val="bg1">
+              <a:lumMod val="75000"/>
+            </a:schemeClr>
+          </a:solidFill>
           <a:ln w="38100">
             <a:solidFill>
               <a:schemeClr val="tx1"/>
@@ -4246,7 +5033,7 @@
           </a:fontRef>
         </p:style>
         <p:txBody>
-          <a:bodyPr rot="0" spcFirstLastPara="0" vertOverflow="overflow" horzOverflow="overflow" vert="horz" wrap="square" lIns="91440" tIns="45720" rIns="91440" bIns="45720" numCol="1" spcCol="0" rtlCol="0" fromWordArt="0" anchor="ctr" anchorCtr="0" forceAA="0" compatLnSpc="1">
+          <a:bodyPr rot="0" spcFirstLastPara="0" vertOverflow="overflow" horzOverflow="overflow" vert="horz" wrap="square" lIns="76200" tIns="38100" rIns="76200" bIns="38100" numCol="1" spcCol="0" rtlCol="0" fromWordArt="0" anchor="ctr" anchorCtr="0" forceAA="0" compatLnSpc="1">
             <a:prstTxWarp prst="textNoShape">
               <a:avLst/>
             </a:prstTxWarp>
@@ -4256,7 +5043,7 @@
           <a:p>
             <a:pPr algn="ctr"/>
             <a:r>
-              <a:rPr lang="en-US" sz="8000" dirty="0">
+              <a:rPr lang="en-US" sz="6666" dirty="0">
                 <a:solidFill>
                   <a:srgbClr val="C00000"/>
                 </a:solidFill>
@@ -4268,17 +5055,17 @@
       </p:sp>
       <p:cxnSp>
         <p:nvCxnSpPr>
-          <p:cNvPr id="8" name="Straight Arrow Connector 7"/>
+          <p:cNvPr id="32" name="Straight Arrow Connector 31"/>
           <p:cNvCxnSpPr>
-            <a:stCxn id="4" idx="6"/>
-            <a:endCxn id="6" idx="1"/>
+            <a:stCxn id="29" idx="6"/>
+            <a:endCxn id="31" idx="1"/>
           </p:cNvCxnSpPr>
           <p:nvPr/>
         </p:nvCxnSpPr>
         <p:spPr>
           <a:xfrm>
-            <a:off x="2362111" y="1141668"/>
-            <a:ext cx="751633" cy="592449"/>
+            <a:off x="2065621" y="1127640"/>
+            <a:ext cx="626358" cy="725109"/>
           </a:xfrm>
           <a:prstGeom prst="straightConnector1">
             <a:avLst/>
@@ -4308,17 +5095,17 @@
       </p:cxnSp>
       <p:cxnSp>
         <p:nvCxnSpPr>
-          <p:cNvPr id="9" name="Straight Arrow Connector 8"/>
+          <p:cNvPr id="33" name="Straight Arrow Connector 32"/>
           <p:cNvCxnSpPr>
-            <a:stCxn id="5" idx="6"/>
-            <a:endCxn id="6" idx="3"/>
+            <a:stCxn id="30" idx="6"/>
+            <a:endCxn id="31" idx="3"/>
           </p:cNvCxnSpPr>
           <p:nvPr/>
         </p:nvCxnSpPr>
         <p:spPr>
           <a:xfrm flipV="1">
-            <a:off x="2362111" y="2835221"/>
-            <a:ext cx="751633" cy="592449"/>
+            <a:off x="2065621" y="2770335"/>
+            <a:ext cx="626358" cy="722307"/>
           </a:xfrm>
           <a:prstGeom prst="straightConnector1">
             <a:avLst/>
@@ -4349,7 +5136,7 @@
     </p:spTree>
     <p:extLst>
       <p:ext uri="{BB962C8B-B14F-4D97-AF65-F5344CB8AC3E}">
-        <p14:creationId xmlns:p14="http://schemas.microsoft.com/office/powerpoint/2010/main" val="1990191109"/>
+        <p14:creationId xmlns:p14="http://schemas.microsoft.com/office/powerpoint/2010/main" val="1134826545"/>
       </p:ext>
     </p:extLst>
   </p:cSld>
@@ -4378,19 +5165,23 @@
       </p:grpSpPr>
       <p:sp>
         <p:nvSpPr>
-          <p:cNvPr id="4" name="Oval 3"/>
+          <p:cNvPr id="29" name="Oval 28"/>
           <p:cNvSpPr/>
           <p:nvPr/>
         </p:nvSpPr>
         <p:spPr>
           <a:xfrm>
-            <a:off x="804913" y="363072"/>
-            <a:ext cx="1557196" cy="1557196"/>
+            <a:off x="767958" y="478808"/>
+            <a:ext cx="1297663" cy="1297663"/>
           </a:xfrm>
           <a:prstGeom prst="ellipse">
             <a:avLst/>
           </a:prstGeom>
-          <a:noFill/>
+          <a:solidFill>
+            <a:schemeClr val="bg1">
+              <a:lumMod val="75000"/>
+            </a:schemeClr>
+          </a:solidFill>
           <a:ln w="38100">
             <a:solidFill>
               <a:schemeClr val="tx1"/>
@@ -4414,7 +5205,7 @@
           </a:fontRef>
         </p:style>
         <p:txBody>
-          <a:bodyPr rot="0" spcFirstLastPara="0" vertOverflow="overflow" horzOverflow="overflow" vert="horz" wrap="square" lIns="91440" tIns="45720" rIns="91440" bIns="45720" numCol="1" spcCol="0" rtlCol="0" fromWordArt="0" anchor="ctr" anchorCtr="0" forceAA="0" compatLnSpc="1">
+          <a:bodyPr rot="0" spcFirstLastPara="0" vertOverflow="overflow" horzOverflow="overflow" vert="horz" wrap="square" lIns="76200" tIns="38100" rIns="76200" bIns="38100" numCol="1" spcCol="0" rtlCol="0" fromWordArt="0" anchor="ctr" anchorCtr="0" forceAA="0" compatLnSpc="1">
             <a:prstTxWarp prst="textNoShape">
               <a:avLst/>
             </a:prstTxWarp>
@@ -4424,7 +5215,7 @@
           <a:p>
             <a:pPr algn="ctr"/>
             <a:r>
-              <a:rPr lang="en-US" sz="8000" dirty="0">
+              <a:rPr lang="en-US" sz="6666" dirty="0">
                 <a:solidFill>
                   <a:srgbClr val="C00000"/>
                 </a:solidFill>
@@ -4436,19 +5227,23 @@
       </p:sp>
       <p:sp>
         <p:nvSpPr>
-          <p:cNvPr id="5" name="Oval 4"/>
+          <p:cNvPr id="30" name="Oval 29"/>
           <p:cNvSpPr/>
           <p:nvPr/>
         </p:nvSpPr>
         <p:spPr>
           <a:xfrm>
-            <a:off x="804913" y="2649072"/>
-            <a:ext cx="1557196" cy="1557196"/>
+            <a:off x="767958" y="2843810"/>
+            <a:ext cx="1297663" cy="1297663"/>
           </a:xfrm>
           <a:prstGeom prst="ellipse">
             <a:avLst/>
           </a:prstGeom>
-          <a:noFill/>
+          <a:solidFill>
+            <a:schemeClr val="bg1">
+              <a:lumMod val="75000"/>
+            </a:schemeClr>
+          </a:solidFill>
           <a:ln w="38100">
             <a:solidFill>
               <a:schemeClr val="tx1"/>
@@ -4472,7 +5267,7 @@
           </a:fontRef>
         </p:style>
         <p:txBody>
-          <a:bodyPr rot="0" spcFirstLastPara="0" vertOverflow="overflow" horzOverflow="overflow" vert="horz" wrap="square" lIns="91440" tIns="45720" rIns="91440" bIns="45720" numCol="1" spcCol="0" rtlCol="0" fromWordArt="0" anchor="ctr" anchorCtr="0" forceAA="0" compatLnSpc="1">
+          <a:bodyPr rot="0" spcFirstLastPara="0" vertOverflow="overflow" horzOverflow="overflow" vert="horz" wrap="square" lIns="76200" tIns="38100" rIns="76200" bIns="38100" numCol="1" spcCol="0" rtlCol="0" fromWordArt="0" anchor="ctr" anchorCtr="0" forceAA="0" compatLnSpc="1">
             <a:prstTxWarp prst="textNoShape">
               <a:avLst/>
             </a:prstTxWarp>
@@ -4482,7 +5277,7 @@
           <a:p>
             <a:pPr algn="ctr"/>
             <a:r>
-              <a:rPr lang="en-US" sz="8000" dirty="0">
+              <a:rPr lang="en-US" sz="6666" dirty="0">
                 <a:solidFill>
                   <a:srgbClr val="C00000"/>
                 </a:solidFill>
@@ -4494,19 +5289,23 @@
       </p:sp>
       <p:sp>
         <p:nvSpPr>
-          <p:cNvPr id="6" name="Oval 5"/>
+          <p:cNvPr id="31" name="Oval 30"/>
           <p:cNvSpPr/>
           <p:nvPr/>
         </p:nvSpPr>
         <p:spPr>
           <a:xfrm>
-            <a:off x="2885696" y="1506072"/>
-            <a:ext cx="1557196" cy="1557196"/>
+            <a:off x="2501941" y="1662710"/>
+            <a:ext cx="1297663" cy="1297663"/>
           </a:xfrm>
           <a:prstGeom prst="ellipse">
             <a:avLst/>
           </a:prstGeom>
-          <a:noFill/>
+          <a:solidFill>
+            <a:schemeClr val="bg1">
+              <a:lumMod val="75000"/>
+            </a:schemeClr>
+          </a:solidFill>
           <a:ln w="38100">
             <a:solidFill>
               <a:schemeClr val="tx1"/>
@@ -4530,7 +5329,7 @@
           </a:fontRef>
         </p:style>
         <p:txBody>
-          <a:bodyPr rot="0" spcFirstLastPara="0" vertOverflow="overflow" horzOverflow="overflow" vert="horz" wrap="square" lIns="91440" tIns="45720" rIns="91440" bIns="45720" numCol="1" spcCol="0" rtlCol="0" fromWordArt="0" anchor="ctr" anchorCtr="0" forceAA="0" compatLnSpc="1">
+          <a:bodyPr rot="0" spcFirstLastPara="0" vertOverflow="overflow" horzOverflow="overflow" vert="horz" wrap="square" lIns="76200" tIns="38100" rIns="76200" bIns="38100" numCol="1" spcCol="0" rtlCol="0" fromWordArt="0" anchor="ctr" anchorCtr="0" forceAA="0" compatLnSpc="1">
             <a:prstTxWarp prst="textNoShape">
               <a:avLst/>
             </a:prstTxWarp>
@@ -4540,7 +5339,7 @@
           <a:p>
             <a:pPr algn="ctr"/>
             <a:r>
-              <a:rPr lang="en-US" sz="8000" dirty="0">
+              <a:rPr lang="en-US" sz="6666" dirty="0">
                 <a:solidFill>
                   <a:srgbClr val="C00000"/>
                 </a:solidFill>
@@ -4552,17 +5351,17 @@
       </p:sp>
       <p:cxnSp>
         <p:nvCxnSpPr>
-          <p:cNvPr id="8" name="Straight Arrow Connector 7"/>
+          <p:cNvPr id="32" name="Straight Arrow Connector 31"/>
           <p:cNvCxnSpPr>
-            <a:stCxn id="4" idx="6"/>
-            <a:endCxn id="6" idx="1"/>
+            <a:stCxn id="29" idx="6"/>
+            <a:endCxn id="31" idx="1"/>
           </p:cNvCxnSpPr>
           <p:nvPr/>
         </p:nvCxnSpPr>
         <p:spPr>
           <a:xfrm>
-            <a:off x="2362111" y="1141668"/>
-            <a:ext cx="751633" cy="592449"/>
+            <a:off x="2065621" y="1127640"/>
+            <a:ext cx="626358" cy="725109"/>
           </a:xfrm>
           <a:prstGeom prst="straightConnector1">
             <a:avLst/>
@@ -4592,17 +5391,17 @@
       </p:cxnSp>
       <p:cxnSp>
         <p:nvCxnSpPr>
-          <p:cNvPr id="9" name="Straight Arrow Connector 8"/>
+          <p:cNvPr id="33" name="Straight Arrow Connector 32"/>
           <p:cNvCxnSpPr>
-            <a:stCxn id="5" idx="6"/>
-            <a:endCxn id="6" idx="3"/>
+            <a:stCxn id="30" idx="6"/>
+            <a:endCxn id="31" idx="3"/>
           </p:cNvCxnSpPr>
           <p:nvPr/>
         </p:nvCxnSpPr>
         <p:spPr>
           <a:xfrm flipV="1">
-            <a:off x="2362111" y="2835221"/>
-            <a:ext cx="751633" cy="592449"/>
+            <a:off x="2065621" y="2770335"/>
+            <a:ext cx="626358" cy="722307"/>
           </a:xfrm>
           <a:prstGeom prst="straightConnector1">
             <a:avLst/>
@@ -4633,7 +5432,7 @@
     </p:spTree>
     <p:extLst>
       <p:ext uri="{BB962C8B-B14F-4D97-AF65-F5344CB8AC3E}">
-        <p14:creationId xmlns:p14="http://schemas.microsoft.com/office/powerpoint/2010/main" val="1494059864"/>
+        <p14:creationId xmlns:p14="http://schemas.microsoft.com/office/powerpoint/2010/main" val="994839325"/>
       </p:ext>
     </p:extLst>
   </p:cSld>
@@ -4662,19 +5461,23 @@
       </p:grpSpPr>
       <p:sp>
         <p:nvSpPr>
-          <p:cNvPr id="4" name="Oval 3"/>
+          <p:cNvPr id="29" name="Oval 28"/>
           <p:cNvSpPr/>
           <p:nvPr/>
         </p:nvSpPr>
         <p:spPr>
           <a:xfrm>
-            <a:off x="804913" y="363072"/>
-            <a:ext cx="1557196" cy="1557196"/>
+            <a:off x="767958" y="478808"/>
+            <a:ext cx="1297663" cy="1297663"/>
           </a:xfrm>
           <a:prstGeom prst="ellipse">
             <a:avLst/>
           </a:prstGeom>
-          <a:noFill/>
+          <a:solidFill>
+            <a:schemeClr val="bg1">
+              <a:lumMod val="75000"/>
+            </a:schemeClr>
+          </a:solidFill>
           <a:ln w="38100">
             <a:solidFill>
               <a:schemeClr val="tx1"/>
@@ -4698,7 +5501,7 @@
           </a:fontRef>
         </p:style>
         <p:txBody>
-          <a:bodyPr rot="0" spcFirstLastPara="0" vertOverflow="overflow" horzOverflow="overflow" vert="horz" wrap="square" lIns="91440" tIns="45720" rIns="91440" bIns="45720" numCol="1" spcCol="0" rtlCol="0" fromWordArt="0" anchor="ctr" anchorCtr="0" forceAA="0" compatLnSpc="1">
+          <a:bodyPr rot="0" spcFirstLastPara="0" vertOverflow="overflow" horzOverflow="overflow" vert="horz" wrap="square" lIns="76200" tIns="38100" rIns="76200" bIns="38100" numCol="1" spcCol="0" rtlCol="0" fromWordArt="0" anchor="ctr" anchorCtr="0" forceAA="0" compatLnSpc="1">
             <a:prstTxWarp prst="textNoShape">
               <a:avLst/>
             </a:prstTxWarp>
@@ -4708,7 +5511,7 @@
           <a:p>
             <a:pPr algn="ctr"/>
             <a:r>
-              <a:rPr lang="en-US" sz="8000" dirty="0">
+              <a:rPr lang="en-US" sz="6666" dirty="0">
                 <a:solidFill>
                   <a:srgbClr val="C00000"/>
                 </a:solidFill>
@@ -4720,19 +5523,23 @@
       </p:sp>
       <p:sp>
         <p:nvSpPr>
-          <p:cNvPr id="5" name="Oval 4"/>
+          <p:cNvPr id="30" name="Oval 29"/>
           <p:cNvSpPr/>
           <p:nvPr/>
         </p:nvSpPr>
         <p:spPr>
           <a:xfrm>
-            <a:off x="804913" y="2649072"/>
-            <a:ext cx="1557196" cy="1557196"/>
+            <a:off x="767958" y="2843810"/>
+            <a:ext cx="1297663" cy="1297663"/>
           </a:xfrm>
           <a:prstGeom prst="ellipse">
             <a:avLst/>
           </a:prstGeom>
-          <a:noFill/>
+          <a:solidFill>
+            <a:schemeClr val="bg1">
+              <a:lumMod val="75000"/>
+            </a:schemeClr>
+          </a:solidFill>
           <a:ln w="38100">
             <a:solidFill>
               <a:schemeClr val="tx1"/>
@@ -4756,7 +5563,7 @@
           </a:fontRef>
         </p:style>
         <p:txBody>
-          <a:bodyPr rot="0" spcFirstLastPara="0" vertOverflow="overflow" horzOverflow="overflow" vert="horz" wrap="square" lIns="91440" tIns="45720" rIns="91440" bIns="45720" numCol="1" spcCol="0" rtlCol="0" fromWordArt="0" anchor="ctr" anchorCtr="0" forceAA="0" compatLnSpc="1">
+          <a:bodyPr rot="0" spcFirstLastPara="0" vertOverflow="overflow" horzOverflow="overflow" vert="horz" wrap="square" lIns="76200" tIns="38100" rIns="76200" bIns="38100" numCol="1" spcCol="0" rtlCol="0" fromWordArt="0" anchor="ctr" anchorCtr="0" forceAA="0" compatLnSpc="1">
             <a:prstTxWarp prst="textNoShape">
               <a:avLst/>
             </a:prstTxWarp>
@@ -4766,7 +5573,7 @@
           <a:p>
             <a:pPr algn="ctr"/>
             <a:r>
-              <a:rPr lang="en-US" sz="8000" dirty="0">
+              <a:rPr lang="en-US" sz="6666" dirty="0">
                 <a:solidFill>
                   <a:srgbClr val="C00000"/>
                 </a:solidFill>
@@ -4778,19 +5585,23 @@
       </p:sp>
       <p:sp>
         <p:nvSpPr>
-          <p:cNvPr id="6" name="Oval 5"/>
+          <p:cNvPr id="31" name="Oval 30"/>
           <p:cNvSpPr/>
           <p:nvPr/>
         </p:nvSpPr>
         <p:spPr>
           <a:xfrm>
-            <a:off x="2885696" y="1506072"/>
-            <a:ext cx="1557196" cy="1557196"/>
+            <a:off x="2501941" y="1662710"/>
+            <a:ext cx="1297663" cy="1297663"/>
           </a:xfrm>
           <a:prstGeom prst="ellipse">
             <a:avLst/>
           </a:prstGeom>
-          <a:noFill/>
+          <a:solidFill>
+            <a:schemeClr val="bg1">
+              <a:lumMod val="75000"/>
+            </a:schemeClr>
+          </a:solidFill>
           <a:ln w="38100">
             <a:solidFill>
               <a:schemeClr val="tx1"/>
@@ -4814,7 +5625,7 @@
           </a:fontRef>
         </p:style>
         <p:txBody>
-          <a:bodyPr rot="0" spcFirstLastPara="0" vertOverflow="overflow" horzOverflow="overflow" vert="horz" wrap="square" lIns="91440" tIns="45720" rIns="91440" bIns="45720" numCol="1" spcCol="0" rtlCol="0" fromWordArt="0" anchor="ctr" anchorCtr="0" forceAA="0" compatLnSpc="1">
+          <a:bodyPr rot="0" spcFirstLastPara="0" vertOverflow="overflow" horzOverflow="overflow" vert="horz" wrap="square" lIns="76200" tIns="38100" rIns="76200" bIns="38100" numCol="1" spcCol="0" rtlCol="0" fromWordArt="0" anchor="ctr" anchorCtr="0" forceAA="0" compatLnSpc="1">
             <a:prstTxWarp prst="textNoShape">
               <a:avLst/>
             </a:prstTxWarp>
@@ -4824,7 +5635,7 @@
           <a:p>
             <a:pPr algn="ctr"/>
             <a:r>
-              <a:rPr lang="en-US" sz="8000" dirty="0">
+              <a:rPr lang="en-US" sz="6666" dirty="0">
                 <a:solidFill>
                   <a:srgbClr val="C00000"/>
                 </a:solidFill>
@@ -4836,17 +5647,17 @@
       </p:sp>
       <p:cxnSp>
         <p:nvCxnSpPr>
-          <p:cNvPr id="8" name="Straight Arrow Connector 7"/>
+          <p:cNvPr id="32" name="Straight Arrow Connector 31"/>
           <p:cNvCxnSpPr>
-            <a:stCxn id="4" idx="6"/>
-            <a:endCxn id="6" idx="1"/>
+            <a:stCxn id="29" idx="6"/>
+            <a:endCxn id="31" idx="1"/>
           </p:cNvCxnSpPr>
           <p:nvPr/>
         </p:nvCxnSpPr>
         <p:spPr>
           <a:xfrm>
-            <a:off x="2362111" y="1141668"/>
-            <a:ext cx="751633" cy="592449"/>
+            <a:off x="2065621" y="1127640"/>
+            <a:ext cx="626358" cy="725109"/>
           </a:xfrm>
           <a:prstGeom prst="straightConnector1">
             <a:avLst/>
@@ -4876,14 +5687,17 @@
       </p:cxnSp>
       <p:cxnSp>
         <p:nvCxnSpPr>
-          <p:cNvPr id="7" name="Straight Arrow Connector 6"/>
-          <p:cNvCxnSpPr/>
+          <p:cNvPr id="33" name="Straight Arrow Connector 32"/>
+          <p:cNvCxnSpPr>
+            <a:stCxn id="30" idx="6"/>
+            <a:endCxn id="31" idx="3"/>
+          </p:cNvCxnSpPr>
           <p:nvPr/>
         </p:nvCxnSpPr>
         <p:spPr>
           <a:xfrm flipV="1">
-            <a:off x="2362111" y="2835221"/>
-            <a:ext cx="751633" cy="592449"/>
+            <a:off x="2065621" y="2770335"/>
+            <a:ext cx="626358" cy="722307"/>
           </a:xfrm>
           <a:prstGeom prst="straightConnector1">
             <a:avLst/>
@@ -4914,7 +5728,7 @@
     </p:spTree>
     <p:extLst>
       <p:ext uri="{BB962C8B-B14F-4D97-AF65-F5344CB8AC3E}">
-        <p14:creationId xmlns:p14="http://schemas.microsoft.com/office/powerpoint/2010/main" val="1508713581"/>
+        <p14:creationId xmlns:p14="http://schemas.microsoft.com/office/powerpoint/2010/main" val="2108899321"/>
       </p:ext>
     </p:extLst>
   </p:cSld>
@@ -4943,19 +5757,23 @@
       </p:grpSpPr>
       <p:sp>
         <p:nvSpPr>
-          <p:cNvPr id="4" name="Oval 3"/>
+          <p:cNvPr id="29" name="Oval 28"/>
           <p:cNvSpPr/>
           <p:nvPr/>
         </p:nvSpPr>
         <p:spPr>
           <a:xfrm>
-            <a:off x="804913" y="363072"/>
-            <a:ext cx="1557196" cy="1557196"/>
+            <a:off x="767958" y="478808"/>
+            <a:ext cx="1297663" cy="1297663"/>
           </a:xfrm>
           <a:prstGeom prst="ellipse">
             <a:avLst/>
           </a:prstGeom>
-          <a:noFill/>
+          <a:solidFill>
+            <a:schemeClr val="bg1">
+              <a:lumMod val="75000"/>
+            </a:schemeClr>
+          </a:solidFill>
           <a:ln w="38100">
             <a:solidFill>
               <a:schemeClr val="tx1"/>
@@ -4979,7 +5797,7 @@
           </a:fontRef>
         </p:style>
         <p:txBody>
-          <a:bodyPr rot="0" spcFirstLastPara="0" vertOverflow="overflow" horzOverflow="overflow" vert="horz" wrap="square" lIns="91440" tIns="45720" rIns="91440" bIns="45720" numCol="1" spcCol="0" rtlCol="0" fromWordArt="0" anchor="ctr" anchorCtr="0" forceAA="0" compatLnSpc="1">
+          <a:bodyPr rot="0" spcFirstLastPara="0" vertOverflow="overflow" horzOverflow="overflow" vert="horz" wrap="square" lIns="76200" tIns="38100" rIns="76200" bIns="38100" numCol="1" spcCol="0" rtlCol="0" fromWordArt="0" anchor="ctr" anchorCtr="0" forceAA="0" compatLnSpc="1">
             <a:prstTxWarp prst="textNoShape">
               <a:avLst/>
             </a:prstTxWarp>
@@ -4989,7 +5807,7 @@
           <a:p>
             <a:pPr algn="ctr"/>
             <a:r>
-              <a:rPr lang="en-US" sz="8000" dirty="0">
+              <a:rPr lang="en-US" sz="6666" dirty="0">
                 <a:solidFill>
                   <a:srgbClr val="C00000"/>
                 </a:solidFill>
@@ -5001,19 +5819,23 @@
       </p:sp>
       <p:sp>
         <p:nvSpPr>
-          <p:cNvPr id="5" name="Oval 4"/>
+          <p:cNvPr id="30" name="Oval 29"/>
           <p:cNvSpPr/>
           <p:nvPr/>
         </p:nvSpPr>
         <p:spPr>
           <a:xfrm>
-            <a:off x="804913" y="2649072"/>
-            <a:ext cx="1557196" cy="1557196"/>
+            <a:off x="767958" y="2843810"/>
+            <a:ext cx="1297663" cy="1297663"/>
           </a:xfrm>
           <a:prstGeom prst="ellipse">
             <a:avLst/>
           </a:prstGeom>
-          <a:noFill/>
+          <a:solidFill>
+            <a:schemeClr val="bg1">
+              <a:lumMod val="75000"/>
+            </a:schemeClr>
+          </a:solidFill>
           <a:ln w="38100">
             <a:solidFill>
               <a:schemeClr val="tx1"/>
@@ -5037,7 +5859,7 @@
           </a:fontRef>
         </p:style>
         <p:txBody>
-          <a:bodyPr rot="0" spcFirstLastPara="0" vertOverflow="overflow" horzOverflow="overflow" vert="horz" wrap="square" lIns="91440" tIns="45720" rIns="91440" bIns="45720" numCol="1" spcCol="0" rtlCol="0" fromWordArt="0" anchor="ctr" anchorCtr="0" forceAA="0" compatLnSpc="1">
+          <a:bodyPr rot="0" spcFirstLastPara="0" vertOverflow="overflow" horzOverflow="overflow" vert="horz" wrap="square" lIns="76200" tIns="38100" rIns="76200" bIns="38100" numCol="1" spcCol="0" rtlCol="0" fromWordArt="0" anchor="ctr" anchorCtr="0" forceAA="0" compatLnSpc="1">
             <a:prstTxWarp prst="textNoShape">
               <a:avLst/>
             </a:prstTxWarp>
@@ -5047,7 +5869,7 @@
           <a:p>
             <a:pPr algn="ctr"/>
             <a:r>
-              <a:rPr lang="en-US" sz="8000" dirty="0">
+              <a:rPr lang="en-US" sz="6666" dirty="0">
                 <a:solidFill>
                   <a:srgbClr val="C00000"/>
                 </a:solidFill>
@@ -5057,214 +5879,86 @@
           </a:p>
         </p:txBody>
       </p:sp>
-      <p:sp>
-        <p:nvSpPr>
-          <p:cNvPr id="15" name="Rectangle 14"/>
-          <p:cNvSpPr/>
+      <p:cxnSp>
+        <p:nvCxnSpPr>
+          <p:cNvPr id="45" name="Straight Arrow Connector 44"/>
+          <p:cNvCxnSpPr>
+            <a:endCxn id="29" idx="2"/>
+          </p:cNvCxnSpPr>
           <p:nvPr/>
-        </p:nvSpPr>
-        <p:spPr>
-          <a:xfrm>
-            <a:off x="178232" y="365760"/>
-            <a:ext cx="371959" cy="1554480"/>
-          </a:xfrm>
-          <a:prstGeom prst="rect">
+        </p:nvCxnSpPr>
+        <p:spPr>
+          <a:xfrm>
+            <a:off x="88121" y="1127639"/>
+            <a:ext cx="679837" cy="0"/>
+          </a:xfrm>
+          <a:prstGeom prst="straightConnector1">
             <a:avLst/>
           </a:prstGeom>
-          <a:noFill/>
-          <a:ln w="38100">
+          <a:ln w="28575">
             <a:solidFill>
               <a:schemeClr val="tx1"/>
             </a:solidFill>
+            <a:prstDash val="sysDot"/>
+            <a:tailEnd type="triangle" w="lg" len="lg"/>
           </a:ln>
         </p:spPr>
         <p:style>
-          <a:lnRef idx="2">
-            <a:schemeClr val="accent1">
-              <a:shade val="50000"/>
-            </a:schemeClr>
+          <a:lnRef idx="1">
+            <a:schemeClr val="accent1"/>
           </a:lnRef>
-          <a:fillRef idx="1">
+          <a:fillRef idx="0">
             <a:schemeClr val="accent1"/>
           </a:fillRef>
           <a:effectRef idx="0">
             <a:schemeClr val="accent1"/>
           </a:effectRef>
           <a:fontRef idx="minor">
-            <a:schemeClr val="lt1"/>
+            <a:schemeClr val="tx1"/>
           </a:fontRef>
         </p:style>
-        <p:txBody>
-          <a:bodyPr rot="0" spcFirstLastPara="0" vertOverflow="overflow" horzOverflow="overflow" vert="horz" wrap="square" lIns="91440" tIns="45720" rIns="91440" bIns="45720" numCol="1" spcCol="0" rtlCol="0" fromWordArt="0" anchor="ctr" anchorCtr="0" forceAA="0" compatLnSpc="1">
-            <a:prstTxWarp prst="textNoShape">
-              <a:avLst/>
-            </a:prstTxWarp>
-            <a:noAutofit/>
-          </a:bodyPr>
-          <a:lstStyle/>
-          <a:p>
-            <a:pPr algn="ctr"/>
-            <a:endParaRPr lang="en-US" sz="779"/>
-          </a:p>
-        </p:txBody>
-      </p:sp>
-      <p:sp>
-        <p:nvSpPr>
-          <p:cNvPr id="16" name="Rectangle 15"/>
-          <p:cNvSpPr/>
+      </p:cxnSp>
+      <p:cxnSp>
+        <p:nvCxnSpPr>
+          <p:cNvPr id="10" name="Straight Arrow Connector 9"/>
+          <p:cNvCxnSpPr/>
           <p:nvPr/>
-        </p:nvSpPr>
-        <p:spPr>
-          <a:xfrm>
-            <a:off x="173738" y="2651761"/>
-            <a:ext cx="371959" cy="1557196"/>
-          </a:xfrm>
-          <a:prstGeom prst="rect">
+        </p:nvCxnSpPr>
+        <p:spPr>
+          <a:xfrm>
+            <a:off x="88121" y="3492642"/>
+            <a:ext cx="679837" cy="0"/>
+          </a:xfrm>
+          <a:prstGeom prst="straightConnector1">
             <a:avLst/>
           </a:prstGeom>
-          <a:noFill/>
-          <a:ln w="38100">
+          <a:ln w="28575">
             <a:solidFill>
               <a:schemeClr val="tx1"/>
             </a:solidFill>
+            <a:prstDash val="sysDot"/>
+            <a:tailEnd type="triangle" w="lg" len="lg"/>
           </a:ln>
         </p:spPr>
         <p:style>
-          <a:lnRef idx="2">
-            <a:schemeClr val="accent1">
-              <a:shade val="50000"/>
-            </a:schemeClr>
+          <a:lnRef idx="1">
+            <a:schemeClr val="accent1"/>
           </a:lnRef>
-          <a:fillRef idx="1">
+          <a:fillRef idx="0">
             <a:schemeClr val="accent1"/>
           </a:fillRef>
           <a:effectRef idx="0">
             <a:schemeClr val="accent1"/>
           </a:effectRef>
           <a:fontRef idx="minor">
-            <a:schemeClr val="lt1"/>
+            <a:schemeClr val="tx1"/>
           </a:fontRef>
         </p:style>
-        <p:txBody>
-          <a:bodyPr rot="0" spcFirstLastPara="0" vertOverflow="overflow" horzOverflow="overflow" vert="horz" wrap="square" lIns="91440" tIns="45720" rIns="91440" bIns="45720" numCol="1" spcCol="0" rtlCol="0" fromWordArt="0" anchor="ctr" anchorCtr="0" forceAA="0" compatLnSpc="1">
-            <a:prstTxWarp prst="textNoShape">
-              <a:avLst/>
-            </a:prstTxWarp>
-            <a:noAutofit/>
-          </a:bodyPr>
-          <a:lstStyle/>
-          <a:p>
-            <a:pPr algn="ctr"/>
-            <a:endParaRPr lang="en-US" sz="779"/>
-          </a:p>
-        </p:txBody>
-      </p:sp>
-      <p:sp>
-        <p:nvSpPr>
-          <p:cNvPr id="18" name="Rectangle 17"/>
-          <p:cNvSpPr/>
-          <p:nvPr/>
-        </p:nvSpPr>
-        <p:spPr>
-          <a:xfrm>
-            <a:off x="173738" y="1599185"/>
-            <a:ext cx="371959" cy="310896"/>
-          </a:xfrm>
-          <a:prstGeom prst="rect">
-            <a:avLst/>
-          </a:prstGeom>
-          <a:solidFill>
-            <a:schemeClr val="tx1"/>
-          </a:solidFill>
-          <a:ln w="38100">
-            <a:noFill/>
-          </a:ln>
-        </p:spPr>
-        <p:style>
-          <a:lnRef idx="2">
-            <a:schemeClr val="accent1">
-              <a:shade val="50000"/>
-            </a:schemeClr>
-          </a:lnRef>
-          <a:fillRef idx="1">
-            <a:schemeClr val="accent1"/>
-          </a:fillRef>
-          <a:effectRef idx="0">
-            <a:schemeClr val="accent1"/>
-          </a:effectRef>
-          <a:fontRef idx="minor">
-            <a:schemeClr val="lt1"/>
-          </a:fontRef>
-        </p:style>
-        <p:txBody>
-          <a:bodyPr rot="0" spcFirstLastPara="0" vertOverflow="overflow" horzOverflow="overflow" vert="horz" wrap="square" lIns="91440" tIns="45720" rIns="91440" bIns="45720" numCol="1" spcCol="0" rtlCol="0" fromWordArt="0" anchor="ctr" anchorCtr="0" forceAA="0" compatLnSpc="1">
-            <a:prstTxWarp prst="textNoShape">
-              <a:avLst/>
-            </a:prstTxWarp>
-            <a:noAutofit/>
-          </a:bodyPr>
-          <a:lstStyle/>
-          <a:p>
-            <a:pPr algn="ctr"/>
-            <a:endParaRPr lang="en-US" sz="779"/>
-          </a:p>
-        </p:txBody>
-      </p:sp>
-      <p:sp>
-        <p:nvSpPr>
-          <p:cNvPr id="19" name="Rectangle 18"/>
-          <p:cNvSpPr/>
-          <p:nvPr/>
-        </p:nvSpPr>
-        <p:spPr>
-          <a:xfrm>
-            <a:off x="173738" y="3383307"/>
-            <a:ext cx="371959" cy="822960"/>
-          </a:xfrm>
-          <a:prstGeom prst="rect">
-            <a:avLst/>
-          </a:prstGeom>
-          <a:solidFill>
-            <a:schemeClr val="tx1"/>
-          </a:solidFill>
-          <a:ln w="38100">
-            <a:noFill/>
-          </a:ln>
-        </p:spPr>
-        <p:style>
-          <a:lnRef idx="2">
-            <a:schemeClr val="accent1">
-              <a:shade val="50000"/>
-            </a:schemeClr>
-          </a:lnRef>
-          <a:fillRef idx="1">
-            <a:schemeClr val="accent1"/>
-          </a:fillRef>
-          <a:effectRef idx="0">
-            <a:schemeClr val="accent1"/>
-          </a:effectRef>
-          <a:fontRef idx="minor">
-            <a:schemeClr val="lt1"/>
-          </a:fontRef>
-        </p:style>
-        <p:txBody>
-          <a:bodyPr rot="0" spcFirstLastPara="0" vertOverflow="overflow" horzOverflow="overflow" vert="horz" wrap="square" lIns="91440" tIns="45720" rIns="91440" bIns="45720" numCol="1" spcCol="0" rtlCol="0" fromWordArt="0" anchor="ctr" anchorCtr="0" forceAA="0" compatLnSpc="1">
-            <a:prstTxWarp prst="textNoShape">
-              <a:avLst/>
-            </a:prstTxWarp>
-            <a:noAutofit/>
-          </a:bodyPr>
-          <a:lstStyle/>
-          <a:p>
-            <a:pPr algn="ctr"/>
-            <a:endParaRPr lang="en-US" sz="779"/>
-          </a:p>
-        </p:txBody>
-      </p:sp>
+      </p:cxnSp>
     </p:spTree>
     <p:extLst>
       <p:ext uri="{BB962C8B-B14F-4D97-AF65-F5344CB8AC3E}">
-        <p14:creationId xmlns:p14="http://schemas.microsoft.com/office/powerpoint/2010/main" val="184877267"/>
+        <p14:creationId xmlns:p14="http://schemas.microsoft.com/office/powerpoint/2010/main" val="1680945878"/>
       </p:ext>
     </p:extLst>
   </p:cSld>
@@ -5293,19 +5987,23 @@
       </p:grpSpPr>
       <p:sp>
         <p:nvSpPr>
-          <p:cNvPr id="4" name="Oval 3"/>
+          <p:cNvPr id="29" name="Oval 28"/>
           <p:cNvSpPr/>
           <p:nvPr/>
         </p:nvSpPr>
         <p:spPr>
           <a:xfrm>
-            <a:off x="804913" y="363072"/>
-            <a:ext cx="1557196" cy="1557196"/>
+            <a:off x="767958" y="478808"/>
+            <a:ext cx="1297663" cy="1297663"/>
           </a:xfrm>
           <a:prstGeom prst="ellipse">
             <a:avLst/>
           </a:prstGeom>
-          <a:noFill/>
+          <a:solidFill>
+            <a:schemeClr val="bg1">
+              <a:lumMod val="75000"/>
+            </a:schemeClr>
+          </a:solidFill>
           <a:ln w="38100">
             <a:solidFill>
               <a:schemeClr val="tx1"/>
@@ -5329,7 +6027,7 @@
           </a:fontRef>
         </p:style>
         <p:txBody>
-          <a:bodyPr rot="0" spcFirstLastPara="0" vertOverflow="overflow" horzOverflow="overflow" vert="horz" wrap="square" lIns="91440" tIns="45720" rIns="91440" bIns="45720" numCol="1" spcCol="0" rtlCol="0" fromWordArt="0" anchor="ctr" anchorCtr="0" forceAA="0" compatLnSpc="1">
+          <a:bodyPr rot="0" spcFirstLastPara="0" vertOverflow="overflow" horzOverflow="overflow" vert="horz" wrap="square" lIns="76200" tIns="38100" rIns="76200" bIns="38100" numCol="1" spcCol="0" rtlCol="0" fromWordArt="0" anchor="ctr" anchorCtr="0" forceAA="0" compatLnSpc="1">
             <a:prstTxWarp prst="textNoShape">
               <a:avLst/>
             </a:prstTxWarp>
@@ -5339,7 +6037,7 @@
           <a:p>
             <a:pPr algn="ctr"/>
             <a:r>
-              <a:rPr lang="en-US" sz="8000" dirty="0">
+              <a:rPr lang="en-US" sz="6666" dirty="0">
                 <a:solidFill>
                   <a:srgbClr val="C00000"/>
                 </a:solidFill>
@@ -5351,19 +6049,23 @@
       </p:sp>
       <p:sp>
         <p:nvSpPr>
-          <p:cNvPr id="5" name="Oval 4"/>
+          <p:cNvPr id="30" name="Oval 29"/>
           <p:cNvSpPr/>
           <p:nvPr/>
         </p:nvSpPr>
         <p:spPr>
           <a:xfrm>
-            <a:off x="804913" y="2649072"/>
-            <a:ext cx="1557196" cy="1557196"/>
+            <a:off x="767958" y="2843810"/>
+            <a:ext cx="1297663" cy="1297663"/>
           </a:xfrm>
           <a:prstGeom prst="ellipse">
             <a:avLst/>
           </a:prstGeom>
-          <a:noFill/>
+          <a:solidFill>
+            <a:schemeClr val="bg1">
+              <a:lumMod val="75000"/>
+            </a:schemeClr>
+          </a:solidFill>
           <a:ln w="38100">
             <a:solidFill>
               <a:schemeClr val="tx1"/>
@@ -5387,7 +6089,7 @@
           </a:fontRef>
         </p:style>
         <p:txBody>
-          <a:bodyPr rot="0" spcFirstLastPara="0" vertOverflow="overflow" horzOverflow="overflow" vert="horz" wrap="square" lIns="91440" tIns="45720" rIns="91440" bIns="45720" numCol="1" spcCol="0" rtlCol="0" fromWordArt="0" anchor="ctr" anchorCtr="0" forceAA="0" compatLnSpc="1">
+          <a:bodyPr rot="0" spcFirstLastPara="0" vertOverflow="overflow" horzOverflow="overflow" vert="horz" wrap="square" lIns="76200" tIns="38100" rIns="76200" bIns="38100" numCol="1" spcCol="0" rtlCol="0" fromWordArt="0" anchor="ctr" anchorCtr="0" forceAA="0" compatLnSpc="1">
             <a:prstTxWarp prst="textNoShape">
               <a:avLst/>
             </a:prstTxWarp>
@@ -5397,7 +6099,7 @@
           <a:p>
             <a:pPr algn="ctr"/>
             <a:r>
-              <a:rPr lang="en-US" sz="8000" dirty="0">
+              <a:rPr lang="en-US" sz="6666" dirty="0">
                 <a:solidFill>
                   <a:srgbClr val="C00000"/>
                 </a:solidFill>
@@ -5407,77 +6109,18 @@
           </a:p>
         </p:txBody>
       </p:sp>
-      <p:sp>
-        <p:nvSpPr>
-          <p:cNvPr id="6" name="Oval 5"/>
-          <p:cNvSpPr/>
-          <p:nvPr/>
-        </p:nvSpPr>
-        <p:spPr>
-          <a:xfrm>
-            <a:off x="2885696" y="1506072"/>
-            <a:ext cx="1557196" cy="1557196"/>
-          </a:xfrm>
-          <a:prstGeom prst="ellipse">
-            <a:avLst/>
-          </a:prstGeom>
-          <a:noFill/>
-          <a:ln w="38100">
-            <a:solidFill>
-              <a:schemeClr val="tx1"/>
-            </a:solidFill>
-          </a:ln>
-        </p:spPr>
-        <p:style>
-          <a:lnRef idx="2">
-            <a:schemeClr val="accent1">
-              <a:shade val="50000"/>
-            </a:schemeClr>
-          </a:lnRef>
-          <a:fillRef idx="1">
-            <a:schemeClr val="accent1"/>
-          </a:fillRef>
-          <a:effectRef idx="0">
-            <a:schemeClr val="accent1"/>
-          </a:effectRef>
-          <a:fontRef idx="minor">
-            <a:schemeClr val="lt1"/>
-          </a:fontRef>
-        </p:style>
-        <p:txBody>
-          <a:bodyPr rot="0" spcFirstLastPara="0" vertOverflow="overflow" horzOverflow="overflow" vert="horz" wrap="square" lIns="91440" tIns="45720" rIns="91440" bIns="45720" numCol="1" spcCol="0" rtlCol="0" fromWordArt="0" anchor="ctr" anchorCtr="0" forceAA="0" compatLnSpc="1">
-            <a:prstTxWarp prst="textNoShape">
-              <a:avLst/>
-            </a:prstTxWarp>
-            <a:noAutofit/>
-          </a:bodyPr>
-          <a:lstStyle/>
-          <a:p>
-            <a:pPr algn="ctr"/>
-            <a:r>
-              <a:rPr lang="en-US" sz="8000" dirty="0">
-                <a:solidFill>
-                  <a:srgbClr val="C00000"/>
-                </a:solidFill>
-              </a:rPr>
-              <a:t>C</a:t>
-            </a:r>
-          </a:p>
-        </p:txBody>
-      </p:sp>
       <p:cxnSp>
         <p:nvCxnSpPr>
-          <p:cNvPr id="8" name="Straight Arrow Connector 7"/>
+          <p:cNvPr id="45" name="Straight Arrow Connector 44"/>
           <p:cNvCxnSpPr>
-            <a:stCxn id="4" idx="6"/>
-            <a:endCxn id="6" idx="1"/>
+            <a:endCxn id="29" idx="2"/>
           </p:cNvCxnSpPr>
           <p:nvPr/>
         </p:nvCxnSpPr>
         <p:spPr>
           <a:xfrm>
-            <a:off x="2362111" y="1141668"/>
-            <a:ext cx="751633" cy="592449"/>
+            <a:off x="88121" y="1127639"/>
+            <a:ext cx="679837" cy="0"/>
           </a:xfrm>
           <a:prstGeom prst="straightConnector1">
             <a:avLst/>
@@ -5505,21 +6148,92 @@
           </a:fontRef>
         </p:style>
       </p:cxnSp>
-      <p:sp>
-        <p:nvSpPr>
-          <p:cNvPr id="15" name="Rectangle 14"/>
+      <p:cxnSp>
+        <p:nvCxnSpPr>
+          <p:cNvPr id="10" name="Straight Arrow Connector 9"/>
+          <p:cNvCxnSpPr/>
+          <p:nvPr/>
+        </p:nvCxnSpPr>
+        <p:spPr>
+          <a:xfrm>
+            <a:off x="88121" y="3492642"/>
+            <a:ext cx="679837" cy="0"/>
+          </a:xfrm>
+          <a:prstGeom prst="straightConnector1">
+            <a:avLst/>
+          </a:prstGeom>
+          <a:ln w="45720">
+            <a:solidFill>
+              <a:schemeClr val="tx1"/>
+            </a:solidFill>
+            <a:prstDash val="solid"/>
+            <a:tailEnd type="triangle" w="lg" len="lg"/>
+          </a:ln>
+        </p:spPr>
+        <p:style>
+          <a:lnRef idx="1">
+            <a:schemeClr val="accent1"/>
+          </a:lnRef>
+          <a:fillRef idx="0">
+            <a:schemeClr val="accent1"/>
+          </a:fillRef>
+          <a:effectRef idx="0">
+            <a:schemeClr val="accent1"/>
+          </a:effectRef>
+          <a:fontRef idx="minor">
+            <a:schemeClr val="tx1"/>
+          </a:fontRef>
+        </p:style>
+      </p:cxnSp>
+    </p:spTree>
+    <p:extLst>
+      <p:ext uri="{BB962C8B-B14F-4D97-AF65-F5344CB8AC3E}">
+        <p14:creationId xmlns:p14="http://schemas.microsoft.com/office/powerpoint/2010/main" val="2118095873"/>
+      </p:ext>
+    </p:extLst>
+  </p:cSld>
+  <p:clrMapOvr>
+    <a:masterClrMapping/>
+  </p:clrMapOvr>
+</p:sld>
+</file>
+
+<file path=ppt/slides/slide7.xml><?xml version="1.0" encoding="utf-8"?>
+<p:sld xmlns:a="http://schemas.openxmlformats.org/drawingml/2006/main" xmlns:r="http://schemas.openxmlformats.org/officeDocument/2006/relationships" xmlns:p="http://schemas.openxmlformats.org/presentationml/2006/main">
+  <p:cSld>
+    <p:spTree>
+      <p:nvGrpSpPr>
+        <p:cNvPr id="1" name=""/>
+        <p:cNvGrpSpPr/>
+        <p:nvPr/>
+      </p:nvGrpSpPr>
+      <p:grpSpPr>
+        <a:xfrm>
+          <a:off x="0" y="0"/>
+          <a:ext cx="0" cy="0"/>
+          <a:chOff x="0" y="0"/>
+          <a:chExt cx="0" cy="0"/>
+        </a:xfrm>
+      </p:grpSpPr>
+      <p:sp>
+        <p:nvSpPr>
+          <p:cNvPr id="29" name="Oval 28"/>
           <p:cNvSpPr/>
           <p:nvPr/>
         </p:nvSpPr>
         <p:spPr>
           <a:xfrm>
-            <a:off x="178232" y="365760"/>
-            <a:ext cx="371959" cy="1554480"/>
-          </a:xfrm>
-          <a:prstGeom prst="rect">
+            <a:off x="767958" y="478808"/>
+            <a:ext cx="1297663" cy="1297663"/>
+          </a:xfrm>
+          <a:prstGeom prst="ellipse">
             <a:avLst/>
           </a:prstGeom>
-          <a:noFill/>
+          <a:solidFill>
+            <a:schemeClr val="bg1">
+              <a:lumMod val="75000"/>
+            </a:schemeClr>
+          </a:solidFill>
           <a:ln w="38100">
             <a:solidFill>
               <a:schemeClr val="tx1"/>
@@ -5543,7 +6257,7 @@
           </a:fontRef>
         </p:style>
         <p:txBody>
-          <a:bodyPr rot="0" spcFirstLastPara="0" vertOverflow="overflow" horzOverflow="overflow" vert="horz" wrap="square" lIns="91440" tIns="45720" rIns="91440" bIns="45720" numCol="1" spcCol="0" rtlCol="0" fromWordArt="0" anchor="ctr" anchorCtr="0" forceAA="0" compatLnSpc="1">
+          <a:bodyPr rot="0" spcFirstLastPara="0" vertOverflow="overflow" horzOverflow="overflow" vert="horz" wrap="square" lIns="76200" tIns="38100" rIns="76200" bIns="38100" numCol="1" spcCol="0" rtlCol="0" fromWordArt="0" anchor="ctr" anchorCtr="0" forceAA="0" compatLnSpc="1">
             <a:prstTxWarp prst="textNoShape">
               <a:avLst/>
             </a:prstTxWarp>
@@ -5552,25 +6266,36 @@
           <a:lstStyle/>
           <a:p>
             <a:pPr algn="ctr"/>
-            <a:endParaRPr lang="en-US" sz="779"/>
-          </a:p>
-        </p:txBody>
-      </p:sp>
-      <p:sp>
-        <p:nvSpPr>
-          <p:cNvPr id="16" name="Rectangle 15"/>
+            <a:r>
+              <a:rPr lang="en-US" sz="6666" dirty="0">
+                <a:solidFill>
+                  <a:srgbClr val="C00000"/>
+                </a:solidFill>
+              </a:rPr>
+              <a:t>A</a:t>
+            </a:r>
+          </a:p>
+        </p:txBody>
+      </p:sp>
+      <p:sp>
+        <p:nvSpPr>
+          <p:cNvPr id="30" name="Oval 29"/>
           <p:cNvSpPr/>
           <p:nvPr/>
         </p:nvSpPr>
         <p:spPr>
           <a:xfrm>
-            <a:off x="173738" y="2651761"/>
-            <a:ext cx="371959" cy="1557196"/>
-          </a:xfrm>
-          <a:prstGeom prst="rect">
+            <a:off x="767958" y="2843810"/>
+            <a:ext cx="1297663" cy="1297663"/>
+          </a:xfrm>
+          <a:prstGeom prst="ellipse">
             <a:avLst/>
           </a:prstGeom>
-          <a:noFill/>
+          <a:solidFill>
+            <a:schemeClr val="bg1">
+              <a:lumMod val="75000"/>
+            </a:schemeClr>
+          </a:solidFill>
           <a:ln w="38100">
             <a:solidFill>
               <a:schemeClr val="tx1"/>
@@ -5594,7 +6319,7 @@
           </a:fontRef>
         </p:style>
         <p:txBody>
-          <a:bodyPr rot="0" spcFirstLastPara="0" vertOverflow="overflow" horzOverflow="overflow" vert="horz" wrap="square" lIns="91440" tIns="45720" rIns="91440" bIns="45720" numCol="1" spcCol="0" rtlCol="0" fromWordArt="0" anchor="ctr" anchorCtr="0" forceAA="0" compatLnSpc="1">
+          <a:bodyPr rot="0" spcFirstLastPara="0" vertOverflow="overflow" horzOverflow="overflow" vert="horz" wrap="square" lIns="76200" tIns="38100" rIns="76200" bIns="38100" numCol="1" spcCol="0" rtlCol="0" fromWordArt="0" anchor="ctr" anchorCtr="0" forceAA="0" compatLnSpc="1">
             <a:prstTxWarp prst="textNoShape">
               <a:avLst/>
             </a:prstTxWarp>
@@ -5603,122 +6328,29 @@
           <a:lstStyle/>
           <a:p>
             <a:pPr algn="ctr"/>
-            <a:endParaRPr lang="en-US" sz="779"/>
-          </a:p>
-        </p:txBody>
-      </p:sp>
-      <p:sp>
-        <p:nvSpPr>
-          <p:cNvPr id="18" name="Rectangle 17"/>
-          <p:cNvSpPr/>
-          <p:nvPr/>
-        </p:nvSpPr>
-        <p:spPr>
-          <a:xfrm>
-            <a:off x="173738" y="721568"/>
-            <a:ext cx="371959" cy="1188513"/>
-          </a:xfrm>
-          <a:prstGeom prst="rect">
-            <a:avLst/>
-          </a:prstGeom>
-          <a:solidFill>
-            <a:schemeClr val="tx1"/>
-          </a:solidFill>
-          <a:ln w="38100">
-            <a:noFill/>
-          </a:ln>
-        </p:spPr>
-        <p:style>
-          <a:lnRef idx="2">
-            <a:schemeClr val="accent1">
-              <a:shade val="50000"/>
-            </a:schemeClr>
-          </a:lnRef>
-          <a:fillRef idx="1">
-            <a:schemeClr val="accent1"/>
-          </a:fillRef>
-          <a:effectRef idx="0">
-            <a:schemeClr val="accent1"/>
-          </a:effectRef>
-          <a:fontRef idx="minor">
-            <a:schemeClr val="lt1"/>
-          </a:fontRef>
-        </p:style>
-        <p:txBody>
-          <a:bodyPr rot="0" spcFirstLastPara="0" vertOverflow="overflow" horzOverflow="overflow" vert="horz" wrap="square" lIns="91440" tIns="45720" rIns="91440" bIns="45720" numCol="1" spcCol="0" rtlCol="0" fromWordArt="0" anchor="ctr" anchorCtr="0" forceAA="0" compatLnSpc="1">
-            <a:prstTxWarp prst="textNoShape">
-              <a:avLst/>
-            </a:prstTxWarp>
-            <a:noAutofit/>
-          </a:bodyPr>
-          <a:lstStyle/>
-          <a:p>
-            <a:pPr algn="ctr"/>
-            <a:endParaRPr lang="en-US" sz="779"/>
-          </a:p>
-        </p:txBody>
-      </p:sp>
-      <p:sp>
-        <p:nvSpPr>
-          <p:cNvPr id="19" name="Rectangle 18"/>
-          <p:cNvSpPr/>
-          <p:nvPr/>
-        </p:nvSpPr>
-        <p:spPr>
-          <a:xfrm>
-            <a:off x="173738" y="3918858"/>
-            <a:ext cx="371959" cy="287410"/>
-          </a:xfrm>
-          <a:prstGeom prst="rect">
-            <a:avLst/>
-          </a:prstGeom>
-          <a:solidFill>
-            <a:schemeClr val="tx1"/>
-          </a:solidFill>
-          <a:ln w="38100">
-            <a:noFill/>
-          </a:ln>
-        </p:spPr>
-        <p:style>
-          <a:lnRef idx="2">
-            <a:schemeClr val="accent1">
-              <a:shade val="50000"/>
-            </a:schemeClr>
-          </a:lnRef>
-          <a:fillRef idx="1">
-            <a:schemeClr val="accent1"/>
-          </a:fillRef>
-          <a:effectRef idx="0">
-            <a:schemeClr val="accent1"/>
-          </a:effectRef>
-          <a:fontRef idx="minor">
-            <a:schemeClr val="lt1"/>
-          </a:fontRef>
-        </p:style>
-        <p:txBody>
-          <a:bodyPr rot="0" spcFirstLastPara="0" vertOverflow="overflow" horzOverflow="overflow" vert="horz" wrap="square" lIns="91440" tIns="45720" rIns="91440" bIns="45720" numCol="1" spcCol="0" rtlCol="0" fromWordArt="0" anchor="ctr" anchorCtr="0" forceAA="0" compatLnSpc="1">
-            <a:prstTxWarp prst="textNoShape">
-              <a:avLst/>
-            </a:prstTxWarp>
-            <a:noAutofit/>
-          </a:bodyPr>
-          <a:lstStyle/>
-          <a:p>
-            <a:pPr algn="ctr"/>
-            <a:endParaRPr lang="en-US" sz="779"/>
+            <a:r>
+              <a:rPr lang="en-US" sz="6666" dirty="0">
+                <a:solidFill>
+                  <a:srgbClr val="C00000"/>
+                </a:solidFill>
+              </a:rPr>
+              <a:t>B</a:t>
+            </a:r>
           </a:p>
         </p:txBody>
       </p:sp>
       <p:cxnSp>
         <p:nvCxnSpPr>
-          <p:cNvPr id="11" name="Straight Arrow Connector 10"/>
-          <p:cNvCxnSpPr/>
+          <p:cNvPr id="45" name="Straight Arrow Connector 44"/>
+          <p:cNvCxnSpPr>
+            <a:endCxn id="29" idx="2"/>
+          </p:cNvCxnSpPr>
           <p:nvPr/>
         </p:nvCxnSpPr>
         <p:spPr>
-          <a:xfrm flipV="1">
-            <a:off x="2362111" y="2835221"/>
-            <a:ext cx="751633" cy="592449"/>
+          <a:xfrm>
+            <a:off x="88121" y="1127639"/>
+            <a:ext cx="679837" cy="0"/>
           </a:xfrm>
           <a:prstGeom prst="straightConnector1">
             <a:avLst/>
@@ -5746,10 +6378,643 @@
           </a:fontRef>
         </p:style>
       </p:cxnSp>
+      <p:cxnSp>
+        <p:nvCxnSpPr>
+          <p:cNvPr id="10" name="Straight Arrow Connector 9"/>
+          <p:cNvCxnSpPr/>
+          <p:nvPr/>
+        </p:nvCxnSpPr>
+        <p:spPr>
+          <a:xfrm>
+            <a:off x="88121" y="3492642"/>
+            <a:ext cx="679837" cy="0"/>
+          </a:xfrm>
+          <a:prstGeom prst="straightConnector1">
+            <a:avLst/>
+          </a:prstGeom>
+          <a:ln w="83820">
+            <a:solidFill>
+              <a:schemeClr val="tx1"/>
+            </a:solidFill>
+            <a:prstDash val="solid"/>
+            <a:tailEnd type="triangle" w="lg" len="lg"/>
+          </a:ln>
+        </p:spPr>
+        <p:style>
+          <a:lnRef idx="1">
+            <a:schemeClr val="accent1"/>
+          </a:lnRef>
+          <a:fillRef idx="0">
+            <a:schemeClr val="accent1"/>
+          </a:fillRef>
+          <a:effectRef idx="0">
+            <a:schemeClr val="accent1"/>
+          </a:effectRef>
+          <a:fontRef idx="minor">
+            <a:schemeClr val="tx1"/>
+          </a:fontRef>
+        </p:style>
+      </p:cxnSp>
     </p:spTree>
     <p:extLst>
       <p:ext uri="{BB962C8B-B14F-4D97-AF65-F5344CB8AC3E}">
-        <p14:creationId xmlns:p14="http://schemas.microsoft.com/office/powerpoint/2010/main" val="2046296599"/>
+        <p14:creationId xmlns:p14="http://schemas.microsoft.com/office/powerpoint/2010/main" val="1164482562"/>
+      </p:ext>
+    </p:extLst>
+  </p:cSld>
+  <p:clrMapOvr>
+    <a:masterClrMapping/>
+  </p:clrMapOvr>
+</p:sld>
+</file>
+
+<file path=ppt/slides/slide8.xml><?xml version="1.0" encoding="utf-8"?>
+<p:sld xmlns:a="http://schemas.openxmlformats.org/drawingml/2006/main" xmlns:r="http://schemas.openxmlformats.org/officeDocument/2006/relationships" xmlns:p="http://schemas.openxmlformats.org/presentationml/2006/main">
+  <p:cSld>
+    <p:spTree>
+      <p:nvGrpSpPr>
+        <p:cNvPr id="1" name=""/>
+        <p:cNvGrpSpPr/>
+        <p:nvPr/>
+      </p:nvGrpSpPr>
+      <p:grpSpPr>
+        <a:xfrm>
+          <a:off x="0" y="0"/>
+          <a:ext cx="0" cy="0"/>
+          <a:chOff x="0" y="0"/>
+          <a:chExt cx="0" cy="0"/>
+        </a:xfrm>
+      </p:grpSpPr>
+      <p:sp>
+        <p:nvSpPr>
+          <p:cNvPr id="29" name="Oval 28"/>
+          <p:cNvSpPr/>
+          <p:nvPr/>
+        </p:nvSpPr>
+        <p:spPr>
+          <a:xfrm>
+            <a:off x="767958" y="478808"/>
+            <a:ext cx="1297663" cy="1297663"/>
+          </a:xfrm>
+          <a:prstGeom prst="ellipse">
+            <a:avLst/>
+          </a:prstGeom>
+          <a:solidFill>
+            <a:schemeClr val="bg1">
+              <a:lumMod val="75000"/>
+            </a:schemeClr>
+          </a:solidFill>
+          <a:ln w="38100">
+            <a:solidFill>
+              <a:schemeClr val="tx1"/>
+            </a:solidFill>
+          </a:ln>
+        </p:spPr>
+        <p:style>
+          <a:lnRef idx="2">
+            <a:schemeClr val="accent1">
+              <a:shade val="50000"/>
+            </a:schemeClr>
+          </a:lnRef>
+          <a:fillRef idx="1">
+            <a:schemeClr val="accent1"/>
+          </a:fillRef>
+          <a:effectRef idx="0">
+            <a:schemeClr val="accent1"/>
+          </a:effectRef>
+          <a:fontRef idx="minor">
+            <a:schemeClr val="lt1"/>
+          </a:fontRef>
+        </p:style>
+        <p:txBody>
+          <a:bodyPr rot="0" spcFirstLastPara="0" vertOverflow="overflow" horzOverflow="overflow" vert="horz" wrap="square" lIns="76200" tIns="38100" rIns="76200" bIns="38100" numCol="1" spcCol="0" rtlCol="0" fromWordArt="0" anchor="ctr" anchorCtr="0" forceAA="0" compatLnSpc="1">
+            <a:prstTxWarp prst="textNoShape">
+              <a:avLst/>
+            </a:prstTxWarp>
+            <a:noAutofit/>
+          </a:bodyPr>
+          <a:lstStyle/>
+          <a:p>
+            <a:pPr algn="ctr"/>
+            <a:r>
+              <a:rPr lang="en-US" sz="6666" dirty="0">
+                <a:solidFill>
+                  <a:srgbClr val="C00000"/>
+                </a:solidFill>
+              </a:rPr>
+              <a:t>A</a:t>
+            </a:r>
+          </a:p>
+        </p:txBody>
+      </p:sp>
+      <p:sp>
+        <p:nvSpPr>
+          <p:cNvPr id="30" name="Oval 29"/>
+          <p:cNvSpPr/>
+          <p:nvPr/>
+        </p:nvSpPr>
+        <p:spPr>
+          <a:xfrm>
+            <a:off x="767958" y="2843810"/>
+            <a:ext cx="1297663" cy="1297663"/>
+          </a:xfrm>
+          <a:prstGeom prst="ellipse">
+            <a:avLst/>
+          </a:prstGeom>
+          <a:solidFill>
+            <a:schemeClr val="bg1">
+              <a:lumMod val="75000"/>
+            </a:schemeClr>
+          </a:solidFill>
+          <a:ln w="38100">
+            <a:solidFill>
+              <a:schemeClr val="tx1"/>
+            </a:solidFill>
+          </a:ln>
+        </p:spPr>
+        <p:style>
+          <a:lnRef idx="2">
+            <a:schemeClr val="accent1">
+              <a:shade val="50000"/>
+            </a:schemeClr>
+          </a:lnRef>
+          <a:fillRef idx="1">
+            <a:schemeClr val="accent1"/>
+          </a:fillRef>
+          <a:effectRef idx="0">
+            <a:schemeClr val="accent1"/>
+          </a:effectRef>
+          <a:fontRef idx="minor">
+            <a:schemeClr val="lt1"/>
+          </a:fontRef>
+        </p:style>
+        <p:txBody>
+          <a:bodyPr rot="0" spcFirstLastPara="0" vertOverflow="overflow" horzOverflow="overflow" vert="horz" wrap="square" lIns="76200" tIns="38100" rIns="76200" bIns="38100" numCol="1" spcCol="0" rtlCol="0" fromWordArt="0" anchor="ctr" anchorCtr="0" forceAA="0" compatLnSpc="1">
+            <a:prstTxWarp prst="textNoShape">
+              <a:avLst/>
+            </a:prstTxWarp>
+            <a:noAutofit/>
+          </a:bodyPr>
+          <a:lstStyle/>
+          <a:p>
+            <a:pPr algn="ctr"/>
+            <a:r>
+              <a:rPr lang="en-US" sz="6666" dirty="0">
+                <a:solidFill>
+                  <a:srgbClr val="C00000"/>
+                </a:solidFill>
+              </a:rPr>
+              <a:t>B</a:t>
+            </a:r>
+          </a:p>
+        </p:txBody>
+      </p:sp>
+      <p:cxnSp>
+        <p:nvCxnSpPr>
+          <p:cNvPr id="45" name="Straight Arrow Connector 44"/>
+          <p:cNvCxnSpPr>
+            <a:endCxn id="29" idx="2"/>
+          </p:cNvCxnSpPr>
+          <p:nvPr/>
+        </p:nvCxnSpPr>
+        <p:spPr>
+          <a:xfrm>
+            <a:off x="88121" y="1127639"/>
+            <a:ext cx="679837" cy="0"/>
+          </a:xfrm>
+          <a:prstGeom prst="straightConnector1">
+            <a:avLst/>
+          </a:prstGeom>
+          <a:ln w="45720">
+            <a:solidFill>
+              <a:schemeClr val="tx1"/>
+            </a:solidFill>
+            <a:prstDash val="solid"/>
+            <a:tailEnd type="triangle" w="lg" len="lg"/>
+          </a:ln>
+        </p:spPr>
+        <p:style>
+          <a:lnRef idx="1">
+            <a:schemeClr val="accent1"/>
+          </a:lnRef>
+          <a:fillRef idx="0">
+            <a:schemeClr val="accent1"/>
+          </a:fillRef>
+          <a:effectRef idx="0">
+            <a:schemeClr val="accent1"/>
+          </a:effectRef>
+          <a:fontRef idx="minor">
+            <a:schemeClr val="tx1"/>
+          </a:fontRef>
+        </p:style>
+      </p:cxnSp>
+      <p:cxnSp>
+        <p:nvCxnSpPr>
+          <p:cNvPr id="10" name="Straight Arrow Connector 9"/>
+          <p:cNvCxnSpPr/>
+          <p:nvPr/>
+        </p:nvCxnSpPr>
+        <p:spPr>
+          <a:xfrm>
+            <a:off x="88121" y="3492642"/>
+            <a:ext cx="679837" cy="0"/>
+          </a:xfrm>
+          <a:prstGeom prst="straightConnector1">
+            <a:avLst/>
+          </a:prstGeom>
+          <a:ln w="83820">
+            <a:solidFill>
+              <a:schemeClr val="tx1"/>
+            </a:solidFill>
+            <a:prstDash val="solid"/>
+            <a:tailEnd type="triangle" w="lg" len="lg"/>
+          </a:ln>
+        </p:spPr>
+        <p:style>
+          <a:lnRef idx="1">
+            <a:schemeClr val="accent1"/>
+          </a:lnRef>
+          <a:fillRef idx="0">
+            <a:schemeClr val="accent1"/>
+          </a:fillRef>
+          <a:effectRef idx="0">
+            <a:schemeClr val="accent1"/>
+          </a:effectRef>
+          <a:fontRef idx="minor">
+            <a:schemeClr val="tx1"/>
+          </a:fontRef>
+        </p:style>
+      </p:cxnSp>
+    </p:spTree>
+    <p:extLst>
+      <p:ext uri="{BB962C8B-B14F-4D97-AF65-F5344CB8AC3E}">
+        <p14:creationId xmlns:p14="http://schemas.microsoft.com/office/powerpoint/2010/main" val="1227040081"/>
+      </p:ext>
+    </p:extLst>
+  </p:cSld>
+  <p:clrMapOvr>
+    <a:masterClrMapping/>
+  </p:clrMapOvr>
+</p:sld>
+</file>
+
+<file path=ppt/slides/slide9.xml><?xml version="1.0" encoding="utf-8"?>
+<p:sld xmlns:a="http://schemas.openxmlformats.org/drawingml/2006/main" xmlns:r="http://schemas.openxmlformats.org/officeDocument/2006/relationships" xmlns:p="http://schemas.openxmlformats.org/presentationml/2006/main">
+  <p:cSld>
+    <p:spTree>
+      <p:nvGrpSpPr>
+        <p:cNvPr id="1" name=""/>
+        <p:cNvGrpSpPr/>
+        <p:nvPr/>
+      </p:nvGrpSpPr>
+      <p:grpSpPr>
+        <a:xfrm>
+          <a:off x="0" y="0"/>
+          <a:ext cx="0" cy="0"/>
+          <a:chOff x="0" y="0"/>
+          <a:chExt cx="0" cy="0"/>
+        </a:xfrm>
+      </p:grpSpPr>
+      <p:sp>
+        <p:nvSpPr>
+          <p:cNvPr id="29" name="Oval 28"/>
+          <p:cNvSpPr/>
+          <p:nvPr/>
+        </p:nvSpPr>
+        <p:spPr>
+          <a:xfrm>
+            <a:off x="767958" y="478808"/>
+            <a:ext cx="1297663" cy="1297663"/>
+          </a:xfrm>
+          <a:prstGeom prst="ellipse">
+            <a:avLst/>
+          </a:prstGeom>
+          <a:solidFill>
+            <a:schemeClr val="bg1">
+              <a:lumMod val="75000"/>
+            </a:schemeClr>
+          </a:solidFill>
+          <a:ln w="38100">
+            <a:solidFill>
+              <a:schemeClr val="tx1"/>
+            </a:solidFill>
+          </a:ln>
+        </p:spPr>
+        <p:style>
+          <a:lnRef idx="2">
+            <a:schemeClr val="accent1">
+              <a:shade val="50000"/>
+            </a:schemeClr>
+          </a:lnRef>
+          <a:fillRef idx="1">
+            <a:schemeClr val="accent1"/>
+          </a:fillRef>
+          <a:effectRef idx="0">
+            <a:schemeClr val="accent1"/>
+          </a:effectRef>
+          <a:fontRef idx="minor">
+            <a:schemeClr val="lt1"/>
+          </a:fontRef>
+        </p:style>
+        <p:txBody>
+          <a:bodyPr rot="0" spcFirstLastPara="0" vertOverflow="overflow" horzOverflow="overflow" vert="horz" wrap="square" lIns="76200" tIns="38100" rIns="76200" bIns="38100" numCol="1" spcCol="0" rtlCol="0" fromWordArt="0" anchor="ctr" anchorCtr="0" forceAA="0" compatLnSpc="1">
+            <a:prstTxWarp prst="textNoShape">
+              <a:avLst/>
+            </a:prstTxWarp>
+            <a:noAutofit/>
+          </a:bodyPr>
+          <a:lstStyle/>
+          <a:p>
+            <a:pPr algn="ctr"/>
+            <a:r>
+              <a:rPr lang="en-US" sz="6666" dirty="0">
+                <a:solidFill>
+                  <a:srgbClr val="C00000"/>
+                </a:solidFill>
+              </a:rPr>
+              <a:t>A</a:t>
+            </a:r>
+          </a:p>
+        </p:txBody>
+      </p:sp>
+      <p:sp>
+        <p:nvSpPr>
+          <p:cNvPr id="30" name="Oval 29"/>
+          <p:cNvSpPr/>
+          <p:nvPr/>
+        </p:nvSpPr>
+        <p:spPr>
+          <a:xfrm>
+            <a:off x="767958" y="2843810"/>
+            <a:ext cx="1297663" cy="1297663"/>
+          </a:xfrm>
+          <a:prstGeom prst="ellipse">
+            <a:avLst/>
+          </a:prstGeom>
+          <a:solidFill>
+            <a:schemeClr val="bg1">
+              <a:lumMod val="75000"/>
+            </a:schemeClr>
+          </a:solidFill>
+          <a:ln w="38100">
+            <a:solidFill>
+              <a:schemeClr val="tx1"/>
+            </a:solidFill>
+          </a:ln>
+        </p:spPr>
+        <p:style>
+          <a:lnRef idx="2">
+            <a:schemeClr val="accent1">
+              <a:shade val="50000"/>
+            </a:schemeClr>
+          </a:lnRef>
+          <a:fillRef idx="1">
+            <a:schemeClr val="accent1"/>
+          </a:fillRef>
+          <a:effectRef idx="0">
+            <a:schemeClr val="accent1"/>
+          </a:effectRef>
+          <a:fontRef idx="minor">
+            <a:schemeClr val="lt1"/>
+          </a:fontRef>
+        </p:style>
+        <p:txBody>
+          <a:bodyPr rot="0" spcFirstLastPara="0" vertOverflow="overflow" horzOverflow="overflow" vert="horz" wrap="square" lIns="76200" tIns="38100" rIns="76200" bIns="38100" numCol="1" spcCol="0" rtlCol="0" fromWordArt="0" anchor="ctr" anchorCtr="0" forceAA="0" compatLnSpc="1">
+            <a:prstTxWarp prst="textNoShape">
+              <a:avLst/>
+            </a:prstTxWarp>
+            <a:noAutofit/>
+          </a:bodyPr>
+          <a:lstStyle/>
+          <a:p>
+            <a:pPr algn="ctr"/>
+            <a:r>
+              <a:rPr lang="en-US" sz="6666" dirty="0">
+                <a:solidFill>
+                  <a:srgbClr val="C00000"/>
+                </a:solidFill>
+              </a:rPr>
+              <a:t>B</a:t>
+            </a:r>
+          </a:p>
+        </p:txBody>
+      </p:sp>
+      <p:sp>
+        <p:nvSpPr>
+          <p:cNvPr id="31" name="Oval 30"/>
+          <p:cNvSpPr/>
+          <p:nvPr/>
+        </p:nvSpPr>
+        <p:spPr>
+          <a:xfrm>
+            <a:off x="2501941" y="1662710"/>
+            <a:ext cx="1297663" cy="1297663"/>
+          </a:xfrm>
+          <a:prstGeom prst="ellipse">
+            <a:avLst/>
+          </a:prstGeom>
+          <a:solidFill>
+            <a:schemeClr val="bg1">
+              <a:lumMod val="75000"/>
+            </a:schemeClr>
+          </a:solidFill>
+          <a:ln w="38100">
+            <a:solidFill>
+              <a:schemeClr val="tx1"/>
+            </a:solidFill>
+          </a:ln>
+        </p:spPr>
+        <p:style>
+          <a:lnRef idx="2">
+            <a:schemeClr val="accent1">
+              <a:shade val="50000"/>
+            </a:schemeClr>
+          </a:lnRef>
+          <a:fillRef idx="1">
+            <a:schemeClr val="accent1"/>
+          </a:fillRef>
+          <a:effectRef idx="0">
+            <a:schemeClr val="accent1"/>
+          </a:effectRef>
+          <a:fontRef idx="minor">
+            <a:schemeClr val="lt1"/>
+          </a:fontRef>
+        </p:style>
+        <p:txBody>
+          <a:bodyPr rot="0" spcFirstLastPara="0" vertOverflow="overflow" horzOverflow="overflow" vert="horz" wrap="square" lIns="76200" tIns="38100" rIns="76200" bIns="38100" numCol="1" spcCol="0" rtlCol="0" fromWordArt="0" anchor="ctr" anchorCtr="0" forceAA="0" compatLnSpc="1">
+            <a:prstTxWarp prst="textNoShape">
+              <a:avLst/>
+            </a:prstTxWarp>
+            <a:noAutofit/>
+          </a:bodyPr>
+          <a:lstStyle/>
+          <a:p>
+            <a:pPr algn="ctr"/>
+            <a:r>
+              <a:rPr lang="en-US" sz="6666" dirty="0">
+                <a:solidFill>
+                  <a:srgbClr val="C00000"/>
+                </a:solidFill>
+              </a:rPr>
+              <a:t>C</a:t>
+            </a:r>
+          </a:p>
+        </p:txBody>
+      </p:sp>
+      <p:cxnSp>
+        <p:nvCxnSpPr>
+          <p:cNvPr id="45" name="Straight Arrow Connector 44"/>
+          <p:cNvCxnSpPr>
+            <a:endCxn id="29" idx="2"/>
+          </p:cNvCxnSpPr>
+          <p:nvPr/>
+        </p:nvCxnSpPr>
+        <p:spPr>
+          <a:xfrm>
+            <a:off x="88121" y="1127639"/>
+            <a:ext cx="679837" cy="0"/>
+          </a:xfrm>
+          <a:prstGeom prst="straightConnector1">
+            <a:avLst/>
+          </a:prstGeom>
+          <a:ln w="45720">
+            <a:solidFill>
+              <a:schemeClr val="tx1"/>
+            </a:solidFill>
+            <a:prstDash val="solid"/>
+            <a:tailEnd type="triangle" w="lg" len="lg"/>
+          </a:ln>
+        </p:spPr>
+        <p:style>
+          <a:lnRef idx="1">
+            <a:schemeClr val="accent1"/>
+          </a:lnRef>
+          <a:fillRef idx="0">
+            <a:schemeClr val="accent1"/>
+          </a:fillRef>
+          <a:effectRef idx="0">
+            <a:schemeClr val="accent1"/>
+          </a:effectRef>
+          <a:fontRef idx="minor">
+            <a:schemeClr val="tx1"/>
+          </a:fontRef>
+        </p:style>
+      </p:cxnSp>
+      <p:cxnSp>
+        <p:nvCxnSpPr>
+          <p:cNvPr id="10" name="Straight Arrow Connector 9"/>
+          <p:cNvCxnSpPr/>
+          <p:nvPr/>
+        </p:nvCxnSpPr>
+        <p:spPr>
+          <a:xfrm>
+            <a:off x="88121" y="3492642"/>
+            <a:ext cx="679837" cy="0"/>
+          </a:xfrm>
+          <a:prstGeom prst="straightConnector1">
+            <a:avLst/>
+          </a:prstGeom>
+          <a:ln w="83820">
+            <a:solidFill>
+              <a:schemeClr val="tx1"/>
+            </a:solidFill>
+            <a:prstDash val="solid"/>
+            <a:tailEnd type="triangle" w="lg" len="lg"/>
+          </a:ln>
+        </p:spPr>
+        <p:style>
+          <a:lnRef idx="1">
+            <a:schemeClr val="accent1"/>
+          </a:lnRef>
+          <a:fillRef idx="0">
+            <a:schemeClr val="accent1"/>
+          </a:fillRef>
+          <a:effectRef idx="0">
+            <a:schemeClr val="accent1"/>
+          </a:effectRef>
+          <a:fontRef idx="minor">
+            <a:schemeClr val="tx1"/>
+          </a:fontRef>
+        </p:style>
+      </p:cxnSp>
+      <p:cxnSp>
+        <p:nvCxnSpPr>
+          <p:cNvPr id="8" name="Straight Arrow Connector 7"/>
+          <p:cNvCxnSpPr/>
+          <p:nvPr/>
+        </p:nvCxnSpPr>
+        <p:spPr>
+          <a:xfrm>
+            <a:off x="2065621" y="1127640"/>
+            <a:ext cx="626358" cy="725109"/>
+          </a:xfrm>
+          <a:prstGeom prst="straightConnector1">
+            <a:avLst/>
+          </a:prstGeom>
+          <a:ln w="83820">
+            <a:solidFill>
+              <a:schemeClr val="tx1"/>
+            </a:solidFill>
+            <a:prstDash val="solid"/>
+            <a:tailEnd type="triangle" w="lg" len="lg"/>
+          </a:ln>
+        </p:spPr>
+        <p:style>
+          <a:lnRef idx="1">
+            <a:schemeClr val="accent1"/>
+          </a:lnRef>
+          <a:fillRef idx="0">
+            <a:schemeClr val="accent1"/>
+          </a:fillRef>
+          <a:effectRef idx="0">
+            <a:schemeClr val="accent1"/>
+          </a:effectRef>
+          <a:fontRef idx="minor">
+            <a:schemeClr val="tx1"/>
+          </a:fontRef>
+        </p:style>
+      </p:cxnSp>
+      <p:cxnSp>
+        <p:nvCxnSpPr>
+          <p:cNvPr id="9" name="Straight Arrow Connector 8"/>
+          <p:cNvCxnSpPr/>
+          <p:nvPr/>
+        </p:nvCxnSpPr>
+        <p:spPr>
+          <a:xfrm flipV="1">
+            <a:off x="2065621" y="2770335"/>
+            <a:ext cx="626358" cy="722307"/>
+          </a:xfrm>
+          <a:prstGeom prst="straightConnector1">
+            <a:avLst/>
+          </a:prstGeom>
+          <a:ln w="28575">
+            <a:solidFill>
+              <a:schemeClr val="tx1"/>
+            </a:solidFill>
+            <a:prstDash val="sysDot"/>
+            <a:tailEnd type="triangle" w="lg" len="lg"/>
+          </a:ln>
+        </p:spPr>
+        <p:style>
+          <a:lnRef idx="1">
+            <a:schemeClr val="accent1"/>
+          </a:lnRef>
+          <a:fillRef idx="0">
+            <a:schemeClr val="accent1"/>
+          </a:fillRef>
+          <a:effectRef idx="0">
+            <a:schemeClr val="accent1"/>
+          </a:effectRef>
+          <a:fontRef idx="minor">
+            <a:schemeClr val="tx1"/>
+          </a:fontRef>
+        </p:style>
+      </p:cxnSp>
+    </p:spTree>
+    <p:extLst>
+      <p:ext uri="{BB962C8B-B14F-4D97-AF65-F5344CB8AC3E}">
+        <p14:creationId xmlns:p14="http://schemas.microsoft.com/office/powerpoint/2010/main" val="550730497"/>
       </p:ext>
     </p:extLst>
   </p:cSld>

</xml_diff>

<commit_message>
Added some more instructions
</commit_message>
<xml_diff>
--- a/Experiments/draw_instructions.pptx
+++ b/Experiments/draw_instructions.pptx
@@ -4220,13 +4220,18 @@
           <a:p>
             <a:pPr algn="ctr"/>
             <a:r>
-              <a:rPr lang="en-US" sz="6666" dirty="0">
+              <a:rPr lang="en-US" sz="6666" dirty="0" smtClean="0">
                 <a:solidFill>
                   <a:srgbClr val="C00000"/>
                 </a:solidFill>
               </a:rPr>
-              <a:t>A</a:t>
-            </a:r>
+              <a:t>X</a:t>
+            </a:r>
+            <a:endParaRPr lang="en-US" sz="6666" dirty="0">
+              <a:solidFill>
+                <a:srgbClr val="C00000"/>
+              </a:solidFill>
+            </a:endParaRPr>
           </a:p>
         </p:txBody>
       </p:sp>
@@ -4282,13 +4287,18 @@
           <a:p>
             <a:pPr algn="ctr"/>
             <a:r>
-              <a:rPr lang="en-US" sz="6666" dirty="0">
+              <a:rPr lang="en-US" sz="6666" dirty="0" smtClean="0">
                 <a:solidFill>
                   <a:srgbClr val="C00000"/>
                 </a:solidFill>
               </a:rPr>
-              <a:t>B</a:t>
-            </a:r>
+              <a:t>Z</a:t>
+            </a:r>
+            <a:endParaRPr lang="en-US" sz="6666" dirty="0">
+              <a:solidFill>
+                <a:srgbClr val="C00000"/>
+              </a:solidFill>
+            </a:endParaRPr>
           </a:p>
         </p:txBody>
       </p:sp>
@@ -4344,13 +4354,18 @@
           <a:p>
             <a:pPr algn="ctr"/>
             <a:r>
-              <a:rPr lang="en-US" sz="6666" dirty="0">
+              <a:rPr lang="en-US" sz="6666" dirty="0" smtClean="0">
                 <a:solidFill>
                   <a:srgbClr val="C00000"/>
                 </a:solidFill>
               </a:rPr>
-              <a:t>C</a:t>
-            </a:r>
+              <a:t>Y</a:t>
+            </a:r>
+            <a:endParaRPr lang="en-US" sz="6666" dirty="0">
+              <a:solidFill>
+                <a:srgbClr val="C00000"/>
+              </a:solidFill>
+            </a:endParaRPr>
           </a:p>
         </p:txBody>
       </p:sp>
@@ -4516,13 +4531,18 @@
           <a:p>
             <a:pPr algn="ctr"/>
             <a:r>
-              <a:rPr lang="en-US" sz="6666" dirty="0">
+              <a:rPr lang="en-US" sz="6666" dirty="0" smtClean="0">
                 <a:solidFill>
                   <a:srgbClr val="C00000"/>
                 </a:solidFill>
               </a:rPr>
-              <a:t>A</a:t>
-            </a:r>
+              <a:t>X</a:t>
+            </a:r>
+            <a:endParaRPr lang="en-US" sz="6666" dirty="0">
+              <a:solidFill>
+                <a:srgbClr val="C00000"/>
+              </a:solidFill>
+            </a:endParaRPr>
           </a:p>
         </p:txBody>
       </p:sp>
@@ -4578,13 +4598,18 @@
           <a:p>
             <a:pPr algn="ctr"/>
             <a:r>
-              <a:rPr lang="en-US" sz="6666" dirty="0">
+              <a:rPr lang="en-US" sz="6666" dirty="0" smtClean="0">
                 <a:solidFill>
                   <a:srgbClr val="C00000"/>
                 </a:solidFill>
               </a:rPr>
-              <a:t>B</a:t>
-            </a:r>
+              <a:t>Z</a:t>
+            </a:r>
+            <a:endParaRPr lang="en-US" sz="6666" dirty="0">
+              <a:solidFill>
+                <a:srgbClr val="C00000"/>
+              </a:solidFill>
+            </a:endParaRPr>
           </a:p>
         </p:txBody>
       </p:sp>
@@ -4640,13 +4665,18 @@
           <a:p>
             <a:pPr algn="ctr"/>
             <a:r>
-              <a:rPr lang="en-US" sz="6666" dirty="0">
+              <a:rPr lang="en-US" sz="6666" dirty="0" smtClean="0">
                 <a:solidFill>
                   <a:srgbClr val="C00000"/>
                 </a:solidFill>
               </a:rPr>
-              <a:t>C</a:t>
-            </a:r>
+              <a:t>Y</a:t>
+            </a:r>
+            <a:endParaRPr lang="en-US" sz="6666" dirty="0">
+              <a:solidFill>
+                <a:srgbClr val="C00000"/>
+              </a:solidFill>
+            </a:endParaRPr>
           </a:p>
         </p:txBody>
       </p:sp>
@@ -4919,13 +4949,18 @@
           <a:p>
             <a:pPr algn="ctr"/>
             <a:r>
-              <a:rPr lang="en-US" sz="6666" dirty="0">
+              <a:rPr lang="en-US" sz="6666" dirty="0" smtClean="0">
                 <a:solidFill>
                   <a:srgbClr val="C00000"/>
                 </a:solidFill>
               </a:rPr>
-              <a:t>A</a:t>
-            </a:r>
+              <a:t>X</a:t>
+            </a:r>
+            <a:endParaRPr lang="en-US" sz="6666" dirty="0">
+              <a:solidFill>
+                <a:srgbClr val="C00000"/>
+              </a:solidFill>
+            </a:endParaRPr>
           </a:p>
         </p:txBody>
       </p:sp>
@@ -4981,13 +5016,18 @@
           <a:p>
             <a:pPr algn="ctr"/>
             <a:r>
-              <a:rPr lang="en-US" sz="6666" dirty="0">
+              <a:rPr lang="en-US" sz="6666" dirty="0" smtClean="0">
                 <a:solidFill>
                   <a:srgbClr val="C00000"/>
                 </a:solidFill>
               </a:rPr>
-              <a:t>B</a:t>
-            </a:r>
+              <a:t>Z</a:t>
+            </a:r>
+            <a:endParaRPr lang="en-US" sz="6666" dirty="0">
+              <a:solidFill>
+                <a:srgbClr val="C00000"/>
+              </a:solidFill>
+            </a:endParaRPr>
           </a:p>
         </p:txBody>
       </p:sp>
@@ -5043,13 +5083,18 @@
           <a:p>
             <a:pPr algn="ctr"/>
             <a:r>
-              <a:rPr lang="en-US" sz="6666" dirty="0">
+              <a:rPr lang="en-US" sz="6666" dirty="0" smtClean="0">
                 <a:solidFill>
                   <a:srgbClr val="C00000"/>
                 </a:solidFill>
               </a:rPr>
-              <a:t>C</a:t>
-            </a:r>
+              <a:t>Y</a:t>
+            </a:r>
+            <a:endParaRPr lang="en-US" sz="6666" dirty="0">
+              <a:solidFill>
+                <a:srgbClr val="C00000"/>
+              </a:solidFill>
+            </a:endParaRPr>
           </a:p>
         </p:txBody>
       </p:sp>
@@ -5215,13 +5260,18 @@
           <a:p>
             <a:pPr algn="ctr"/>
             <a:r>
-              <a:rPr lang="en-US" sz="6666" dirty="0">
+              <a:rPr lang="en-US" sz="6666" dirty="0" smtClean="0">
                 <a:solidFill>
                   <a:srgbClr val="C00000"/>
                 </a:solidFill>
               </a:rPr>
-              <a:t>A</a:t>
-            </a:r>
+              <a:t>X</a:t>
+            </a:r>
+            <a:endParaRPr lang="en-US" sz="6666" dirty="0">
+              <a:solidFill>
+                <a:srgbClr val="C00000"/>
+              </a:solidFill>
+            </a:endParaRPr>
           </a:p>
         </p:txBody>
       </p:sp>
@@ -5277,13 +5327,18 @@
           <a:p>
             <a:pPr algn="ctr"/>
             <a:r>
-              <a:rPr lang="en-US" sz="6666" dirty="0">
+              <a:rPr lang="en-US" sz="6666" dirty="0" smtClean="0">
                 <a:solidFill>
                   <a:srgbClr val="C00000"/>
                 </a:solidFill>
               </a:rPr>
-              <a:t>B</a:t>
-            </a:r>
+              <a:t>Z</a:t>
+            </a:r>
+            <a:endParaRPr lang="en-US" sz="6666" dirty="0">
+              <a:solidFill>
+                <a:srgbClr val="C00000"/>
+              </a:solidFill>
+            </a:endParaRPr>
           </a:p>
         </p:txBody>
       </p:sp>
@@ -5339,13 +5394,18 @@
           <a:p>
             <a:pPr algn="ctr"/>
             <a:r>
-              <a:rPr lang="en-US" sz="6666" dirty="0">
+              <a:rPr lang="en-US" sz="6666" dirty="0" smtClean="0">
                 <a:solidFill>
                   <a:srgbClr val="C00000"/>
                 </a:solidFill>
               </a:rPr>
-              <a:t>C</a:t>
-            </a:r>
+              <a:t>Y</a:t>
+            </a:r>
+            <a:endParaRPr lang="en-US" sz="6666" dirty="0">
+              <a:solidFill>
+                <a:srgbClr val="C00000"/>
+              </a:solidFill>
+            </a:endParaRPr>
           </a:p>
         </p:txBody>
       </p:sp>
@@ -5511,13 +5571,18 @@
           <a:p>
             <a:pPr algn="ctr"/>
             <a:r>
-              <a:rPr lang="en-US" sz="6666" dirty="0">
+              <a:rPr lang="en-US" sz="6666" dirty="0" smtClean="0">
                 <a:solidFill>
                   <a:srgbClr val="C00000"/>
                 </a:solidFill>
               </a:rPr>
-              <a:t>A</a:t>
-            </a:r>
+              <a:t>X</a:t>
+            </a:r>
+            <a:endParaRPr lang="en-US" sz="6666" dirty="0">
+              <a:solidFill>
+                <a:srgbClr val="C00000"/>
+              </a:solidFill>
+            </a:endParaRPr>
           </a:p>
         </p:txBody>
       </p:sp>
@@ -5573,13 +5638,18 @@
           <a:p>
             <a:pPr algn="ctr"/>
             <a:r>
-              <a:rPr lang="en-US" sz="6666" dirty="0">
+              <a:rPr lang="en-US" sz="6666" dirty="0" smtClean="0">
                 <a:solidFill>
                   <a:srgbClr val="C00000"/>
                 </a:solidFill>
               </a:rPr>
-              <a:t>B</a:t>
-            </a:r>
+              <a:t>Z</a:t>
+            </a:r>
+            <a:endParaRPr lang="en-US" sz="6666" dirty="0">
+              <a:solidFill>
+                <a:srgbClr val="C00000"/>
+              </a:solidFill>
+            </a:endParaRPr>
           </a:p>
         </p:txBody>
       </p:sp>
@@ -5635,13 +5705,18 @@
           <a:p>
             <a:pPr algn="ctr"/>
             <a:r>
-              <a:rPr lang="en-US" sz="6666" dirty="0">
+              <a:rPr lang="en-US" sz="6666" dirty="0" smtClean="0">
                 <a:solidFill>
                   <a:srgbClr val="C00000"/>
                 </a:solidFill>
               </a:rPr>
-              <a:t>C</a:t>
-            </a:r>
+              <a:t>Y</a:t>
+            </a:r>
+            <a:endParaRPr lang="en-US" sz="6666" dirty="0">
+              <a:solidFill>
+                <a:srgbClr val="C00000"/>
+              </a:solidFill>
+            </a:endParaRPr>
           </a:p>
         </p:txBody>
       </p:sp>
@@ -5807,13 +5882,18 @@
           <a:p>
             <a:pPr algn="ctr"/>
             <a:r>
-              <a:rPr lang="en-US" sz="6666" dirty="0">
+              <a:rPr lang="en-US" sz="6666" dirty="0" smtClean="0">
                 <a:solidFill>
                   <a:srgbClr val="C00000"/>
                 </a:solidFill>
               </a:rPr>
-              <a:t>A</a:t>
-            </a:r>
+              <a:t>X</a:t>
+            </a:r>
+            <a:endParaRPr lang="en-US" sz="6666" dirty="0">
+              <a:solidFill>
+                <a:srgbClr val="C00000"/>
+              </a:solidFill>
+            </a:endParaRPr>
           </a:p>
         </p:txBody>
       </p:sp>
@@ -5869,13 +5949,18 @@
           <a:p>
             <a:pPr algn="ctr"/>
             <a:r>
-              <a:rPr lang="en-US" sz="6666" dirty="0">
+              <a:rPr lang="en-US" sz="6666" dirty="0" smtClean="0">
                 <a:solidFill>
                   <a:srgbClr val="C00000"/>
                 </a:solidFill>
               </a:rPr>
-              <a:t>B</a:t>
-            </a:r>
+              <a:t>Z</a:t>
+            </a:r>
+            <a:endParaRPr lang="en-US" sz="6666" dirty="0">
+              <a:solidFill>
+                <a:srgbClr val="C00000"/>
+              </a:solidFill>
+            </a:endParaRPr>
           </a:p>
         </p:txBody>
       </p:sp>
@@ -6037,13 +6122,18 @@
           <a:p>
             <a:pPr algn="ctr"/>
             <a:r>
-              <a:rPr lang="en-US" sz="6666" dirty="0">
+              <a:rPr lang="en-US" sz="6666" dirty="0" smtClean="0">
                 <a:solidFill>
                   <a:srgbClr val="C00000"/>
                 </a:solidFill>
               </a:rPr>
-              <a:t>A</a:t>
-            </a:r>
+              <a:t>X</a:t>
+            </a:r>
+            <a:endParaRPr lang="en-US" sz="6666" dirty="0">
+              <a:solidFill>
+                <a:srgbClr val="C00000"/>
+              </a:solidFill>
+            </a:endParaRPr>
           </a:p>
         </p:txBody>
       </p:sp>
@@ -6099,13 +6189,18 @@
           <a:p>
             <a:pPr algn="ctr"/>
             <a:r>
-              <a:rPr lang="en-US" sz="6666" dirty="0">
+              <a:rPr lang="en-US" sz="6666" dirty="0" smtClean="0">
                 <a:solidFill>
                   <a:srgbClr val="C00000"/>
                 </a:solidFill>
               </a:rPr>
-              <a:t>B</a:t>
-            </a:r>
+              <a:t>Z</a:t>
+            </a:r>
+            <a:endParaRPr lang="en-US" sz="6666" dirty="0">
+              <a:solidFill>
+                <a:srgbClr val="C00000"/>
+              </a:solidFill>
+            </a:endParaRPr>
           </a:p>
         </p:txBody>
       </p:sp>
@@ -6267,13 +6362,18 @@
           <a:p>
             <a:pPr algn="ctr"/>
             <a:r>
-              <a:rPr lang="en-US" sz="6666" dirty="0">
+              <a:rPr lang="en-US" sz="6666" dirty="0" smtClean="0">
                 <a:solidFill>
                   <a:srgbClr val="C00000"/>
                 </a:solidFill>
               </a:rPr>
-              <a:t>A</a:t>
-            </a:r>
+              <a:t>X</a:t>
+            </a:r>
+            <a:endParaRPr lang="en-US" sz="6666" dirty="0">
+              <a:solidFill>
+                <a:srgbClr val="C00000"/>
+              </a:solidFill>
+            </a:endParaRPr>
           </a:p>
         </p:txBody>
       </p:sp>
@@ -6329,13 +6429,18 @@
           <a:p>
             <a:pPr algn="ctr"/>
             <a:r>
-              <a:rPr lang="en-US" sz="6666" dirty="0">
+              <a:rPr lang="en-US" sz="6666" dirty="0" smtClean="0">
                 <a:solidFill>
                   <a:srgbClr val="C00000"/>
                 </a:solidFill>
               </a:rPr>
-              <a:t>B</a:t>
-            </a:r>
+              <a:t>Z</a:t>
+            </a:r>
+            <a:endParaRPr lang="en-US" sz="6666" dirty="0">
+              <a:solidFill>
+                <a:srgbClr val="C00000"/>
+              </a:solidFill>
+            </a:endParaRPr>
           </a:p>
         </p:txBody>
       </p:sp>
@@ -6497,13 +6602,18 @@
           <a:p>
             <a:pPr algn="ctr"/>
             <a:r>
-              <a:rPr lang="en-US" sz="6666" dirty="0">
+              <a:rPr lang="en-US" sz="6666" dirty="0" smtClean="0">
                 <a:solidFill>
                   <a:srgbClr val="C00000"/>
                 </a:solidFill>
               </a:rPr>
-              <a:t>A</a:t>
-            </a:r>
+              <a:t>X</a:t>
+            </a:r>
+            <a:endParaRPr lang="en-US" sz="6666" dirty="0">
+              <a:solidFill>
+                <a:srgbClr val="C00000"/>
+              </a:solidFill>
+            </a:endParaRPr>
           </a:p>
         </p:txBody>
       </p:sp>
@@ -6559,13 +6669,18 @@
           <a:p>
             <a:pPr algn="ctr"/>
             <a:r>
-              <a:rPr lang="en-US" sz="6666" dirty="0">
+              <a:rPr lang="en-US" sz="6666" dirty="0" smtClean="0">
                 <a:solidFill>
                   <a:srgbClr val="C00000"/>
                 </a:solidFill>
               </a:rPr>
-              <a:t>B</a:t>
-            </a:r>
+              <a:t>Z</a:t>
+            </a:r>
+            <a:endParaRPr lang="en-US" sz="6666" dirty="0">
+              <a:solidFill>
+                <a:srgbClr val="C00000"/>
+              </a:solidFill>
+            </a:endParaRPr>
           </a:p>
         </p:txBody>
       </p:sp>
@@ -6727,13 +6842,18 @@
           <a:p>
             <a:pPr algn="ctr"/>
             <a:r>
-              <a:rPr lang="en-US" sz="6666" dirty="0">
+              <a:rPr lang="en-US" sz="6666" dirty="0" smtClean="0">
                 <a:solidFill>
                   <a:srgbClr val="C00000"/>
                 </a:solidFill>
               </a:rPr>
-              <a:t>A</a:t>
-            </a:r>
+              <a:t>X</a:t>
+            </a:r>
+            <a:endParaRPr lang="en-US" sz="6666" dirty="0">
+              <a:solidFill>
+                <a:srgbClr val="C00000"/>
+              </a:solidFill>
+            </a:endParaRPr>
           </a:p>
         </p:txBody>
       </p:sp>
@@ -6789,13 +6909,18 @@
           <a:p>
             <a:pPr algn="ctr"/>
             <a:r>
-              <a:rPr lang="en-US" sz="6666" dirty="0">
+              <a:rPr lang="en-US" sz="6666" dirty="0" smtClean="0">
                 <a:solidFill>
                   <a:srgbClr val="C00000"/>
                 </a:solidFill>
               </a:rPr>
-              <a:t>B</a:t>
-            </a:r>
+              <a:t>Z</a:t>
+            </a:r>
+            <a:endParaRPr lang="en-US" sz="6666" dirty="0">
+              <a:solidFill>
+                <a:srgbClr val="C00000"/>
+              </a:solidFill>
+            </a:endParaRPr>
           </a:p>
         </p:txBody>
       </p:sp>
@@ -6851,13 +6976,18 @@
           <a:p>
             <a:pPr algn="ctr"/>
             <a:r>
-              <a:rPr lang="en-US" sz="6666" dirty="0">
+              <a:rPr lang="en-US" sz="6666" dirty="0" smtClean="0">
                 <a:solidFill>
                   <a:srgbClr val="C00000"/>
                 </a:solidFill>
               </a:rPr>
-              <a:t>C</a:t>
-            </a:r>
+              <a:t>Y</a:t>
+            </a:r>
+            <a:endParaRPr lang="en-US" sz="6666" dirty="0">
+              <a:solidFill>
+                <a:srgbClr val="C00000"/>
+              </a:solidFill>
+            </a:endParaRPr>
           </a:p>
         </p:txBody>
       </p:sp>

</xml_diff>

<commit_message>
Working on comprehension questions
</commit_message>
<xml_diff>
--- a/Experiments/draw_instructions.pptx
+++ b/Experiments/draw_instructions.pptx
@@ -5,19 +5,22 @@
     <p:sldMasterId id="2147483720" r:id="rId1"/>
   </p:sldMasterIdLst>
   <p:notesMasterIdLst>
-    <p:notesMasterId r:id="rId12"/>
+    <p:notesMasterId r:id="rId15"/>
   </p:notesMasterIdLst>
   <p:sldIdLst>
-    <p:sldId id="256" r:id="rId2"/>
-    <p:sldId id="265" r:id="rId3"/>
-    <p:sldId id="266" r:id="rId4"/>
+    <p:sldId id="276" r:id="rId2"/>
+    <p:sldId id="279" r:id="rId3"/>
+    <p:sldId id="280" r:id="rId4"/>
     <p:sldId id="267" r:id="rId5"/>
-    <p:sldId id="275" r:id="rId6"/>
-    <p:sldId id="263" r:id="rId7"/>
-    <p:sldId id="273" r:id="rId8"/>
+    <p:sldId id="263" r:id="rId6"/>
+    <p:sldId id="282" r:id="rId7"/>
+    <p:sldId id="283" r:id="rId8"/>
     <p:sldId id="274" r:id="rId9"/>
-    <p:sldId id="269" r:id="rId10"/>
-    <p:sldId id="271" r:id="rId11"/>
+    <p:sldId id="271" r:id="rId10"/>
+    <p:sldId id="284" r:id="rId11"/>
+    <p:sldId id="277" r:id="rId12"/>
+    <p:sldId id="281" r:id="rId13"/>
+    <p:sldId id="278" r:id="rId14"/>
   </p:sldIdLst>
   <p:sldSz cx="4572000" cy="4572000"/>
   <p:notesSz cx="6858000" cy="9144000"/>
@@ -206,7 +209,7 @@
           <a:p>
             <a:fld id="{B3D1F5A6-33BB-9F4E-9C59-2A3D50235D3A}" type="datetimeFigureOut">
               <a:rPr lang="en-US" smtClean="0"/>
-              <a:t>8/27/19</a:t>
+              <a:t>8/29/19</a:t>
             </a:fld>
             <a:endParaRPr lang="en-US"/>
           </a:p>
@@ -553,7 +556,7 @@
     </p:spTree>
     <p:extLst>
       <p:ext uri="{BB962C8B-B14F-4D97-AF65-F5344CB8AC3E}">
-        <p14:creationId xmlns:p14="http://schemas.microsoft.com/office/powerpoint/2010/main" val="917612362"/>
+        <p14:creationId xmlns:p14="http://schemas.microsoft.com/office/powerpoint/2010/main" val="1991257953"/>
       </p:ext>
     </p:extLst>
   </p:cSld>
@@ -642,7 +645,274 @@
     </p:spTree>
     <p:extLst>
       <p:ext uri="{BB962C8B-B14F-4D97-AF65-F5344CB8AC3E}">
-        <p14:creationId xmlns:p14="http://schemas.microsoft.com/office/powerpoint/2010/main" val="477567522"/>
+        <p14:creationId xmlns:p14="http://schemas.microsoft.com/office/powerpoint/2010/main" val="342548469"/>
+      </p:ext>
+    </p:extLst>
+  </p:cSld>
+  <p:clrMapOvr>
+    <a:masterClrMapping/>
+  </p:clrMapOvr>
+</p:notes>
+</file>
+
+<file path=ppt/notesSlides/notesSlide11.xml><?xml version="1.0" encoding="utf-8"?>
+<p:notes xmlns:a="http://schemas.openxmlformats.org/drawingml/2006/main" xmlns:r="http://schemas.openxmlformats.org/officeDocument/2006/relationships" xmlns:p="http://schemas.openxmlformats.org/presentationml/2006/main">
+  <p:cSld>
+    <p:spTree>
+      <p:nvGrpSpPr>
+        <p:cNvPr id="1" name=""/>
+        <p:cNvGrpSpPr/>
+        <p:nvPr/>
+      </p:nvGrpSpPr>
+      <p:grpSpPr>
+        <a:xfrm>
+          <a:off x="0" y="0"/>
+          <a:ext cx="0" cy="0"/>
+          <a:chOff x="0" y="0"/>
+          <a:chExt cx="0" cy="0"/>
+        </a:xfrm>
+      </p:grpSpPr>
+      <p:sp>
+        <p:nvSpPr>
+          <p:cNvPr id="2" name="Slide Image Placeholder 1"/>
+          <p:cNvSpPr>
+            <a:spLocks noGrp="1" noRot="1" noChangeAspect="1"/>
+          </p:cNvSpPr>
+          <p:nvPr>
+            <p:ph type="sldImg"/>
+          </p:nvPr>
+        </p:nvSpPr>
+        <p:spPr>
+          <a:xfrm>
+            <a:off x="1885950" y="1143000"/>
+            <a:ext cx="3086100" cy="3086100"/>
+          </a:xfrm>
+        </p:spPr>
+      </p:sp>
+      <p:sp>
+        <p:nvSpPr>
+          <p:cNvPr id="3" name="Notes Placeholder 2"/>
+          <p:cNvSpPr>
+            <a:spLocks noGrp="1"/>
+          </p:cNvSpPr>
+          <p:nvPr>
+            <p:ph type="body" idx="1"/>
+          </p:nvPr>
+        </p:nvSpPr>
+        <p:spPr/>
+        <p:txBody>
+          <a:bodyPr/>
+          <a:lstStyle/>
+          <a:p>
+            <a:endParaRPr lang="en-US" dirty="0"/>
+          </a:p>
+        </p:txBody>
+      </p:sp>
+      <p:sp>
+        <p:nvSpPr>
+          <p:cNvPr id="4" name="Slide Number Placeholder 3"/>
+          <p:cNvSpPr>
+            <a:spLocks noGrp="1"/>
+          </p:cNvSpPr>
+          <p:nvPr>
+            <p:ph type="sldNum" sz="quarter" idx="10"/>
+          </p:nvPr>
+        </p:nvSpPr>
+        <p:spPr/>
+        <p:txBody>
+          <a:bodyPr/>
+          <a:lstStyle/>
+          <a:p>
+            <a:fld id="{82BE4D2C-656A-5940-932A-77C5EFCCD84E}" type="slidenum">
+              <a:rPr lang="en-US" smtClean="0"/>
+              <a:t>11</a:t>
+            </a:fld>
+            <a:endParaRPr lang="en-US"/>
+          </a:p>
+        </p:txBody>
+      </p:sp>
+    </p:spTree>
+    <p:extLst>
+      <p:ext uri="{BB962C8B-B14F-4D97-AF65-F5344CB8AC3E}">
+        <p14:creationId xmlns:p14="http://schemas.microsoft.com/office/powerpoint/2010/main" val="2067585076"/>
+      </p:ext>
+    </p:extLst>
+  </p:cSld>
+  <p:clrMapOvr>
+    <a:masterClrMapping/>
+  </p:clrMapOvr>
+</p:notes>
+</file>
+
+<file path=ppt/notesSlides/notesSlide12.xml><?xml version="1.0" encoding="utf-8"?>
+<p:notes xmlns:a="http://schemas.openxmlformats.org/drawingml/2006/main" xmlns:r="http://schemas.openxmlformats.org/officeDocument/2006/relationships" xmlns:p="http://schemas.openxmlformats.org/presentationml/2006/main">
+  <p:cSld>
+    <p:spTree>
+      <p:nvGrpSpPr>
+        <p:cNvPr id="1" name=""/>
+        <p:cNvGrpSpPr/>
+        <p:nvPr/>
+      </p:nvGrpSpPr>
+      <p:grpSpPr>
+        <a:xfrm>
+          <a:off x="0" y="0"/>
+          <a:ext cx="0" cy="0"/>
+          <a:chOff x="0" y="0"/>
+          <a:chExt cx="0" cy="0"/>
+        </a:xfrm>
+      </p:grpSpPr>
+      <p:sp>
+        <p:nvSpPr>
+          <p:cNvPr id="2" name="Slide Image Placeholder 1"/>
+          <p:cNvSpPr>
+            <a:spLocks noGrp="1" noRot="1" noChangeAspect="1"/>
+          </p:cNvSpPr>
+          <p:nvPr>
+            <p:ph type="sldImg"/>
+          </p:nvPr>
+        </p:nvSpPr>
+        <p:spPr>
+          <a:xfrm>
+            <a:off x="1885950" y="1143000"/>
+            <a:ext cx="3086100" cy="3086100"/>
+          </a:xfrm>
+        </p:spPr>
+      </p:sp>
+      <p:sp>
+        <p:nvSpPr>
+          <p:cNvPr id="3" name="Notes Placeholder 2"/>
+          <p:cNvSpPr>
+            <a:spLocks noGrp="1"/>
+          </p:cNvSpPr>
+          <p:nvPr>
+            <p:ph type="body" idx="1"/>
+          </p:nvPr>
+        </p:nvSpPr>
+        <p:spPr/>
+        <p:txBody>
+          <a:bodyPr/>
+          <a:lstStyle/>
+          <a:p>
+            <a:endParaRPr lang="en-US" dirty="0"/>
+          </a:p>
+        </p:txBody>
+      </p:sp>
+      <p:sp>
+        <p:nvSpPr>
+          <p:cNvPr id="4" name="Slide Number Placeholder 3"/>
+          <p:cNvSpPr>
+            <a:spLocks noGrp="1"/>
+          </p:cNvSpPr>
+          <p:nvPr>
+            <p:ph type="sldNum" sz="quarter" idx="10"/>
+          </p:nvPr>
+        </p:nvSpPr>
+        <p:spPr/>
+        <p:txBody>
+          <a:bodyPr/>
+          <a:lstStyle/>
+          <a:p>
+            <a:fld id="{82BE4D2C-656A-5940-932A-77C5EFCCD84E}" type="slidenum">
+              <a:rPr lang="en-US" smtClean="0"/>
+              <a:t>12</a:t>
+            </a:fld>
+            <a:endParaRPr lang="en-US"/>
+          </a:p>
+        </p:txBody>
+      </p:sp>
+    </p:spTree>
+    <p:extLst>
+      <p:ext uri="{BB962C8B-B14F-4D97-AF65-F5344CB8AC3E}">
+        <p14:creationId xmlns:p14="http://schemas.microsoft.com/office/powerpoint/2010/main" val="1057298711"/>
+      </p:ext>
+    </p:extLst>
+  </p:cSld>
+  <p:clrMapOvr>
+    <a:masterClrMapping/>
+  </p:clrMapOvr>
+</p:notes>
+</file>
+
+<file path=ppt/notesSlides/notesSlide13.xml><?xml version="1.0" encoding="utf-8"?>
+<p:notes xmlns:a="http://schemas.openxmlformats.org/drawingml/2006/main" xmlns:r="http://schemas.openxmlformats.org/officeDocument/2006/relationships" xmlns:p="http://schemas.openxmlformats.org/presentationml/2006/main">
+  <p:cSld>
+    <p:spTree>
+      <p:nvGrpSpPr>
+        <p:cNvPr id="1" name=""/>
+        <p:cNvGrpSpPr/>
+        <p:nvPr/>
+      </p:nvGrpSpPr>
+      <p:grpSpPr>
+        <a:xfrm>
+          <a:off x="0" y="0"/>
+          <a:ext cx="0" cy="0"/>
+          <a:chOff x="0" y="0"/>
+          <a:chExt cx="0" cy="0"/>
+        </a:xfrm>
+      </p:grpSpPr>
+      <p:sp>
+        <p:nvSpPr>
+          <p:cNvPr id="2" name="Slide Image Placeholder 1"/>
+          <p:cNvSpPr>
+            <a:spLocks noGrp="1" noRot="1" noChangeAspect="1"/>
+          </p:cNvSpPr>
+          <p:nvPr>
+            <p:ph type="sldImg"/>
+          </p:nvPr>
+        </p:nvSpPr>
+        <p:spPr>
+          <a:xfrm>
+            <a:off x="1885950" y="1143000"/>
+            <a:ext cx="3086100" cy="3086100"/>
+          </a:xfrm>
+        </p:spPr>
+      </p:sp>
+      <p:sp>
+        <p:nvSpPr>
+          <p:cNvPr id="3" name="Notes Placeholder 2"/>
+          <p:cNvSpPr>
+            <a:spLocks noGrp="1"/>
+          </p:cNvSpPr>
+          <p:nvPr>
+            <p:ph type="body" idx="1"/>
+          </p:nvPr>
+        </p:nvSpPr>
+        <p:spPr/>
+        <p:txBody>
+          <a:bodyPr/>
+          <a:lstStyle/>
+          <a:p>
+            <a:endParaRPr lang="en-US" dirty="0"/>
+          </a:p>
+        </p:txBody>
+      </p:sp>
+      <p:sp>
+        <p:nvSpPr>
+          <p:cNvPr id="4" name="Slide Number Placeholder 3"/>
+          <p:cNvSpPr>
+            <a:spLocks noGrp="1"/>
+          </p:cNvSpPr>
+          <p:nvPr>
+            <p:ph type="sldNum" sz="quarter" idx="10"/>
+          </p:nvPr>
+        </p:nvSpPr>
+        <p:spPr/>
+        <p:txBody>
+          <a:bodyPr/>
+          <a:lstStyle/>
+          <a:p>
+            <a:fld id="{82BE4D2C-656A-5940-932A-77C5EFCCD84E}" type="slidenum">
+              <a:rPr lang="en-US" smtClean="0"/>
+              <a:t>13</a:t>
+            </a:fld>
+            <a:endParaRPr lang="en-US"/>
+          </a:p>
+        </p:txBody>
+      </p:sp>
+    </p:spTree>
+    <p:extLst>
+      <p:ext uri="{BB962C8B-B14F-4D97-AF65-F5344CB8AC3E}">
+        <p14:creationId xmlns:p14="http://schemas.microsoft.com/office/powerpoint/2010/main" val="1943607657"/>
       </p:ext>
     </p:extLst>
   </p:cSld>
@@ -731,7 +1001,7 @@
     </p:spTree>
     <p:extLst>
       <p:ext uri="{BB962C8B-B14F-4D97-AF65-F5344CB8AC3E}">
-        <p14:creationId xmlns:p14="http://schemas.microsoft.com/office/powerpoint/2010/main" val="1227472808"/>
+        <p14:creationId xmlns:p14="http://schemas.microsoft.com/office/powerpoint/2010/main" val="252900807"/>
       </p:ext>
     </p:extLst>
   </p:cSld>
@@ -820,7 +1090,7 @@
     </p:spTree>
     <p:extLst>
       <p:ext uri="{BB962C8B-B14F-4D97-AF65-F5344CB8AC3E}">
-        <p14:creationId xmlns:p14="http://schemas.microsoft.com/office/powerpoint/2010/main" val="2104343380"/>
+        <p14:creationId xmlns:p14="http://schemas.microsoft.com/office/powerpoint/2010/main" val="1061064770"/>
       </p:ext>
     </p:extLst>
   </p:cSld>
@@ -998,7 +1268,7 @@
     </p:spTree>
     <p:extLst>
       <p:ext uri="{BB962C8B-B14F-4D97-AF65-F5344CB8AC3E}">
-        <p14:creationId xmlns:p14="http://schemas.microsoft.com/office/powerpoint/2010/main" val="1509995261"/>
+        <p14:creationId xmlns:p14="http://schemas.microsoft.com/office/powerpoint/2010/main" val="921192"/>
       </p:ext>
     </p:extLst>
   </p:cSld>
@@ -1087,7 +1357,7 @@
     </p:spTree>
     <p:extLst>
       <p:ext uri="{BB962C8B-B14F-4D97-AF65-F5344CB8AC3E}">
-        <p14:creationId xmlns:p14="http://schemas.microsoft.com/office/powerpoint/2010/main" val="921192"/>
+        <p14:creationId xmlns:p14="http://schemas.microsoft.com/office/powerpoint/2010/main" val="1418619075"/>
       </p:ext>
     </p:extLst>
   </p:cSld>
@@ -1176,7 +1446,7 @@
     </p:spTree>
     <p:extLst>
       <p:ext uri="{BB962C8B-B14F-4D97-AF65-F5344CB8AC3E}">
-        <p14:creationId xmlns:p14="http://schemas.microsoft.com/office/powerpoint/2010/main" val="1439944423"/>
+        <p14:creationId xmlns:p14="http://schemas.microsoft.com/office/powerpoint/2010/main" val="509801894"/>
       </p:ext>
     </p:extLst>
   </p:cSld>
@@ -1354,7 +1624,7 @@
     </p:spTree>
     <p:extLst>
       <p:ext uri="{BB962C8B-B14F-4D97-AF65-F5344CB8AC3E}">
-        <p14:creationId xmlns:p14="http://schemas.microsoft.com/office/powerpoint/2010/main" val="472944509"/>
+        <p14:creationId xmlns:p14="http://schemas.microsoft.com/office/powerpoint/2010/main" val="477567522"/>
       </p:ext>
     </p:extLst>
   </p:cSld>
@@ -1495,7 +1765,7 @@
           <a:p>
             <a:fld id="{E02736CB-4232-A146-B165-19378F549313}" type="datetimeFigureOut">
               <a:rPr lang="en-US" smtClean="0"/>
-              <a:t>8/27/19</a:t>
+              <a:t>8/29/19</a:t>
             </a:fld>
             <a:endParaRPr lang="en-US"/>
           </a:p>
@@ -1660,7 +1930,7 @@
           <a:p>
             <a:fld id="{E02736CB-4232-A146-B165-19378F549313}" type="datetimeFigureOut">
               <a:rPr lang="en-US" smtClean="0"/>
-              <a:t>8/27/19</a:t>
+              <a:t>8/29/19</a:t>
             </a:fld>
             <a:endParaRPr lang="en-US"/>
           </a:p>
@@ -1835,7 +2105,7 @@
           <a:p>
             <a:fld id="{E02736CB-4232-A146-B165-19378F549313}" type="datetimeFigureOut">
               <a:rPr lang="en-US" smtClean="0"/>
-              <a:t>8/27/19</a:t>
+              <a:t>8/29/19</a:t>
             </a:fld>
             <a:endParaRPr lang="en-US"/>
           </a:p>
@@ -2000,7 +2270,7 @@
           <a:p>
             <a:fld id="{E02736CB-4232-A146-B165-19378F549313}" type="datetimeFigureOut">
               <a:rPr lang="en-US" smtClean="0"/>
-              <a:t>8/27/19</a:t>
+              <a:t>8/29/19</a:t>
             </a:fld>
             <a:endParaRPr lang="en-US"/>
           </a:p>
@@ -2239,7 +2509,7 @@
           <a:p>
             <a:fld id="{E02736CB-4232-A146-B165-19378F549313}" type="datetimeFigureOut">
               <a:rPr lang="en-US" smtClean="0"/>
-              <a:t>8/27/19</a:t>
+              <a:t>8/29/19</a:t>
             </a:fld>
             <a:endParaRPr lang="en-US"/>
           </a:p>
@@ -2466,7 +2736,7 @@
           <a:p>
             <a:fld id="{E02736CB-4232-A146-B165-19378F549313}" type="datetimeFigureOut">
               <a:rPr lang="en-US" smtClean="0"/>
-              <a:t>8/27/19</a:t>
+              <a:t>8/29/19</a:t>
             </a:fld>
             <a:endParaRPr lang="en-US"/>
           </a:p>
@@ -2828,7 +3098,7 @@
           <a:p>
             <a:fld id="{E02736CB-4232-A146-B165-19378F549313}" type="datetimeFigureOut">
               <a:rPr lang="en-US" smtClean="0"/>
-              <a:t>8/27/19</a:t>
+              <a:t>8/29/19</a:t>
             </a:fld>
             <a:endParaRPr lang="en-US"/>
           </a:p>
@@ -2941,7 +3211,7 @@
           <a:p>
             <a:fld id="{E02736CB-4232-A146-B165-19378F549313}" type="datetimeFigureOut">
               <a:rPr lang="en-US" smtClean="0"/>
-              <a:t>8/27/19</a:t>
+              <a:t>8/29/19</a:t>
             </a:fld>
             <a:endParaRPr lang="en-US"/>
           </a:p>
@@ -3031,7 +3301,7 @@
           <a:p>
             <a:fld id="{E02736CB-4232-A146-B165-19378F549313}" type="datetimeFigureOut">
               <a:rPr lang="en-US" smtClean="0"/>
-              <a:t>8/27/19</a:t>
+              <a:t>8/29/19</a:t>
             </a:fld>
             <a:endParaRPr lang="en-US"/>
           </a:p>
@@ -3303,7 +3573,7 @@
           <a:p>
             <a:fld id="{E02736CB-4232-A146-B165-19378F549313}" type="datetimeFigureOut">
               <a:rPr lang="en-US" smtClean="0"/>
-              <a:t>8/27/19</a:t>
+              <a:t>8/29/19</a:t>
             </a:fld>
             <a:endParaRPr lang="en-US"/>
           </a:p>
@@ -3555,7 +3825,7 @@
           <a:p>
             <a:fld id="{E02736CB-4232-A146-B165-19378F549313}" type="datetimeFigureOut">
               <a:rPr lang="en-US" smtClean="0"/>
-              <a:t>8/27/19</a:t>
+              <a:t>8/29/19</a:t>
             </a:fld>
             <a:endParaRPr lang="en-US"/>
           </a:p>
@@ -3763,7 +4033,7 @@
           <a:p>
             <a:fld id="{E02736CB-4232-A146-B165-19378F549313}" type="datetimeFigureOut">
               <a:rPr lang="en-US" smtClean="0"/>
-              <a:t>8/27/19</a:t>
+              <a:t>8/29/19</a:t>
             </a:fld>
             <a:endParaRPr lang="en-US"/>
           </a:p>
@@ -4176,7 +4446,7 @@
         </p:nvSpPr>
         <p:spPr>
           <a:xfrm>
-            <a:off x="767958" y="478808"/>
+            <a:off x="385577" y="1662710"/>
             <a:ext cx="1297663" cy="1297663"/>
           </a:xfrm>
           <a:prstGeom prst="ellipse">
@@ -4237,13 +4507,13 @@
       </p:sp>
       <p:sp>
         <p:nvSpPr>
-          <p:cNvPr id="30" name="Oval 29"/>
+          <p:cNvPr id="31" name="Oval 30"/>
           <p:cNvSpPr/>
           <p:nvPr/>
         </p:nvSpPr>
         <p:spPr>
           <a:xfrm>
-            <a:off x="767958" y="2843810"/>
+            <a:off x="2668191" y="1662710"/>
             <a:ext cx="1297663" cy="1297663"/>
           </a:xfrm>
           <a:prstGeom prst="ellipse">
@@ -4292,7 +4562,7 @@
                   <a:srgbClr val="C00000"/>
                 </a:solidFill>
               </a:rPr>
-              <a:t>Z</a:t>
+              <a:t>Y</a:t>
             </a:r>
             <a:endParaRPr lang="en-US" sz="6666" dirty="0">
               <a:solidFill>
@@ -4302,86 +4572,19 @@
           </a:p>
         </p:txBody>
       </p:sp>
-      <p:sp>
-        <p:nvSpPr>
-          <p:cNvPr id="31" name="Oval 30"/>
-          <p:cNvSpPr/>
-          <p:nvPr/>
-        </p:nvSpPr>
-        <p:spPr>
-          <a:xfrm>
-            <a:off x="2501941" y="1662710"/>
-            <a:ext cx="1297663" cy="1297663"/>
-          </a:xfrm>
-          <a:prstGeom prst="ellipse">
-            <a:avLst/>
-          </a:prstGeom>
-          <a:solidFill>
-            <a:schemeClr val="bg1">
-              <a:lumMod val="75000"/>
-            </a:schemeClr>
-          </a:solidFill>
-          <a:ln w="38100">
-            <a:solidFill>
-              <a:schemeClr val="tx1"/>
-            </a:solidFill>
-          </a:ln>
-        </p:spPr>
-        <p:style>
-          <a:lnRef idx="2">
-            <a:schemeClr val="accent1">
-              <a:shade val="50000"/>
-            </a:schemeClr>
-          </a:lnRef>
-          <a:fillRef idx="1">
-            <a:schemeClr val="accent1"/>
-          </a:fillRef>
-          <a:effectRef idx="0">
-            <a:schemeClr val="accent1"/>
-          </a:effectRef>
-          <a:fontRef idx="minor">
-            <a:schemeClr val="lt1"/>
-          </a:fontRef>
-        </p:style>
-        <p:txBody>
-          <a:bodyPr rot="0" spcFirstLastPara="0" vertOverflow="overflow" horzOverflow="overflow" vert="horz" wrap="square" lIns="76200" tIns="38100" rIns="76200" bIns="38100" numCol="1" spcCol="0" rtlCol="0" fromWordArt="0" anchor="ctr" anchorCtr="0" forceAA="0" compatLnSpc="1">
-            <a:prstTxWarp prst="textNoShape">
-              <a:avLst/>
-            </a:prstTxWarp>
-            <a:noAutofit/>
-          </a:bodyPr>
-          <a:lstStyle/>
-          <a:p>
-            <a:pPr algn="ctr"/>
-            <a:r>
-              <a:rPr lang="en-US" sz="6666" dirty="0" smtClean="0">
-                <a:solidFill>
-                  <a:srgbClr val="C00000"/>
-                </a:solidFill>
-              </a:rPr>
-              <a:t>Y</a:t>
-            </a:r>
-            <a:endParaRPr lang="en-US" sz="6666" dirty="0">
-              <a:solidFill>
-                <a:srgbClr val="C00000"/>
-              </a:solidFill>
-            </a:endParaRPr>
-          </a:p>
-        </p:txBody>
-      </p:sp>
       <p:cxnSp>
         <p:nvCxnSpPr>
           <p:cNvPr id="32" name="Straight Arrow Connector 31"/>
           <p:cNvCxnSpPr>
             <a:stCxn id="29" idx="6"/>
-            <a:endCxn id="31" idx="1"/>
+            <a:endCxn id="31" idx="2"/>
           </p:cNvCxnSpPr>
           <p:nvPr/>
         </p:nvCxnSpPr>
         <p:spPr>
           <a:xfrm>
-            <a:off x="2065621" y="1127640"/>
-            <a:ext cx="626358" cy="725109"/>
+            <a:off x="1683240" y="2311542"/>
+            <a:ext cx="984951" cy="0"/>
           </a:xfrm>
           <a:prstGeom prst="straightConnector1">
             <a:avLst/>
@@ -4409,50 +4612,10 @@
           </a:fontRef>
         </p:style>
       </p:cxnSp>
-      <p:cxnSp>
-        <p:nvCxnSpPr>
-          <p:cNvPr id="33" name="Straight Arrow Connector 32"/>
-          <p:cNvCxnSpPr>
-            <a:stCxn id="30" idx="6"/>
-            <a:endCxn id="31" idx="3"/>
-          </p:cNvCxnSpPr>
-          <p:nvPr/>
-        </p:nvCxnSpPr>
-        <p:spPr>
-          <a:xfrm flipV="1">
-            <a:off x="2065621" y="2770335"/>
-            <a:ext cx="626358" cy="722307"/>
-          </a:xfrm>
-          <a:prstGeom prst="straightConnector1">
-            <a:avLst/>
-          </a:prstGeom>
-          <a:ln w="28575">
-            <a:solidFill>
-              <a:schemeClr val="tx1"/>
-            </a:solidFill>
-            <a:prstDash val="sysDot"/>
-            <a:tailEnd type="triangle" w="lg" len="lg"/>
-          </a:ln>
-        </p:spPr>
-        <p:style>
-          <a:lnRef idx="1">
-            <a:schemeClr val="accent1"/>
-          </a:lnRef>
-          <a:fillRef idx="0">
-            <a:schemeClr val="accent1"/>
-          </a:fillRef>
-          <a:effectRef idx="0">
-            <a:schemeClr val="accent1"/>
-          </a:effectRef>
-          <a:fontRef idx="minor">
-            <a:schemeClr val="tx1"/>
-          </a:fontRef>
-        </p:style>
-      </p:cxnSp>
     </p:spTree>
     <p:extLst>
       <p:ext uri="{BB962C8B-B14F-4D97-AF65-F5344CB8AC3E}">
-        <p14:creationId xmlns:p14="http://schemas.microsoft.com/office/powerpoint/2010/main" val="336992443"/>
+        <p14:creationId xmlns:p14="http://schemas.microsoft.com/office/powerpoint/2010/main" val="1476026350"/>
       </p:ext>
     </p:extLst>
   </p:cSld>
@@ -4870,7 +5033,940 @@
     </p:spTree>
     <p:extLst>
       <p:ext uri="{BB962C8B-B14F-4D97-AF65-F5344CB8AC3E}">
-        <p14:creationId xmlns:p14="http://schemas.microsoft.com/office/powerpoint/2010/main" val="947466461"/>
+        <p14:creationId xmlns:p14="http://schemas.microsoft.com/office/powerpoint/2010/main" val="1748979515"/>
+      </p:ext>
+    </p:extLst>
+  </p:cSld>
+  <p:clrMapOvr>
+    <a:masterClrMapping/>
+  </p:clrMapOvr>
+</p:sld>
+</file>
+
+<file path=ppt/slides/slide11.xml><?xml version="1.0" encoding="utf-8"?>
+<p:sld xmlns:a="http://schemas.openxmlformats.org/drawingml/2006/main" xmlns:r="http://schemas.openxmlformats.org/officeDocument/2006/relationships" xmlns:p="http://schemas.openxmlformats.org/presentationml/2006/main">
+  <p:cSld>
+    <p:spTree>
+      <p:nvGrpSpPr>
+        <p:cNvPr id="1" name=""/>
+        <p:cNvGrpSpPr/>
+        <p:nvPr/>
+      </p:nvGrpSpPr>
+      <p:grpSpPr>
+        <a:xfrm>
+          <a:off x="0" y="0"/>
+          <a:ext cx="0" cy="0"/>
+          <a:chOff x="0" y="0"/>
+          <a:chExt cx="0" cy="0"/>
+        </a:xfrm>
+      </p:grpSpPr>
+      <p:sp>
+        <p:nvSpPr>
+          <p:cNvPr id="29" name="Oval 28"/>
+          <p:cNvSpPr/>
+          <p:nvPr/>
+        </p:nvSpPr>
+        <p:spPr>
+          <a:xfrm>
+            <a:off x="767958" y="478808"/>
+            <a:ext cx="1297663" cy="1297663"/>
+          </a:xfrm>
+          <a:prstGeom prst="ellipse">
+            <a:avLst/>
+          </a:prstGeom>
+          <a:solidFill>
+            <a:schemeClr val="bg1">
+              <a:lumMod val="75000"/>
+            </a:schemeClr>
+          </a:solidFill>
+          <a:ln w="38100">
+            <a:solidFill>
+              <a:schemeClr val="tx1"/>
+            </a:solidFill>
+          </a:ln>
+        </p:spPr>
+        <p:style>
+          <a:lnRef idx="2">
+            <a:schemeClr val="accent1">
+              <a:shade val="50000"/>
+            </a:schemeClr>
+          </a:lnRef>
+          <a:fillRef idx="1">
+            <a:schemeClr val="accent1"/>
+          </a:fillRef>
+          <a:effectRef idx="0">
+            <a:schemeClr val="accent1"/>
+          </a:effectRef>
+          <a:fontRef idx="minor">
+            <a:schemeClr val="lt1"/>
+          </a:fontRef>
+        </p:style>
+        <p:txBody>
+          <a:bodyPr rot="0" spcFirstLastPara="0" vertOverflow="overflow" horzOverflow="overflow" vert="horz" wrap="square" lIns="76200" tIns="38100" rIns="76200" bIns="38100" numCol="1" spcCol="0" rtlCol="0" fromWordArt="0" anchor="ctr" anchorCtr="0" forceAA="0" compatLnSpc="1">
+            <a:prstTxWarp prst="textNoShape">
+              <a:avLst/>
+            </a:prstTxWarp>
+            <a:noAutofit/>
+          </a:bodyPr>
+          <a:lstStyle/>
+          <a:p>
+            <a:pPr algn="ctr"/>
+            <a:r>
+              <a:rPr lang="en-US" sz="6666" dirty="0" smtClean="0">
+                <a:solidFill>
+                  <a:srgbClr val="C00000"/>
+                </a:solidFill>
+              </a:rPr>
+              <a:t>X</a:t>
+            </a:r>
+            <a:endParaRPr lang="en-US" sz="6666" dirty="0">
+              <a:solidFill>
+                <a:srgbClr val="C00000"/>
+              </a:solidFill>
+            </a:endParaRPr>
+          </a:p>
+        </p:txBody>
+      </p:sp>
+      <p:sp>
+        <p:nvSpPr>
+          <p:cNvPr id="30" name="Oval 29"/>
+          <p:cNvSpPr/>
+          <p:nvPr/>
+        </p:nvSpPr>
+        <p:spPr>
+          <a:xfrm>
+            <a:off x="767958" y="2843810"/>
+            <a:ext cx="1297663" cy="1297663"/>
+          </a:xfrm>
+          <a:prstGeom prst="ellipse">
+            <a:avLst/>
+          </a:prstGeom>
+          <a:solidFill>
+            <a:schemeClr val="bg1">
+              <a:lumMod val="75000"/>
+            </a:schemeClr>
+          </a:solidFill>
+          <a:ln w="38100">
+            <a:solidFill>
+              <a:schemeClr val="tx1"/>
+            </a:solidFill>
+          </a:ln>
+        </p:spPr>
+        <p:style>
+          <a:lnRef idx="2">
+            <a:schemeClr val="accent1">
+              <a:shade val="50000"/>
+            </a:schemeClr>
+          </a:lnRef>
+          <a:fillRef idx="1">
+            <a:schemeClr val="accent1"/>
+          </a:fillRef>
+          <a:effectRef idx="0">
+            <a:schemeClr val="accent1"/>
+          </a:effectRef>
+          <a:fontRef idx="minor">
+            <a:schemeClr val="lt1"/>
+          </a:fontRef>
+        </p:style>
+        <p:txBody>
+          <a:bodyPr rot="0" spcFirstLastPara="0" vertOverflow="overflow" horzOverflow="overflow" vert="horz" wrap="square" lIns="76200" tIns="38100" rIns="76200" bIns="38100" numCol="1" spcCol="0" rtlCol="0" fromWordArt="0" anchor="ctr" anchorCtr="0" forceAA="0" compatLnSpc="1">
+            <a:prstTxWarp prst="textNoShape">
+              <a:avLst/>
+            </a:prstTxWarp>
+            <a:noAutofit/>
+          </a:bodyPr>
+          <a:lstStyle/>
+          <a:p>
+            <a:pPr algn="ctr"/>
+            <a:r>
+              <a:rPr lang="en-US" sz="6666" dirty="0" smtClean="0">
+                <a:solidFill>
+                  <a:srgbClr val="C00000"/>
+                </a:solidFill>
+              </a:rPr>
+              <a:t>Z</a:t>
+            </a:r>
+            <a:endParaRPr lang="en-US" sz="6666" dirty="0">
+              <a:solidFill>
+                <a:srgbClr val="C00000"/>
+              </a:solidFill>
+            </a:endParaRPr>
+          </a:p>
+        </p:txBody>
+      </p:sp>
+      <p:sp>
+        <p:nvSpPr>
+          <p:cNvPr id="31" name="Oval 30"/>
+          <p:cNvSpPr/>
+          <p:nvPr/>
+        </p:nvSpPr>
+        <p:spPr>
+          <a:xfrm>
+            <a:off x="2501941" y="1662710"/>
+            <a:ext cx="1297663" cy="1297663"/>
+          </a:xfrm>
+          <a:prstGeom prst="ellipse">
+            <a:avLst/>
+          </a:prstGeom>
+          <a:solidFill>
+            <a:schemeClr val="bg1">
+              <a:lumMod val="75000"/>
+            </a:schemeClr>
+          </a:solidFill>
+          <a:ln w="38100">
+            <a:solidFill>
+              <a:schemeClr val="tx1"/>
+            </a:solidFill>
+          </a:ln>
+        </p:spPr>
+        <p:style>
+          <a:lnRef idx="2">
+            <a:schemeClr val="accent1">
+              <a:shade val="50000"/>
+            </a:schemeClr>
+          </a:lnRef>
+          <a:fillRef idx="1">
+            <a:schemeClr val="accent1"/>
+          </a:fillRef>
+          <a:effectRef idx="0">
+            <a:schemeClr val="accent1"/>
+          </a:effectRef>
+          <a:fontRef idx="minor">
+            <a:schemeClr val="lt1"/>
+          </a:fontRef>
+        </p:style>
+        <p:txBody>
+          <a:bodyPr rot="0" spcFirstLastPara="0" vertOverflow="overflow" horzOverflow="overflow" vert="horz" wrap="square" lIns="76200" tIns="38100" rIns="76200" bIns="38100" numCol="1" spcCol="0" rtlCol="0" fromWordArt="0" anchor="ctr" anchorCtr="0" forceAA="0" compatLnSpc="1">
+            <a:prstTxWarp prst="textNoShape">
+              <a:avLst/>
+            </a:prstTxWarp>
+            <a:noAutofit/>
+          </a:bodyPr>
+          <a:lstStyle/>
+          <a:p>
+            <a:pPr algn="ctr"/>
+            <a:r>
+              <a:rPr lang="en-US" sz="6666" dirty="0" smtClean="0">
+                <a:solidFill>
+                  <a:srgbClr val="C00000"/>
+                </a:solidFill>
+              </a:rPr>
+              <a:t>Y</a:t>
+            </a:r>
+            <a:endParaRPr lang="en-US" sz="6666" dirty="0">
+              <a:solidFill>
+                <a:srgbClr val="C00000"/>
+              </a:solidFill>
+            </a:endParaRPr>
+          </a:p>
+        </p:txBody>
+      </p:sp>
+      <p:cxnSp>
+        <p:nvCxnSpPr>
+          <p:cNvPr id="32" name="Straight Arrow Connector 31"/>
+          <p:cNvCxnSpPr>
+            <a:stCxn id="29" idx="6"/>
+            <a:endCxn id="31" idx="1"/>
+          </p:cNvCxnSpPr>
+          <p:nvPr/>
+        </p:nvCxnSpPr>
+        <p:spPr>
+          <a:xfrm>
+            <a:off x="2065621" y="1127640"/>
+            <a:ext cx="626358" cy="725109"/>
+          </a:xfrm>
+          <a:prstGeom prst="straightConnector1">
+            <a:avLst/>
+          </a:prstGeom>
+          <a:ln w="28575">
+            <a:solidFill>
+              <a:schemeClr val="tx1"/>
+            </a:solidFill>
+            <a:prstDash val="sysDot"/>
+            <a:tailEnd type="triangle" w="lg" len="lg"/>
+          </a:ln>
+        </p:spPr>
+        <p:style>
+          <a:lnRef idx="1">
+            <a:schemeClr val="accent1"/>
+          </a:lnRef>
+          <a:fillRef idx="0">
+            <a:schemeClr val="accent1"/>
+          </a:fillRef>
+          <a:effectRef idx="0">
+            <a:schemeClr val="accent1"/>
+          </a:effectRef>
+          <a:fontRef idx="minor">
+            <a:schemeClr val="tx1"/>
+          </a:fontRef>
+        </p:style>
+      </p:cxnSp>
+      <p:cxnSp>
+        <p:nvCxnSpPr>
+          <p:cNvPr id="33" name="Straight Arrow Connector 32"/>
+          <p:cNvCxnSpPr>
+            <a:stCxn id="30" idx="6"/>
+            <a:endCxn id="31" idx="3"/>
+          </p:cNvCxnSpPr>
+          <p:nvPr/>
+        </p:nvCxnSpPr>
+        <p:spPr>
+          <a:xfrm flipV="1">
+            <a:off x="2065621" y="2770335"/>
+            <a:ext cx="626358" cy="722307"/>
+          </a:xfrm>
+          <a:prstGeom prst="straightConnector1">
+            <a:avLst/>
+          </a:prstGeom>
+          <a:ln w="28575">
+            <a:solidFill>
+              <a:schemeClr val="tx1"/>
+            </a:solidFill>
+            <a:prstDash val="sysDot"/>
+            <a:tailEnd type="triangle" w="lg" len="lg"/>
+          </a:ln>
+        </p:spPr>
+        <p:style>
+          <a:lnRef idx="1">
+            <a:schemeClr val="accent1"/>
+          </a:lnRef>
+          <a:fillRef idx="0">
+            <a:schemeClr val="accent1"/>
+          </a:fillRef>
+          <a:effectRef idx="0">
+            <a:schemeClr val="accent1"/>
+          </a:effectRef>
+          <a:fontRef idx="minor">
+            <a:schemeClr val="tx1"/>
+          </a:fontRef>
+        </p:style>
+      </p:cxnSp>
+    </p:spTree>
+    <p:extLst>
+      <p:ext uri="{BB962C8B-B14F-4D97-AF65-F5344CB8AC3E}">
+        <p14:creationId xmlns:p14="http://schemas.microsoft.com/office/powerpoint/2010/main" val="85475496"/>
+      </p:ext>
+    </p:extLst>
+  </p:cSld>
+  <p:clrMapOvr>
+    <a:masterClrMapping/>
+  </p:clrMapOvr>
+</p:sld>
+</file>
+
+<file path=ppt/slides/slide12.xml><?xml version="1.0" encoding="utf-8"?>
+<p:sld xmlns:a="http://schemas.openxmlformats.org/drawingml/2006/main" xmlns:r="http://schemas.openxmlformats.org/officeDocument/2006/relationships" xmlns:p="http://schemas.openxmlformats.org/presentationml/2006/main">
+  <p:cSld>
+    <p:spTree>
+      <p:nvGrpSpPr>
+        <p:cNvPr id="1" name=""/>
+        <p:cNvGrpSpPr/>
+        <p:nvPr/>
+      </p:nvGrpSpPr>
+      <p:grpSpPr>
+        <a:xfrm>
+          <a:off x="0" y="0"/>
+          <a:ext cx="0" cy="0"/>
+          <a:chOff x="0" y="0"/>
+          <a:chExt cx="0" cy="0"/>
+        </a:xfrm>
+      </p:grpSpPr>
+      <p:sp>
+        <p:nvSpPr>
+          <p:cNvPr id="29" name="Oval 28"/>
+          <p:cNvSpPr/>
+          <p:nvPr/>
+        </p:nvSpPr>
+        <p:spPr>
+          <a:xfrm>
+            <a:off x="767958" y="478808"/>
+            <a:ext cx="1297663" cy="1297663"/>
+          </a:xfrm>
+          <a:prstGeom prst="ellipse">
+            <a:avLst/>
+          </a:prstGeom>
+          <a:solidFill>
+            <a:schemeClr val="bg1">
+              <a:lumMod val="75000"/>
+            </a:schemeClr>
+          </a:solidFill>
+          <a:ln w="38100">
+            <a:solidFill>
+              <a:schemeClr val="tx1"/>
+            </a:solidFill>
+          </a:ln>
+        </p:spPr>
+        <p:style>
+          <a:lnRef idx="2">
+            <a:schemeClr val="accent1">
+              <a:shade val="50000"/>
+            </a:schemeClr>
+          </a:lnRef>
+          <a:fillRef idx="1">
+            <a:schemeClr val="accent1"/>
+          </a:fillRef>
+          <a:effectRef idx="0">
+            <a:schemeClr val="accent1"/>
+          </a:effectRef>
+          <a:fontRef idx="minor">
+            <a:schemeClr val="lt1"/>
+          </a:fontRef>
+        </p:style>
+        <p:txBody>
+          <a:bodyPr rot="0" spcFirstLastPara="0" vertOverflow="overflow" horzOverflow="overflow" vert="horz" wrap="square" lIns="76200" tIns="38100" rIns="76200" bIns="38100" numCol="1" spcCol="0" rtlCol="0" fromWordArt="0" anchor="ctr" anchorCtr="0" forceAA="0" compatLnSpc="1">
+            <a:prstTxWarp prst="textNoShape">
+              <a:avLst/>
+            </a:prstTxWarp>
+            <a:noAutofit/>
+          </a:bodyPr>
+          <a:lstStyle/>
+          <a:p>
+            <a:pPr algn="ctr"/>
+            <a:r>
+              <a:rPr lang="en-US" sz="6666" dirty="0" smtClean="0">
+                <a:solidFill>
+                  <a:srgbClr val="C00000"/>
+                </a:solidFill>
+              </a:rPr>
+              <a:t>X</a:t>
+            </a:r>
+            <a:endParaRPr lang="en-US" sz="6666" dirty="0">
+              <a:solidFill>
+                <a:srgbClr val="C00000"/>
+              </a:solidFill>
+            </a:endParaRPr>
+          </a:p>
+        </p:txBody>
+      </p:sp>
+      <p:sp>
+        <p:nvSpPr>
+          <p:cNvPr id="30" name="Oval 29"/>
+          <p:cNvSpPr/>
+          <p:nvPr/>
+        </p:nvSpPr>
+        <p:spPr>
+          <a:xfrm>
+            <a:off x="767958" y="2843810"/>
+            <a:ext cx="1297663" cy="1297663"/>
+          </a:xfrm>
+          <a:prstGeom prst="ellipse">
+            <a:avLst/>
+          </a:prstGeom>
+          <a:solidFill>
+            <a:schemeClr val="bg1">
+              <a:lumMod val="75000"/>
+            </a:schemeClr>
+          </a:solidFill>
+          <a:ln w="38100">
+            <a:solidFill>
+              <a:schemeClr val="tx1"/>
+            </a:solidFill>
+          </a:ln>
+        </p:spPr>
+        <p:style>
+          <a:lnRef idx="2">
+            <a:schemeClr val="accent1">
+              <a:shade val="50000"/>
+            </a:schemeClr>
+          </a:lnRef>
+          <a:fillRef idx="1">
+            <a:schemeClr val="accent1"/>
+          </a:fillRef>
+          <a:effectRef idx="0">
+            <a:schemeClr val="accent1"/>
+          </a:effectRef>
+          <a:fontRef idx="minor">
+            <a:schemeClr val="lt1"/>
+          </a:fontRef>
+        </p:style>
+        <p:txBody>
+          <a:bodyPr rot="0" spcFirstLastPara="0" vertOverflow="overflow" horzOverflow="overflow" vert="horz" wrap="square" lIns="76200" tIns="38100" rIns="76200" bIns="38100" numCol="1" spcCol="0" rtlCol="0" fromWordArt="0" anchor="ctr" anchorCtr="0" forceAA="0" compatLnSpc="1">
+            <a:prstTxWarp prst="textNoShape">
+              <a:avLst/>
+            </a:prstTxWarp>
+            <a:noAutofit/>
+          </a:bodyPr>
+          <a:lstStyle/>
+          <a:p>
+            <a:pPr algn="ctr"/>
+            <a:r>
+              <a:rPr lang="en-US" sz="6666" dirty="0" smtClean="0">
+                <a:solidFill>
+                  <a:srgbClr val="C00000"/>
+                </a:solidFill>
+              </a:rPr>
+              <a:t>Z</a:t>
+            </a:r>
+            <a:endParaRPr lang="en-US" sz="6666" dirty="0">
+              <a:solidFill>
+                <a:srgbClr val="C00000"/>
+              </a:solidFill>
+            </a:endParaRPr>
+          </a:p>
+        </p:txBody>
+      </p:sp>
+      <p:sp>
+        <p:nvSpPr>
+          <p:cNvPr id="31" name="Oval 30"/>
+          <p:cNvSpPr/>
+          <p:nvPr/>
+        </p:nvSpPr>
+        <p:spPr>
+          <a:xfrm>
+            <a:off x="2501941" y="1662710"/>
+            <a:ext cx="1297663" cy="1297663"/>
+          </a:xfrm>
+          <a:prstGeom prst="ellipse">
+            <a:avLst/>
+          </a:prstGeom>
+          <a:solidFill>
+            <a:schemeClr val="bg1">
+              <a:lumMod val="75000"/>
+            </a:schemeClr>
+          </a:solidFill>
+          <a:ln w="38100">
+            <a:solidFill>
+              <a:schemeClr val="tx1"/>
+            </a:solidFill>
+          </a:ln>
+        </p:spPr>
+        <p:style>
+          <a:lnRef idx="2">
+            <a:schemeClr val="accent1">
+              <a:shade val="50000"/>
+            </a:schemeClr>
+          </a:lnRef>
+          <a:fillRef idx="1">
+            <a:schemeClr val="accent1"/>
+          </a:fillRef>
+          <a:effectRef idx="0">
+            <a:schemeClr val="accent1"/>
+          </a:effectRef>
+          <a:fontRef idx="minor">
+            <a:schemeClr val="lt1"/>
+          </a:fontRef>
+        </p:style>
+        <p:txBody>
+          <a:bodyPr rot="0" spcFirstLastPara="0" vertOverflow="overflow" horzOverflow="overflow" vert="horz" wrap="square" lIns="76200" tIns="38100" rIns="76200" bIns="38100" numCol="1" spcCol="0" rtlCol="0" fromWordArt="0" anchor="ctr" anchorCtr="0" forceAA="0" compatLnSpc="1">
+            <a:prstTxWarp prst="textNoShape">
+              <a:avLst/>
+            </a:prstTxWarp>
+            <a:noAutofit/>
+          </a:bodyPr>
+          <a:lstStyle/>
+          <a:p>
+            <a:pPr algn="ctr"/>
+            <a:r>
+              <a:rPr lang="en-US" sz="6666" dirty="0" smtClean="0">
+                <a:solidFill>
+                  <a:srgbClr val="C00000"/>
+                </a:solidFill>
+              </a:rPr>
+              <a:t>Y</a:t>
+            </a:r>
+            <a:endParaRPr lang="en-US" sz="6666" dirty="0">
+              <a:solidFill>
+                <a:srgbClr val="C00000"/>
+              </a:solidFill>
+            </a:endParaRPr>
+          </a:p>
+        </p:txBody>
+      </p:sp>
+      <p:cxnSp>
+        <p:nvCxnSpPr>
+          <p:cNvPr id="32" name="Straight Arrow Connector 31"/>
+          <p:cNvCxnSpPr>
+            <a:stCxn id="29" idx="6"/>
+            <a:endCxn id="31" idx="1"/>
+          </p:cNvCxnSpPr>
+          <p:nvPr/>
+        </p:nvCxnSpPr>
+        <p:spPr>
+          <a:xfrm>
+            <a:off x="2065621" y="1127640"/>
+            <a:ext cx="626358" cy="725109"/>
+          </a:xfrm>
+          <a:prstGeom prst="straightConnector1">
+            <a:avLst/>
+          </a:prstGeom>
+          <a:ln w="45720">
+            <a:solidFill>
+              <a:schemeClr val="tx1"/>
+            </a:solidFill>
+            <a:prstDash val="solid"/>
+            <a:tailEnd type="triangle" w="lg" len="lg"/>
+          </a:ln>
+        </p:spPr>
+        <p:style>
+          <a:lnRef idx="1">
+            <a:schemeClr val="accent1"/>
+          </a:lnRef>
+          <a:fillRef idx="0">
+            <a:schemeClr val="accent1"/>
+          </a:fillRef>
+          <a:effectRef idx="0">
+            <a:schemeClr val="accent1"/>
+          </a:effectRef>
+          <a:fontRef idx="minor">
+            <a:schemeClr val="tx1"/>
+          </a:fontRef>
+        </p:style>
+      </p:cxnSp>
+      <p:cxnSp>
+        <p:nvCxnSpPr>
+          <p:cNvPr id="33" name="Straight Arrow Connector 32"/>
+          <p:cNvCxnSpPr>
+            <a:stCxn id="30" idx="6"/>
+            <a:endCxn id="31" idx="3"/>
+          </p:cNvCxnSpPr>
+          <p:nvPr/>
+        </p:nvCxnSpPr>
+        <p:spPr>
+          <a:xfrm flipV="1">
+            <a:off x="2065621" y="2770335"/>
+            <a:ext cx="626358" cy="722307"/>
+          </a:xfrm>
+          <a:prstGeom prst="straightConnector1">
+            <a:avLst/>
+          </a:prstGeom>
+          <a:ln w="45720">
+            <a:solidFill>
+              <a:schemeClr val="tx1"/>
+            </a:solidFill>
+            <a:prstDash val="solid"/>
+            <a:tailEnd type="triangle" w="lg" len="lg"/>
+          </a:ln>
+        </p:spPr>
+        <p:style>
+          <a:lnRef idx="1">
+            <a:schemeClr val="accent1"/>
+          </a:lnRef>
+          <a:fillRef idx="0">
+            <a:schemeClr val="accent1"/>
+          </a:fillRef>
+          <a:effectRef idx="0">
+            <a:schemeClr val="accent1"/>
+          </a:effectRef>
+          <a:fontRef idx="minor">
+            <a:schemeClr val="tx1"/>
+          </a:fontRef>
+        </p:style>
+      </p:cxnSp>
+    </p:spTree>
+    <p:extLst>
+      <p:ext uri="{BB962C8B-B14F-4D97-AF65-F5344CB8AC3E}">
+        <p14:creationId xmlns:p14="http://schemas.microsoft.com/office/powerpoint/2010/main" val="1084984884"/>
+      </p:ext>
+    </p:extLst>
+  </p:cSld>
+  <p:clrMapOvr>
+    <a:masterClrMapping/>
+  </p:clrMapOvr>
+</p:sld>
+</file>
+
+<file path=ppt/slides/slide13.xml><?xml version="1.0" encoding="utf-8"?>
+<p:sld xmlns:a="http://schemas.openxmlformats.org/drawingml/2006/main" xmlns:r="http://schemas.openxmlformats.org/officeDocument/2006/relationships" xmlns:p="http://schemas.openxmlformats.org/presentationml/2006/main">
+  <p:cSld>
+    <p:spTree>
+      <p:nvGrpSpPr>
+        <p:cNvPr id="1" name=""/>
+        <p:cNvGrpSpPr/>
+        <p:nvPr/>
+      </p:nvGrpSpPr>
+      <p:grpSpPr>
+        <a:xfrm>
+          <a:off x="0" y="0"/>
+          <a:ext cx="0" cy="0"/>
+          <a:chOff x="0" y="0"/>
+          <a:chExt cx="0" cy="0"/>
+        </a:xfrm>
+      </p:grpSpPr>
+      <p:sp>
+        <p:nvSpPr>
+          <p:cNvPr id="29" name="Oval 28"/>
+          <p:cNvSpPr/>
+          <p:nvPr/>
+        </p:nvSpPr>
+        <p:spPr>
+          <a:xfrm>
+            <a:off x="767958" y="478808"/>
+            <a:ext cx="1297663" cy="1297663"/>
+          </a:xfrm>
+          <a:prstGeom prst="ellipse">
+            <a:avLst/>
+          </a:prstGeom>
+          <a:solidFill>
+            <a:schemeClr val="bg1">
+              <a:lumMod val="75000"/>
+            </a:schemeClr>
+          </a:solidFill>
+          <a:ln w="38100">
+            <a:solidFill>
+              <a:schemeClr val="tx1"/>
+            </a:solidFill>
+          </a:ln>
+        </p:spPr>
+        <p:style>
+          <a:lnRef idx="2">
+            <a:schemeClr val="accent1">
+              <a:shade val="50000"/>
+            </a:schemeClr>
+          </a:lnRef>
+          <a:fillRef idx="1">
+            <a:schemeClr val="accent1"/>
+          </a:fillRef>
+          <a:effectRef idx="0">
+            <a:schemeClr val="accent1"/>
+          </a:effectRef>
+          <a:fontRef idx="minor">
+            <a:schemeClr val="lt1"/>
+          </a:fontRef>
+        </p:style>
+        <p:txBody>
+          <a:bodyPr rot="0" spcFirstLastPara="0" vertOverflow="overflow" horzOverflow="overflow" vert="horz" wrap="square" lIns="76200" tIns="38100" rIns="76200" bIns="38100" numCol="1" spcCol="0" rtlCol="0" fromWordArt="0" anchor="ctr" anchorCtr="0" forceAA="0" compatLnSpc="1">
+            <a:prstTxWarp prst="textNoShape">
+              <a:avLst/>
+            </a:prstTxWarp>
+            <a:noAutofit/>
+          </a:bodyPr>
+          <a:lstStyle/>
+          <a:p>
+            <a:pPr algn="ctr"/>
+            <a:r>
+              <a:rPr lang="en-US" sz="6666" dirty="0" smtClean="0">
+                <a:solidFill>
+                  <a:srgbClr val="C00000"/>
+                </a:solidFill>
+              </a:rPr>
+              <a:t>X</a:t>
+            </a:r>
+            <a:endParaRPr lang="en-US" sz="6666" dirty="0">
+              <a:solidFill>
+                <a:srgbClr val="C00000"/>
+              </a:solidFill>
+            </a:endParaRPr>
+          </a:p>
+        </p:txBody>
+      </p:sp>
+      <p:sp>
+        <p:nvSpPr>
+          <p:cNvPr id="30" name="Oval 29"/>
+          <p:cNvSpPr/>
+          <p:nvPr/>
+        </p:nvSpPr>
+        <p:spPr>
+          <a:xfrm>
+            <a:off x="767958" y="2843810"/>
+            <a:ext cx="1297663" cy="1297663"/>
+          </a:xfrm>
+          <a:prstGeom prst="ellipse">
+            <a:avLst/>
+          </a:prstGeom>
+          <a:solidFill>
+            <a:schemeClr val="bg1">
+              <a:lumMod val="75000"/>
+            </a:schemeClr>
+          </a:solidFill>
+          <a:ln w="38100">
+            <a:solidFill>
+              <a:schemeClr val="tx1"/>
+            </a:solidFill>
+          </a:ln>
+        </p:spPr>
+        <p:style>
+          <a:lnRef idx="2">
+            <a:schemeClr val="accent1">
+              <a:shade val="50000"/>
+            </a:schemeClr>
+          </a:lnRef>
+          <a:fillRef idx="1">
+            <a:schemeClr val="accent1"/>
+          </a:fillRef>
+          <a:effectRef idx="0">
+            <a:schemeClr val="accent1"/>
+          </a:effectRef>
+          <a:fontRef idx="minor">
+            <a:schemeClr val="lt1"/>
+          </a:fontRef>
+        </p:style>
+        <p:txBody>
+          <a:bodyPr rot="0" spcFirstLastPara="0" vertOverflow="overflow" horzOverflow="overflow" vert="horz" wrap="square" lIns="76200" tIns="38100" rIns="76200" bIns="38100" numCol="1" spcCol="0" rtlCol="0" fromWordArt="0" anchor="ctr" anchorCtr="0" forceAA="0" compatLnSpc="1">
+            <a:prstTxWarp prst="textNoShape">
+              <a:avLst/>
+            </a:prstTxWarp>
+            <a:noAutofit/>
+          </a:bodyPr>
+          <a:lstStyle/>
+          <a:p>
+            <a:pPr algn="ctr"/>
+            <a:r>
+              <a:rPr lang="en-US" sz="6666" dirty="0" smtClean="0">
+                <a:solidFill>
+                  <a:srgbClr val="C00000"/>
+                </a:solidFill>
+              </a:rPr>
+              <a:t>Z</a:t>
+            </a:r>
+            <a:endParaRPr lang="en-US" sz="6666" dirty="0">
+              <a:solidFill>
+                <a:srgbClr val="C00000"/>
+              </a:solidFill>
+            </a:endParaRPr>
+          </a:p>
+        </p:txBody>
+      </p:sp>
+      <p:sp>
+        <p:nvSpPr>
+          <p:cNvPr id="31" name="Oval 30"/>
+          <p:cNvSpPr/>
+          <p:nvPr/>
+        </p:nvSpPr>
+        <p:spPr>
+          <a:xfrm>
+            <a:off x="2501941" y="1662710"/>
+            <a:ext cx="1297663" cy="1297663"/>
+          </a:xfrm>
+          <a:prstGeom prst="ellipse">
+            <a:avLst/>
+          </a:prstGeom>
+          <a:solidFill>
+            <a:schemeClr val="bg1">
+              <a:lumMod val="75000"/>
+            </a:schemeClr>
+          </a:solidFill>
+          <a:ln w="38100">
+            <a:solidFill>
+              <a:schemeClr val="tx1"/>
+            </a:solidFill>
+          </a:ln>
+        </p:spPr>
+        <p:style>
+          <a:lnRef idx="2">
+            <a:schemeClr val="accent1">
+              <a:shade val="50000"/>
+            </a:schemeClr>
+          </a:lnRef>
+          <a:fillRef idx="1">
+            <a:schemeClr val="accent1"/>
+          </a:fillRef>
+          <a:effectRef idx="0">
+            <a:schemeClr val="accent1"/>
+          </a:effectRef>
+          <a:fontRef idx="minor">
+            <a:schemeClr val="lt1"/>
+          </a:fontRef>
+        </p:style>
+        <p:txBody>
+          <a:bodyPr rot="0" spcFirstLastPara="0" vertOverflow="overflow" horzOverflow="overflow" vert="horz" wrap="square" lIns="76200" tIns="38100" rIns="76200" bIns="38100" numCol="1" spcCol="0" rtlCol="0" fromWordArt="0" anchor="ctr" anchorCtr="0" forceAA="0" compatLnSpc="1">
+            <a:prstTxWarp prst="textNoShape">
+              <a:avLst/>
+            </a:prstTxWarp>
+            <a:noAutofit/>
+          </a:bodyPr>
+          <a:lstStyle/>
+          <a:p>
+            <a:pPr algn="ctr"/>
+            <a:r>
+              <a:rPr lang="en-US" sz="6666" dirty="0" smtClean="0">
+                <a:solidFill>
+                  <a:srgbClr val="C00000"/>
+                </a:solidFill>
+              </a:rPr>
+              <a:t>Y</a:t>
+            </a:r>
+            <a:endParaRPr lang="en-US" sz="6666" dirty="0">
+              <a:solidFill>
+                <a:srgbClr val="C00000"/>
+              </a:solidFill>
+            </a:endParaRPr>
+          </a:p>
+        </p:txBody>
+      </p:sp>
+      <p:cxnSp>
+        <p:nvCxnSpPr>
+          <p:cNvPr id="32" name="Straight Arrow Connector 31"/>
+          <p:cNvCxnSpPr>
+            <a:stCxn id="29" idx="6"/>
+            <a:endCxn id="31" idx="1"/>
+          </p:cNvCxnSpPr>
+          <p:nvPr/>
+        </p:nvCxnSpPr>
+        <p:spPr>
+          <a:xfrm>
+            <a:off x="2065621" y="1127640"/>
+            <a:ext cx="626358" cy="725109"/>
+          </a:xfrm>
+          <a:prstGeom prst="straightConnector1">
+            <a:avLst/>
+          </a:prstGeom>
+          <a:ln w="83820">
+            <a:solidFill>
+              <a:schemeClr val="tx1"/>
+            </a:solidFill>
+            <a:prstDash val="solid"/>
+            <a:tailEnd type="triangle" w="lg" len="lg"/>
+          </a:ln>
+        </p:spPr>
+        <p:style>
+          <a:lnRef idx="1">
+            <a:schemeClr val="accent1"/>
+          </a:lnRef>
+          <a:fillRef idx="0">
+            <a:schemeClr val="accent1"/>
+          </a:fillRef>
+          <a:effectRef idx="0">
+            <a:schemeClr val="accent1"/>
+          </a:effectRef>
+          <a:fontRef idx="minor">
+            <a:schemeClr val="tx1"/>
+          </a:fontRef>
+        </p:style>
+      </p:cxnSp>
+      <p:cxnSp>
+        <p:nvCxnSpPr>
+          <p:cNvPr id="33" name="Straight Arrow Connector 32"/>
+          <p:cNvCxnSpPr>
+            <a:stCxn id="30" idx="6"/>
+            <a:endCxn id="31" idx="3"/>
+          </p:cNvCxnSpPr>
+          <p:nvPr/>
+        </p:nvCxnSpPr>
+        <p:spPr>
+          <a:xfrm flipV="1">
+            <a:off x="2065621" y="2770335"/>
+            <a:ext cx="626358" cy="722307"/>
+          </a:xfrm>
+          <a:prstGeom prst="straightConnector1">
+            <a:avLst/>
+          </a:prstGeom>
+          <a:ln w="83820">
+            <a:solidFill>
+              <a:schemeClr val="tx1"/>
+            </a:solidFill>
+            <a:prstDash val="solid"/>
+            <a:tailEnd type="triangle" w="lg" len="lg"/>
+          </a:ln>
+        </p:spPr>
+        <p:style>
+          <a:lnRef idx="1">
+            <a:schemeClr val="accent1"/>
+          </a:lnRef>
+          <a:fillRef idx="0">
+            <a:schemeClr val="accent1"/>
+          </a:fillRef>
+          <a:effectRef idx="0">
+            <a:schemeClr val="accent1"/>
+          </a:effectRef>
+          <a:fontRef idx="minor">
+            <a:schemeClr val="tx1"/>
+          </a:fontRef>
+        </p:style>
+      </p:cxnSp>
+    </p:spTree>
+    <p:extLst>
+      <p:ext uri="{BB962C8B-B14F-4D97-AF65-F5344CB8AC3E}">
+        <p14:creationId xmlns:p14="http://schemas.microsoft.com/office/powerpoint/2010/main" val="118433597"/>
       </p:ext>
     </p:extLst>
   </p:cSld>
@@ -4905,7 +6001,7 @@
         </p:nvSpPr>
         <p:spPr>
           <a:xfrm>
-            <a:off x="767958" y="478808"/>
+            <a:off x="385577" y="1662710"/>
             <a:ext cx="1297663" cy="1297663"/>
           </a:xfrm>
           <a:prstGeom prst="ellipse">
@@ -4966,13 +6062,13 @@
       </p:sp>
       <p:sp>
         <p:nvSpPr>
-          <p:cNvPr id="30" name="Oval 29"/>
+          <p:cNvPr id="31" name="Oval 30"/>
           <p:cNvSpPr/>
           <p:nvPr/>
         </p:nvSpPr>
         <p:spPr>
           <a:xfrm>
-            <a:off x="767958" y="2843810"/>
+            <a:off x="2668191" y="1662710"/>
             <a:ext cx="1297663" cy="1297663"/>
           </a:xfrm>
           <a:prstGeom prst="ellipse">
@@ -5021,7 +6117,7 @@
                   <a:srgbClr val="C00000"/>
                 </a:solidFill>
               </a:rPr>
-              <a:t>Z</a:t>
+              <a:t>Y</a:t>
             </a:r>
             <a:endParaRPr lang="en-US" sz="6666" dirty="0">
               <a:solidFill>
@@ -5031,86 +6127,19 @@
           </a:p>
         </p:txBody>
       </p:sp>
-      <p:sp>
-        <p:nvSpPr>
-          <p:cNvPr id="31" name="Oval 30"/>
-          <p:cNvSpPr/>
-          <p:nvPr/>
-        </p:nvSpPr>
-        <p:spPr>
-          <a:xfrm>
-            <a:off x="2501941" y="1662710"/>
-            <a:ext cx="1297663" cy="1297663"/>
-          </a:xfrm>
-          <a:prstGeom prst="ellipse">
-            <a:avLst/>
-          </a:prstGeom>
-          <a:solidFill>
-            <a:schemeClr val="bg1">
-              <a:lumMod val="75000"/>
-            </a:schemeClr>
-          </a:solidFill>
-          <a:ln w="38100">
-            <a:solidFill>
-              <a:schemeClr val="tx1"/>
-            </a:solidFill>
-          </a:ln>
-        </p:spPr>
-        <p:style>
-          <a:lnRef idx="2">
-            <a:schemeClr val="accent1">
-              <a:shade val="50000"/>
-            </a:schemeClr>
-          </a:lnRef>
-          <a:fillRef idx="1">
-            <a:schemeClr val="accent1"/>
-          </a:fillRef>
-          <a:effectRef idx="0">
-            <a:schemeClr val="accent1"/>
-          </a:effectRef>
-          <a:fontRef idx="minor">
-            <a:schemeClr val="lt1"/>
-          </a:fontRef>
-        </p:style>
-        <p:txBody>
-          <a:bodyPr rot="0" spcFirstLastPara="0" vertOverflow="overflow" horzOverflow="overflow" vert="horz" wrap="square" lIns="76200" tIns="38100" rIns="76200" bIns="38100" numCol="1" spcCol="0" rtlCol="0" fromWordArt="0" anchor="ctr" anchorCtr="0" forceAA="0" compatLnSpc="1">
-            <a:prstTxWarp prst="textNoShape">
-              <a:avLst/>
-            </a:prstTxWarp>
-            <a:noAutofit/>
-          </a:bodyPr>
-          <a:lstStyle/>
-          <a:p>
-            <a:pPr algn="ctr"/>
-            <a:r>
-              <a:rPr lang="en-US" sz="6666" dirty="0" smtClean="0">
-                <a:solidFill>
-                  <a:srgbClr val="C00000"/>
-                </a:solidFill>
-              </a:rPr>
-              <a:t>Y</a:t>
-            </a:r>
-            <a:endParaRPr lang="en-US" sz="6666" dirty="0">
-              <a:solidFill>
-                <a:srgbClr val="C00000"/>
-              </a:solidFill>
-            </a:endParaRPr>
-          </a:p>
-        </p:txBody>
-      </p:sp>
       <p:cxnSp>
         <p:nvCxnSpPr>
           <p:cNvPr id="32" name="Straight Arrow Connector 31"/>
           <p:cNvCxnSpPr>
             <a:stCxn id="29" idx="6"/>
-            <a:endCxn id="31" idx="1"/>
+            <a:endCxn id="31" idx="2"/>
           </p:cNvCxnSpPr>
           <p:nvPr/>
         </p:nvCxnSpPr>
         <p:spPr>
           <a:xfrm>
-            <a:off x="2065621" y="1127640"/>
-            <a:ext cx="626358" cy="725109"/>
+            <a:off x="1683240" y="2311542"/>
+            <a:ext cx="984951" cy="0"/>
           </a:xfrm>
           <a:prstGeom prst="straightConnector1">
             <a:avLst/>
@@ -5138,50 +6167,10 @@
           </a:fontRef>
         </p:style>
       </p:cxnSp>
-      <p:cxnSp>
-        <p:nvCxnSpPr>
-          <p:cNvPr id="33" name="Straight Arrow Connector 32"/>
-          <p:cNvCxnSpPr>
-            <a:stCxn id="30" idx="6"/>
-            <a:endCxn id="31" idx="3"/>
-          </p:cNvCxnSpPr>
-          <p:nvPr/>
-        </p:nvCxnSpPr>
-        <p:spPr>
-          <a:xfrm flipV="1">
-            <a:off x="2065621" y="2770335"/>
-            <a:ext cx="626358" cy="722307"/>
-          </a:xfrm>
-          <a:prstGeom prst="straightConnector1">
-            <a:avLst/>
-          </a:prstGeom>
-          <a:ln w="45720">
-            <a:solidFill>
-              <a:schemeClr val="tx1"/>
-            </a:solidFill>
-            <a:prstDash val="solid"/>
-            <a:tailEnd type="triangle" w="lg" len="lg"/>
-          </a:ln>
-        </p:spPr>
-        <p:style>
-          <a:lnRef idx="1">
-            <a:schemeClr val="accent1"/>
-          </a:lnRef>
-          <a:fillRef idx="0">
-            <a:schemeClr val="accent1"/>
-          </a:fillRef>
-          <a:effectRef idx="0">
-            <a:schemeClr val="accent1"/>
-          </a:effectRef>
-          <a:fontRef idx="minor">
-            <a:schemeClr val="tx1"/>
-          </a:fontRef>
-        </p:style>
-      </p:cxnSp>
     </p:spTree>
     <p:extLst>
       <p:ext uri="{BB962C8B-B14F-4D97-AF65-F5344CB8AC3E}">
-        <p14:creationId xmlns:p14="http://schemas.microsoft.com/office/powerpoint/2010/main" val="1134826545"/>
+        <p14:creationId xmlns:p14="http://schemas.microsoft.com/office/powerpoint/2010/main" val="70929156"/>
       </p:ext>
     </p:extLst>
   </p:cSld>
@@ -5216,7 +6205,7 @@
         </p:nvSpPr>
         <p:spPr>
           <a:xfrm>
-            <a:off x="767958" y="478808"/>
+            <a:off x="385577" y="1662710"/>
             <a:ext cx="1297663" cy="1297663"/>
           </a:xfrm>
           <a:prstGeom prst="ellipse">
@@ -5277,13 +6266,13 @@
       </p:sp>
       <p:sp>
         <p:nvSpPr>
-          <p:cNvPr id="30" name="Oval 29"/>
+          <p:cNvPr id="31" name="Oval 30"/>
           <p:cNvSpPr/>
           <p:nvPr/>
         </p:nvSpPr>
         <p:spPr>
           <a:xfrm>
-            <a:off x="767958" y="2843810"/>
+            <a:off x="2668191" y="1662710"/>
             <a:ext cx="1297663" cy="1297663"/>
           </a:xfrm>
           <a:prstGeom prst="ellipse">
@@ -5332,7 +6321,7 @@
                   <a:srgbClr val="C00000"/>
                 </a:solidFill>
               </a:rPr>
-              <a:t>Z</a:t>
+              <a:t>Y</a:t>
             </a:r>
             <a:endParaRPr lang="en-US" sz="6666" dirty="0">
               <a:solidFill>
@@ -5342,86 +6331,19 @@
           </a:p>
         </p:txBody>
       </p:sp>
-      <p:sp>
-        <p:nvSpPr>
-          <p:cNvPr id="31" name="Oval 30"/>
-          <p:cNvSpPr/>
-          <p:nvPr/>
-        </p:nvSpPr>
-        <p:spPr>
-          <a:xfrm>
-            <a:off x="2501941" y="1662710"/>
-            <a:ext cx="1297663" cy="1297663"/>
-          </a:xfrm>
-          <a:prstGeom prst="ellipse">
-            <a:avLst/>
-          </a:prstGeom>
-          <a:solidFill>
-            <a:schemeClr val="bg1">
-              <a:lumMod val="75000"/>
-            </a:schemeClr>
-          </a:solidFill>
-          <a:ln w="38100">
-            <a:solidFill>
-              <a:schemeClr val="tx1"/>
-            </a:solidFill>
-          </a:ln>
-        </p:spPr>
-        <p:style>
-          <a:lnRef idx="2">
-            <a:schemeClr val="accent1">
-              <a:shade val="50000"/>
-            </a:schemeClr>
-          </a:lnRef>
-          <a:fillRef idx="1">
-            <a:schemeClr val="accent1"/>
-          </a:fillRef>
-          <a:effectRef idx="0">
-            <a:schemeClr val="accent1"/>
-          </a:effectRef>
-          <a:fontRef idx="minor">
-            <a:schemeClr val="lt1"/>
-          </a:fontRef>
-        </p:style>
-        <p:txBody>
-          <a:bodyPr rot="0" spcFirstLastPara="0" vertOverflow="overflow" horzOverflow="overflow" vert="horz" wrap="square" lIns="76200" tIns="38100" rIns="76200" bIns="38100" numCol="1" spcCol="0" rtlCol="0" fromWordArt="0" anchor="ctr" anchorCtr="0" forceAA="0" compatLnSpc="1">
-            <a:prstTxWarp prst="textNoShape">
-              <a:avLst/>
-            </a:prstTxWarp>
-            <a:noAutofit/>
-          </a:bodyPr>
-          <a:lstStyle/>
-          <a:p>
-            <a:pPr algn="ctr"/>
-            <a:r>
-              <a:rPr lang="en-US" sz="6666" dirty="0" smtClean="0">
-                <a:solidFill>
-                  <a:srgbClr val="C00000"/>
-                </a:solidFill>
-              </a:rPr>
-              <a:t>Y</a:t>
-            </a:r>
-            <a:endParaRPr lang="en-US" sz="6666" dirty="0">
-              <a:solidFill>
-                <a:srgbClr val="C00000"/>
-              </a:solidFill>
-            </a:endParaRPr>
-          </a:p>
-        </p:txBody>
-      </p:sp>
       <p:cxnSp>
         <p:nvCxnSpPr>
           <p:cNvPr id="32" name="Straight Arrow Connector 31"/>
           <p:cNvCxnSpPr>
             <a:stCxn id="29" idx="6"/>
-            <a:endCxn id="31" idx="1"/>
+            <a:endCxn id="31" idx="2"/>
           </p:cNvCxnSpPr>
           <p:nvPr/>
         </p:nvCxnSpPr>
         <p:spPr>
           <a:xfrm>
-            <a:off x="2065621" y="1127640"/>
-            <a:ext cx="626358" cy="725109"/>
+            <a:off x="1683240" y="2311542"/>
+            <a:ext cx="984951" cy="0"/>
           </a:xfrm>
           <a:prstGeom prst="straightConnector1">
             <a:avLst/>
@@ -5449,50 +6371,10 @@
           </a:fontRef>
         </p:style>
       </p:cxnSp>
-      <p:cxnSp>
-        <p:nvCxnSpPr>
-          <p:cNvPr id="33" name="Straight Arrow Connector 32"/>
-          <p:cNvCxnSpPr>
-            <a:stCxn id="30" idx="6"/>
-            <a:endCxn id="31" idx="3"/>
-          </p:cNvCxnSpPr>
-          <p:nvPr/>
-        </p:nvCxnSpPr>
-        <p:spPr>
-          <a:xfrm flipV="1">
-            <a:off x="2065621" y="2770335"/>
-            <a:ext cx="626358" cy="722307"/>
-          </a:xfrm>
-          <a:prstGeom prst="straightConnector1">
-            <a:avLst/>
-          </a:prstGeom>
-          <a:ln w="83820">
-            <a:solidFill>
-              <a:schemeClr val="tx1"/>
-            </a:solidFill>
-            <a:prstDash val="solid"/>
-            <a:tailEnd type="triangle" w="lg" len="lg"/>
-          </a:ln>
-        </p:spPr>
-        <p:style>
-          <a:lnRef idx="1">
-            <a:schemeClr val="accent1"/>
-          </a:lnRef>
-          <a:fillRef idx="0">
-            <a:schemeClr val="accent1"/>
-          </a:fillRef>
-          <a:effectRef idx="0">
-            <a:schemeClr val="accent1"/>
-          </a:effectRef>
-          <a:fontRef idx="minor">
-            <a:schemeClr val="tx1"/>
-          </a:fontRef>
-        </p:style>
-      </p:cxnSp>
     </p:spTree>
     <p:extLst>
       <p:ext uri="{BB962C8B-B14F-4D97-AF65-F5344CB8AC3E}">
-        <p14:creationId xmlns:p14="http://schemas.microsoft.com/office/powerpoint/2010/main" val="994839325"/>
+        <p14:creationId xmlns:p14="http://schemas.microsoft.com/office/powerpoint/2010/main" val="1624826746"/>
       </p:ext>
     </p:extLst>
   </p:cSld>
@@ -5838,7 +6720,7 @@
         </p:nvSpPr>
         <p:spPr>
           <a:xfrm>
-            <a:off x="767958" y="478808"/>
+            <a:off x="1732234" y="1492961"/>
             <a:ext cx="1297663" cy="1297663"/>
           </a:xfrm>
           <a:prstGeom prst="ellipse">
@@ -5897,73 +6779,6 @@
           </a:p>
         </p:txBody>
       </p:sp>
-      <p:sp>
-        <p:nvSpPr>
-          <p:cNvPr id="30" name="Oval 29"/>
-          <p:cNvSpPr/>
-          <p:nvPr/>
-        </p:nvSpPr>
-        <p:spPr>
-          <a:xfrm>
-            <a:off x="767958" y="2843810"/>
-            <a:ext cx="1297663" cy="1297663"/>
-          </a:xfrm>
-          <a:prstGeom prst="ellipse">
-            <a:avLst/>
-          </a:prstGeom>
-          <a:solidFill>
-            <a:schemeClr val="bg1">
-              <a:lumMod val="75000"/>
-            </a:schemeClr>
-          </a:solidFill>
-          <a:ln w="38100">
-            <a:solidFill>
-              <a:schemeClr val="tx1"/>
-            </a:solidFill>
-          </a:ln>
-        </p:spPr>
-        <p:style>
-          <a:lnRef idx="2">
-            <a:schemeClr val="accent1">
-              <a:shade val="50000"/>
-            </a:schemeClr>
-          </a:lnRef>
-          <a:fillRef idx="1">
-            <a:schemeClr val="accent1"/>
-          </a:fillRef>
-          <a:effectRef idx="0">
-            <a:schemeClr val="accent1"/>
-          </a:effectRef>
-          <a:fontRef idx="minor">
-            <a:schemeClr val="lt1"/>
-          </a:fontRef>
-        </p:style>
-        <p:txBody>
-          <a:bodyPr rot="0" spcFirstLastPara="0" vertOverflow="overflow" horzOverflow="overflow" vert="horz" wrap="square" lIns="76200" tIns="38100" rIns="76200" bIns="38100" numCol="1" spcCol="0" rtlCol="0" fromWordArt="0" anchor="ctr" anchorCtr="0" forceAA="0" compatLnSpc="1">
-            <a:prstTxWarp prst="textNoShape">
-              <a:avLst/>
-            </a:prstTxWarp>
-            <a:noAutofit/>
-          </a:bodyPr>
-          <a:lstStyle/>
-          <a:p>
-            <a:pPr algn="ctr"/>
-            <a:r>
-              <a:rPr lang="en-US" sz="6666" dirty="0" smtClean="0">
-                <a:solidFill>
-                  <a:srgbClr val="C00000"/>
-                </a:solidFill>
-              </a:rPr>
-              <a:t>Z</a:t>
-            </a:r>
-            <a:endParaRPr lang="en-US" sz="6666" dirty="0">
-              <a:solidFill>
-                <a:srgbClr val="C00000"/>
-              </a:solidFill>
-            </a:endParaRPr>
-          </a:p>
-        </p:txBody>
-      </p:sp>
       <p:cxnSp>
         <p:nvCxnSpPr>
           <p:cNvPr id="45" name="Straight Arrow Connector 44"/>
@@ -5974,7 +6789,7 @@
         </p:nvCxnSpPr>
         <p:spPr>
           <a:xfrm>
-            <a:off x="88121" y="1127639"/>
+            <a:off x="1052397" y="2141792"/>
             <a:ext cx="679837" cy="0"/>
           </a:xfrm>
           <a:prstGeom prst="straightConnector1">
@@ -6003,47 +6818,10 @@
           </a:fontRef>
         </p:style>
       </p:cxnSp>
-      <p:cxnSp>
-        <p:nvCxnSpPr>
-          <p:cNvPr id="10" name="Straight Arrow Connector 9"/>
-          <p:cNvCxnSpPr/>
-          <p:nvPr/>
-        </p:nvCxnSpPr>
-        <p:spPr>
-          <a:xfrm>
-            <a:off x="88121" y="3492642"/>
-            <a:ext cx="679837" cy="0"/>
-          </a:xfrm>
-          <a:prstGeom prst="straightConnector1">
-            <a:avLst/>
-          </a:prstGeom>
-          <a:ln w="28575">
-            <a:solidFill>
-              <a:schemeClr val="tx1"/>
-            </a:solidFill>
-            <a:prstDash val="sysDot"/>
-            <a:tailEnd type="triangle" w="lg" len="lg"/>
-          </a:ln>
-        </p:spPr>
-        <p:style>
-          <a:lnRef idx="1">
-            <a:schemeClr val="accent1"/>
-          </a:lnRef>
-          <a:fillRef idx="0">
-            <a:schemeClr val="accent1"/>
-          </a:fillRef>
-          <a:effectRef idx="0">
-            <a:schemeClr val="accent1"/>
-          </a:effectRef>
-          <a:fontRef idx="minor">
-            <a:schemeClr val="tx1"/>
-          </a:fontRef>
-        </p:style>
-      </p:cxnSp>
     </p:spTree>
     <p:extLst>
       <p:ext uri="{BB962C8B-B14F-4D97-AF65-F5344CB8AC3E}">
-        <p14:creationId xmlns:p14="http://schemas.microsoft.com/office/powerpoint/2010/main" val="1680945878"/>
+        <p14:creationId xmlns:p14="http://schemas.microsoft.com/office/powerpoint/2010/main" val="2118095873"/>
       </p:ext>
     </p:extLst>
   </p:cSld>
@@ -6078,7 +6856,7 @@
         </p:nvSpPr>
         <p:spPr>
           <a:xfrm>
-            <a:off x="767958" y="478808"/>
+            <a:off x="1732234" y="1492961"/>
             <a:ext cx="1297663" cy="1297663"/>
           </a:xfrm>
           <a:prstGeom prst="ellipse">
@@ -6137,73 +6915,6 @@
           </a:p>
         </p:txBody>
       </p:sp>
-      <p:sp>
-        <p:nvSpPr>
-          <p:cNvPr id="30" name="Oval 29"/>
-          <p:cNvSpPr/>
-          <p:nvPr/>
-        </p:nvSpPr>
-        <p:spPr>
-          <a:xfrm>
-            <a:off x="767958" y="2843810"/>
-            <a:ext cx="1297663" cy="1297663"/>
-          </a:xfrm>
-          <a:prstGeom prst="ellipse">
-            <a:avLst/>
-          </a:prstGeom>
-          <a:solidFill>
-            <a:schemeClr val="bg1">
-              <a:lumMod val="75000"/>
-            </a:schemeClr>
-          </a:solidFill>
-          <a:ln w="38100">
-            <a:solidFill>
-              <a:schemeClr val="tx1"/>
-            </a:solidFill>
-          </a:ln>
-        </p:spPr>
-        <p:style>
-          <a:lnRef idx="2">
-            <a:schemeClr val="accent1">
-              <a:shade val="50000"/>
-            </a:schemeClr>
-          </a:lnRef>
-          <a:fillRef idx="1">
-            <a:schemeClr val="accent1"/>
-          </a:fillRef>
-          <a:effectRef idx="0">
-            <a:schemeClr val="accent1"/>
-          </a:effectRef>
-          <a:fontRef idx="minor">
-            <a:schemeClr val="lt1"/>
-          </a:fontRef>
-        </p:style>
-        <p:txBody>
-          <a:bodyPr rot="0" spcFirstLastPara="0" vertOverflow="overflow" horzOverflow="overflow" vert="horz" wrap="square" lIns="76200" tIns="38100" rIns="76200" bIns="38100" numCol="1" spcCol="0" rtlCol="0" fromWordArt="0" anchor="ctr" anchorCtr="0" forceAA="0" compatLnSpc="1">
-            <a:prstTxWarp prst="textNoShape">
-              <a:avLst/>
-            </a:prstTxWarp>
-            <a:noAutofit/>
-          </a:bodyPr>
-          <a:lstStyle/>
-          <a:p>
-            <a:pPr algn="ctr"/>
-            <a:r>
-              <a:rPr lang="en-US" sz="6666" dirty="0" smtClean="0">
-                <a:solidFill>
-                  <a:srgbClr val="C00000"/>
-                </a:solidFill>
-              </a:rPr>
-              <a:t>Z</a:t>
-            </a:r>
-            <a:endParaRPr lang="en-US" sz="6666" dirty="0">
-              <a:solidFill>
-                <a:srgbClr val="C00000"/>
-              </a:solidFill>
-            </a:endParaRPr>
-          </a:p>
-        </p:txBody>
-      </p:sp>
       <p:cxnSp>
         <p:nvCxnSpPr>
           <p:cNvPr id="45" name="Straight Arrow Connector 44"/>
@@ -6214,7 +6925,7 @@
         </p:nvCxnSpPr>
         <p:spPr>
           <a:xfrm>
-            <a:off x="88121" y="1127639"/>
+            <a:off x="1052397" y="2141792"/>
             <a:ext cx="679837" cy="0"/>
           </a:xfrm>
           <a:prstGeom prst="straightConnector1">
@@ -6243,47 +6954,10 @@
           </a:fontRef>
         </p:style>
       </p:cxnSp>
-      <p:cxnSp>
-        <p:nvCxnSpPr>
-          <p:cNvPr id="10" name="Straight Arrow Connector 9"/>
-          <p:cNvCxnSpPr/>
-          <p:nvPr/>
-        </p:nvCxnSpPr>
-        <p:spPr>
-          <a:xfrm>
-            <a:off x="88121" y="3492642"/>
-            <a:ext cx="679837" cy="0"/>
-          </a:xfrm>
-          <a:prstGeom prst="straightConnector1">
-            <a:avLst/>
-          </a:prstGeom>
-          <a:ln w="45720">
-            <a:solidFill>
-              <a:schemeClr val="tx1"/>
-            </a:solidFill>
-            <a:prstDash val="solid"/>
-            <a:tailEnd type="triangle" w="lg" len="lg"/>
-          </a:ln>
-        </p:spPr>
-        <p:style>
-          <a:lnRef idx="1">
-            <a:schemeClr val="accent1"/>
-          </a:lnRef>
-          <a:fillRef idx="0">
-            <a:schemeClr val="accent1"/>
-          </a:fillRef>
-          <a:effectRef idx="0">
-            <a:schemeClr val="accent1"/>
-          </a:effectRef>
-          <a:fontRef idx="minor">
-            <a:schemeClr val="tx1"/>
-          </a:fontRef>
-        </p:style>
-      </p:cxnSp>
     </p:spTree>
     <p:extLst>
       <p:ext uri="{BB962C8B-B14F-4D97-AF65-F5344CB8AC3E}">
-        <p14:creationId xmlns:p14="http://schemas.microsoft.com/office/powerpoint/2010/main" val="2118095873"/>
+        <p14:creationId xmlns:p14="http://schemas.microsoft.com/office/powerpoint/2010/main" val="722897222"/>
       </p:ext>
     </p:extLst>
   </p:cSld>
@@ -6318,7 +6992,7 @@
         </p:nvSpPr>
         <p:spPr>
           <a:xfrm>
-            <a:off x="767958" y="478808"/>
+            <a:off x="1732234" y="1492961"/>
             <a:ext cx="1297663" cy="1297663"/>
           </a:xfrm>
           <a:prstGeom prst="ellipse">
@@ -6377,73 +7051,6 @@
           </a:p>
         </p:txBody>
       </p:sp>
-      <p:sp>
-        <p:nvSpPr>
-          <p:cNvPr id="30" name="Oval 29"/>
-          <p:cNvSpPr/>
-          <p:nvPr/>
-        </p:nvSpPr>
-        <p:spPr>
-          <a:xfrm>
-            <a:off x="767958" y="2843810"/>
-            <a:ext cx="1297663" cy="1297663"/>
-          </a:xfrm>
-          <a:prstGeom prst="ellipse">
-            <a:avLst/>
-          </a:prstGeom>
-          <a:solidFill>
-            <a:schemeClr val="bg1">
-              <a:lumMod val="75000"/>
-            </a:schemeClr>
-          </a:solidFill>
-          <a:ln w="38100">
-            <a:solidFill>
-              <a:schemeClr val="tx1"/>
-            </a:solidFill>
-          </a:ln>
-        </p:spPr>
-        <p:style>
-          <a:lnRef idx="2">
-            <a:schemeClr val="accent1">
-              <a:shade val="50000"/>
-            </a:schemeClr>
-          </a:lnRef>
-          <a:fillRef idx="1">
-            <a:schemeClr val="accent1"/>
-          </a:fillRef>
-          <a:effectRef idx="0">
-            <a:schemeClr val="accent1"/>
-          </a:effectRef>
-          <a:fontRef idx="minor">
-            <a:schemeClr val="lt1"/>
-          </a:fontRef>
-        </p:style>
-        <p:txBody>
-          <a:bodyPr rot="0" spcFirstLastPara="0" vertOverflow="overflow" horzOverflow="overflow" vert="horz" wrap="square" lIns="76200" tIns="38100" rIns="76200" bIns="38100" numCol="1" spcCol="0" rtlCol="0" fromWordArt="0" anchor="ctr" anchorCtr="0" forceAA="0" compatLnSpc="1">
-            <a:prstTxWarp prst="textNoShape">
-              <a:avLst/>
-            </a:prstTxWarp>
-            <a:noAutofit/>
-          </a:bodyPr>
-          <a:lstStyle/>
-          <a:p>
-            <a:pPr algn="ctr"/>
-            <a:r>
-              <a:rPr lang="en-US" sz="6666" dirty="0" smtClean="0">
-                <a:solidFill>
-                  <a:srgbClr val="C00000"/>
-                </a:solidFill>
-              </a:rPr>
-              <a:t>Z</a:t>
-            </a:r>
-            <a:endParaRPr lang="en-US" sz="6666" dirty="0">
-              <a:solidFill>
-                <a:srgbClr val="C00000"/>
-              </a:solidFill>
-            </a:endParaRPr>
-          </a:p>
-        </p:txBody>
-      </p:sp>
       <p:cxnSp>
         <p:nvCxnSpPr>
           <p:cNvPr id="45" name="Straight Arrow Connector 44"/>
@@ -6454,7 +7061,7 @@
         </p:nvCxnSpPr>
         <p:spPr>
           <a:xfrm>
-            <a:off x="88121" y="1127639"/>
+            <a:off x="1052397" y="2141792"/>
             <a:ext cx="679837" cy="0"/>
           </a:xfrm>
           <a:prstGeom prst="straightConnector1">
@@ -6483,47 +7090,10 @@
           </a:fontRef>
         </p:style>
       </p:cxnSp>
-      <p:cxnSp>
-        <p:nvCxnSpPr>
-          <p:cNvPr id="10" name="Straight Arrow Connector 9"/>
-          <p:cNvCxnSpPr/>
-          <p:nvPr/>
-        </p:nvCxnSpPr>
-        <p:spPr>
-          <a:xfrm>
-            <a:off x="88121" y="3492642"/>
-            <a:ext cx="679837" cy="0"/>
-          </a:xfrm>
-          <a:prstGeom prst="straightConnector1">
-            <a:avLst/>
-          </a:prstGeom>
-          <a:ln w="83820">
-            <a:solidFill>
-              <a:schemeClr val="tx1"/>
-            </a:solidFill>
-            <a:prstDash val="solid"/>
-            <a:tailEnd type="triangle" w="lg" len="lg"/>
-          </a:ln>
-        </p:spPr>
-        <p:style>
-          <a:lnRef idx="1">
-            <a:schemeClr val="accent1"/>
-          </a:lnRef>
-          <a:fillRef idx="0">
-            <a:schemeClr val="accent1"/>
-          </a:fillRef>
-          <a:effectRef idx="0">
-            <a:schemeClr val="accent1"/>
-          </a:effectRef>
-          <a:fontRef idx="minor">
-            <a:schemeClr val="tx1"/>
-          </a:fontRef>
-        </p:style>
-      </p:cxnSp>
     </p:spTree>
     <p:extLst>
       <p:ext uri="{BB962C8B-B14F-4D97-AF65-F5344CB8AC3E}">
-        <p14:creationId xmlns:p14="http://schemas.microsoft.com/office/powerpoint/2010/main" val="1164482562"/>
+        <p14:creationId xmlns:p14="http://schemas.microsoft.com/office/powerpoint/2010/main" val="737025970"/>
       </p:ext>
     </p:extLst>
   </p:cSld>
@@ -6792,13 +7362,13 @@
       </p:grpSpPr>
       <p:sp>
         <p:nvSpPr>
-          <p:cNvPr id="29" name="Oval 28"/>
+          <p:cNvPr id="31" name="Oval 30"/>
           <p:cNvSpPr/>
           <p:nvPr/>
         </p:nvSpPr>
         <p:spPr>
           <a:xfrm>
-            <a:off x="767958" y="478808"/>
+            <a:off x="1587541" y="1596208"/>
             <a:ext cx="1297663" cy="1297663"/>
           </a:xfrm>
           <a:prstGeom prst="ellipse">
@@ -6847,7 +7417,7 @@
                   <a:srgbClr val="C00000"/>
                 </a:solidFill>
               </a:rPr>
-              <a:t>X</a:t>
+              <a:t>Y</a:t>
             </a:r>
             <a:endParaRPr lang="en-US" sz="6666" dirty="0">
               <a:solidFill>
@@ -6857,263 +7427,16 @@
           </a:p>
         </p:txBody>
       </p:sp>
-      <p:sp>
-        <p:nvSpPr>
-          <p:cNvPr id="30" name="Oval 29"/>
-          <p:cNvSpPr/>
-          <p:nvPr/>
-        </p:nvSpPr>
-        <p:spPr>
-          <a:xfrm>
-            <a:off x="767958" y="2843810"/>
-            <a:ext cx="1297663" cy="1297663"/>
-          </a:xfrm>
-          <a:prstGeom prst="ellipse">
-            <a:avLst/>
-          </a:prstGeom>
-          <a:solidFill>
-            <a:schemeClr val="bg1">
-              <a:lumMod val="75000"/>
-            </a:schemeClr>
-          </a:solidFill>
-          <a:ln w="38100">
-            <a:solidFill>
-              <a:schemeClr val="tx1"/>
-            </a:solidFill>
-          </a:ln>
-        </p:spPr>
-        <p:style>
-          <a:lnRef idx="2">
-            <a:schemeClr val="accent1">
-              <a:shade val="50000"/>
-            </a:schemeClr>
-          </a:lnRef>
-          <a:fillRef idx="1">
-            <a:schemeClr val="accent1"/>
-          </a:fillRef>
-          <a:effectRef idx="0">
-            <a:schemeClr val="accent1"/>
-          </a:effectRef>
-          <a:fontRef idx="minor">
-            <a:schemeClr val="lt1"/>
-          </a:fontRef>
-        </p:style>
-        <p:txBody>
-          <a:bodyPr rot="0" spcFirstLastPara="0" vertOverflow="overflow" horzOverflow="overflow" vert="horz" wrap="square" lIns="76200" tIns="38100" rIns="76200" bIns="38100" numCol="1" spcCol="0" rtlCol="0" fromWordArt="0" anchor="ctr" anchorCtr="0" forceAA="0" compatLnSpc="1">
-            <a:prstTxWarp prst="textNoShape">
-              <a:avLst/>
-            </a:prstTxWarp>
-            <a:noAutofit/>
-          </a:bodyPr>
-          <a:lstStyle/>
-          <a:p>
-            <a:pPr algn="ctr"/>
-            <a:r>
-              <a:rPr lang="en-US" sz="6666" dirty="0" smtClean="0">
-                <a:solidFill>
-                  <a:srgbClr val="C00000"/>
-                </a:solidFill>
-              </a:rPr>
-              <a:t>Z</a:t>
-            </a:r>
-            <a:endParaRPr lang="en-US" sz="6666" dirty="0">
-              <a:solidFill>
-                <a:srgbClr val="C00000"/>
-              </a:solidFill>
-            </a:endParaRPr>
-          </a:p>
-        </p:txBody>
-      </p:sp>
-      <p:sp>
-        <p:nvSpPr>
-          <p:cNvPr id="31" name="Oval 30"/>
-          <p:cNvSpPr/>
-          <p:nvPr/>
-        </p:nvSpPr>
-        <p:spPr>
-          <a:xfrm>
-            <a:off x="2501941" y="1662710"/>
-            <a:ext cx="1297663" cy="1297663"/>
-          </a:xfrm>
-          <a:prstGeom prst="ellipse">
-            <a:avLst/>
-          </a:prstGeom>
-          <a:solidFill>
-            <a:schemeClr val="bg1">
-              <a:lumMod val="75000"/>
-            </a:schemeClr>
-          </a:solidFill>
-          <a:ln w="38100">
-            <a:solidFill>
-              <a:schemeClr val="tx1"/>
-            </a:solidFill>
-          </a:ln>
-        </p:spPr>
-        <p:style>
-          <a:lnRef idx="2">
-            <a:schemeClr val="accent1">
-              <a:shade val="50000"/>
-            </a:schemeClr>
-          </a:lnRef>
-          <a:fillRef idx="1">
-            <a:schemeClr val="accent1"/>
-          </a:fillRef>
-          <a:effectRef idx="0">
-            <a:schemeClr val="accent1"/>
-          </a:effectRef>
-          <a:fontRef idx="minor">
-            <a:schemeClr val="lt1"/>
-          </a:fontRef>
-        </p:style>
-        <p:txBody>
-          <a:bodyPr rot="0" spcFirstLastPara="0" vertOverflow="overflow" horzOverflow="overflow" vert="horz" wrap="square" lIns="76200" tIns="38100" rIns="76200" bIns="38100" numCol="1" spcCol="0" rtlCol="0" fromWordArt="0" anchor="ctr" anchorCtr="0" forceAA="0" compatLnSpc="1">
-            <a:prstTxWarp prst="textNoShape">
-              <a:avLst/>
-            </a:prstTxWarp>
-            <a:noAutofit/>
-          </a:bodyPr>
-          <a:lstStyle/>
-          <a:p>
-            <a:pPr algn="ctr"/>
-            <a:r>
-              <a:rPr lang="en-US" sz="6666" dirty="0" smtClean="0">
-                <a:solidFill>
-                  <a:srgbClr val="C00000"/>
-                </a:solidFill>
-              </a:rPr>
-              <a:t>Y</a:t>
-            </a:r>
-            <a:endParaRPr lang="en-US" sz="6666" dirty="0">
-              <a:solidFill>
-                <a:srgbClr val="C00000"/>
-              </a:solidFill>
-            </a:endParaRPr>
-          </a:p>
-        </p:txBody>
-      </p:sp>
       <p:cxnSp>
         <p:nvCxnSpPr>
-          <p:cNvPr id="45" name="Straight Arrow Connector 44"/>
-          <p:cNvCxnSpPr>
-            <a:endCxn id="29" idx="2"/>
-          </p:cNvCxnSpPr>
-          <p:nvPr/>
-        </p:nvCxnSpPr>
-        <p:spPr>
-          <a:xfrm>
-            <a:off x="88121" y="1127639"/>
-            <a:ext cx="679837" cy="0"/>
-          </a:xfrm>
-          <a:prstGeom prst="straightConnector1">
-            <a:avLst/>
-          </a:prstGeom>
-          <a:ln w="45720">
-            <a:solidFill>
-              <a:schemeClr val="tx1"/>
-            </a:solidFill>
-            <a:prstDash val="solid"/>
-            <a:tailEnd type="triangle" w="lg" len="lg"/>
-          </a:ln>
-        </p:spPr>
-        <p:style>
-          <a:lnRef idx="1">
-            <a:schemeClr val="accent1"/>
-          </a:lnRef>
-          <a:fillRef idx="0">
-            <a:schemeClr val="accent1"/>
-          </a:fillRef>
-          <a:effectRef idx="0">
-            <a:schemeClr val="accent1"/>
-          </a:effectRef>
-          <a:fontRef idx="minor">
-            <a:schemeClr val="tx1"/>
-          </a:fontRef>
-        </p:style>
-      </p:cxnSp>
-      <p:cxnSp>
-        <p:nvCxnSpPr>
-          <p:cNvPr id="10" name="Straight Arrow Connector 9"/>
+          <p:cNvPr id="11" name="Straight Arrow Connector 10"/>
           <p:cNvCxnSpPr/>
           <p:nvPr/>
         </p:nvCxnSpPr>
         <p:spPr>
-          <a:xfrm>
-            <a:off x="88121" y="3492642"/>
-            <a:ext cx="679837" cy="0"/>
-          </a:xfrm>
-          <a:prstGeom prst="straightConnector1">
-            <a:avLst/>
-          </a:prstGeom>
-          <a:ln w="83820">
-            <a:solidFill>
-              <a:schemeClr val="tx1"/>
-            </a:solidFill>
-            <a:prstDash val="solid"/>
-            <a:tailEnd type="triangle" w="lg" len="lg"/>
-          </a:ln>
-        </p:spPr>
-        <p:style>
-          <a:lnRef idx="1">
-            <a:schemeClr val="accent1"/>
-          </a:lnRef>
-          <a:fillRef idx="0">
-            <a:schemeClr val="accent1"/>
-          </a:fillRef>
-          <a:effectRef idx="0">
-            <a:schemeClr val="accent1"/>
-          </a:effectRef>
-          <a:fontRef idx="minor">
-            <a:schemeClr val="tx1"/>
-          </a:fontRef>
-        </p:style>
-      </p:cxnSp>
-      <p:cxnSp>
-        <p:nvCxnSpPr>
-          <p:cNvPr id="8" name="Straight Arrow Connector 7"/>
-          <p:cNvCxnSpPr/>
-          <p:nvPr/>
-        </p:nvCxnSpPr>
-        <p:spPr>
-          <a:xfrm>
-            <a:off x="2065621" y="1127640"/>
-            <a:ext cx="626358" cy="725109"/>
-          </a:xfrm>
-          <a:prstGeom prst="straightConnector1">
-            <a:avLst/>
-          </a:prstGeom>
-          <a:ln w="83820">
-            <a:solidFill>
-              <a:schemeClr val="tx1"/>
-            </a:solidFill>
-            <a:prstDash val="solid"/>
-            <a:tailEnd type="triangle" w="lg" len="lg"/>
-          </a:ln>
-        </p:spPr>
-        <p:style>
-          <a:lnRef idx="1">
-            <a:schemeClr val="accent1"/>
-          </a:lnRef>
-          <a:fillRef idx="0">
-            <a:schemeClr val="accent1"/>
-          </a:fillRef>
-          <a:effectRef idx="0">
-            <a:schemeClr val="accent1"/>
-          </a:effectRef>
-          <a:fontRef idx="minor">
-            <a:schemeClr val="tx1"/>
-          </a:fontRef>
-        </p:style>
-      </p:cxnSp>
-      <p:cxnSp>
-        <p:nvCxnSpPr>
-          <p:cNvPr id="9" name="Straight Arrow Connector 8"/>
-          <p:cNvCxnSpPr/>
-          <p:nvPr/>
-        </p:nvCxnSpPr>
-        <p:spPr>
-          <a:xfrm flipV="1">
-            <a:off x="2065621" y="2770335"/>
-            <a:ext cx="626358" cy="722307"/>
+          <a:xfrm flipH="1">
+            <a:off x="2885203" y="2245040"/>
+            <a:ext cx="678180" cy="0"/>
           </a:xfrm>
           <a:prstGeom prst="straightConnector1">
             <a:avLst/>
@@ -7144,7 +7467,7 @@
     </p:spTree>
     <p:extLst>
       <p:ext uri="{BB962C8B-B14F-4D97-AF65-F5344CB8AC3E}">
-        <p14:creationId xmlns:p14="http://schemas.microsoft.com/office/powerpoint/2010/main" val="550730497"/>
+        <p14:creationId xmlns:p14="http://schemas.microsoft.com/office/powerpoint/2010/main" val="947466461"/>
       </p:ext>
     </p:extLst>
   </p:cSld>

</xml_diff>